<commit_message>
added notes to slides and fixed demo bug
</commit_message>
<xml_diff>
--- a/Slides.pptx
+++ b/Slides.pptx
@@ -5744,7 +5744,7 @@
           <a:p>
             <a:fld id="{99FD6536-D906-466F-A3CC-F07BBBFBA3F6}" type="datetimeFigureOut">
               <a:rPr lang="en-US" smtClean="0"/>
-              <a:t>10/19/2020</a:t>
+              <a:t>10/20/2020</a:t>
             </a:fld>
             <a:endParaRPr lang="en-US"/>
           </a:p>
@@ -5902,7 +5902,7 @@
           <a:p>
             <a:fld id="{7F7719C4-5CCB-4564-8DFB-21D3D1DEC7F1}" type="slidenum">
               <a:rPr lang="en-US" smtClean="0"/>
-              <a:t>‹#›</a:t>
+              <a:t>‹Nr.›</a:t>
             </a:fld>
             <a:endParaRPr lang="en-US"/>
           </a:p>
@@ -6477,6 +6477,259 @@
           <a:bodyPr/>
           <a:lstStyle/>
           <a:p>
+            <a:r>
+              <a:rPr lang="en-US" dirty="0"/>
+              <a:t>One </a:t>
+            </a:r>
+            <a:r>
+              <a:rPr lang="en-US" b="1" dirty="0"/>
+              <a:t>advantage</a:t>
+            </a:r>
+            <a:r>
+              <a:rPr lang="en-US" dirty="0"/>
+              <a:t> of using a </a:t>
+            </a:r>
+            <a:r>
+              <a:rPr lang="en-US" b="1" dirty="0"/>
+              <a:t>hybrid mode </a:t>
+            </a:r>
+            <a:r>
+              <a:rPr lang="en-US" dirty="0"/>
+              <a:t>is that you can serve clients that issue MDX queries (most of them) and clients that issue DAX queries (Crescent) from the same model. In Denali, only clients that issue DAX queries can use </a:t>
+            </a:r>
+            <a:r>
+              <a:rPr lang="en-US" dirty="0" err="1"/>
+              <a:t>DirectQuery</a:t>
+            </a:r>
+            <a:r>
+              <a:rPr lang="en-US" dirty="0"/>
+              <a:t>. Clients such as Excel which issue MDX queries must fetch results from the </a:t>
+            </a:r>
+            <a:r>
+              <a:rPr lang="en-US" dirty="0" err="1"/>
+              <a:t>VertiPaq</a:t>
+            </a:r>
+            <a:r>
+              <a:rPr lang="en-US" dirty="0"/>
+              <a:t> cache.</a:t>
+            </a:r>
+          </a:p>
+          <a:p>
+            <a:endParaRPr lang="en-US" dirty="0"/>
+          </a:p>
+          <a:p>
+            <a:r>
+              <a:rPr lang="en-US" dirty="0"/>
+              <a:t>One </a:t>
+            </a:r>
+            <a:r>
+              <a:rPr lang="en-US" b="1" dirty="0"/>
+              <a:t>disadvantage</a:t>
+            </a:r>
+            <a:r>
+              <a:rPr lang="en-US" dirty="0"/>
+              <a:t> – if you have a hybrid mode, you must process the database. If your data doesn’t fit in memory, you have a problem.</a:t>
+            </a:r>
+          </a:p>
+          <a:p>
+            <a:endParaRPr lang="de-DE" dirty="0"/>
+          </a:p>
+          <a:p>
+            <a:endParaRPr lang="de-DE" dirty="0"/>
+          </a:p>
+          <a:p>
+            <a:r>
+              <a:rPr lang="en-US" dirty="0"/>
+              <a:t>The </a:t>
+            </a:r>
+            <a:r>
+              <a:rPr lang="en-US" b="1" dirty="0"/>
+              <a:t>connection string </a:t>
+            </a:r>
+            <a:r>
+              <a:rPr lang="en-US" dirty="0"/>
+              <a:t>you would use </a:t>
+            </a:r>
+            <a:r>
+              <a:rPr lang="en-US" b="1" dirty="0"/>
+              <a:t>in Excel </a:t>
+            </a:r>
+            <a:r>
+              <a:rPr lang="en-US" dirty="0"/>
+              <a:t>is something like:</a:t>
+            </a:r>
+          </a:p>
+          <a:p>
+            <a:endParaRPr lang="en-US" dirty="0"/>
+          </a:p>
+          <a:p>
+            <a:r>
+              <a:rPr lang="en-US" dirty="0"/>
+              <a:t>Provider=MSOLAP.5;Integrated Security=</a:t>
+            </a:r>
+            <a:r>
+              <a:rPr lang="en-US" dirty="0" err="1"/>
+              <a:t>SSPI;Persist</a:t>
+            </a:r>
+            <a:r>
+              <a:rPr lang="en-US" dirty="0"/>
+              <a:t> Security Info=</a:t>
+            </a:r>
+            <a:r>
+              <a:rPr lang="en-US" dirty="0" err="1"/>
+              <a:t>True;Data</a:t>
+            </a:r>
+            <a:r>
+              <a:rPr lang="en-US" dirty="0"/>
+              <a:t> Source=.;Initial Catalog=</a:t>
+            </a:r>
+            <a:r>
+              <a:rPr lang="en-US" dirty="0" err="1"/>
+              <a:t>DirectQuery</a:t>
+            </a:r>
+            <a:r>
+              <a:rPr lang="en-US" dirty="0"/>
+              <a:t> </a:t>
+            </a:r>
+            <a:r>
+              <a:rPr lang="en-US" dirty="0" err="1"/>
+              <a:t>test;</a:t>
+            </a:r>
+            <a:r>
+              <a:rPr lang="en-US" b="1" dirty="0" err="1">
+                <a:effectLst/>
+              </a:rPr>
+              <a:t>DirectQueryMode</a:t>
+            </a:r>
+            <a:r>
+              <a:rPr lang="en-US" b="1" dirty="0">
+                <a:effectLst/>
+              </a:rPr>
+              <a:t>=</a:t>
+            </a:r>
+            <a:r>
+              <a:rPr lang="en-US" b="1" dirty="0" err="1">
+                <a:effectLst/>
+              </a:rPr>
+              <a:t>InMemory</a:t>
+            </a:r>
+            <a:r>
+              <a:rPr lang="en-US" dirty="0">
+                <a:effectLst/>
+              </a:rPr>
+              <a:t>;</a:t>
+            </a:r>
+            <a:endParaRPr lang="en-US" dirty="0"/>
+          </a:p>
+          <a:p>
+            <a:endParaRPr lang="de-DE" dirty="0"/>
+          </a:p>
+        </p:txBody>
+      </p:sp>
+      <p:sp>
+        <p:nvSpPr>
+          <p:cNvPr id="4" name="Footer Placeholder 3"/>
+          <p:cNvSpPr>
+            <a:spLocks noGrp="1"/>
+          </p:cNvSpPr>
+          <p:nvPr>
+            <p:ph type="ftr" sz="quarter" idx="10"/>
+          </p:nvPr>
+        </p:nvSpPr>
+        <p:spPr/>
+        <p:txBody>
+          <a:bodyPr/>
+          <a:lstStyle/>
+          <a:p>
+            <a:r>
+              <a:rPr lang="en-US"/>
+              <a:t>© 2011 Microsoft Corporation    	Microsoft Confidential</a:t>
+            </a:r>
+            <a:endParaRPr lang="en-US" dirty="0"/>
+          </a:p>
+        </p:txBody>
+      </p:sp>
+      <p:sp>
+        <p:nvSpPr>
+          <p:cNvPr id="5" name="Slide Number Placeholder 4"/>
+          <p:cNvSpPr>
+            <a:spLocks noGrp="1"/>
+          </p:cNvSpPr>
+          <p:nvPr>
+            <p:ph type="sldNum" sz="quarter" idx="11"/>
+          </p:nvPr>
+        </p:nvSpPr>
+        <p:spPr/>
+        <p:txBody>
+          <a:bodyPr/>
+          <a:lstStyle/>
+          <a:p>
+            <a:fld id="{89920E16-7E2D-4061-8759-5F8497A7A433}" type="slidenum">
+              <a:rPr lang="en-US" smtClean="0"/>
+              <a:pPr/>
+              <a:t>21</a:t>
+            </a:fld>
+            <a:endParaRPr lang="en-US" dirty="0"/>
+          </a:p>
+        </p:txBody>
+      </p:sp>
+    </p:spTree>
+    <p:extLst>
+      <p:ext uri="{BB962C8B-B14F-4D97-AF65-F5344CB8AC3E}">
+        <p14:creationId xmlns:p14="http://schemas.microsoft.com/office/powerpoint/2010/main" val="1131725633"/>
+      </p:ext>
+    </p:extLst>
+  </p:cSld>
+  <p:clrMapOvr>
+    <a:masterClrMapping/>
+  </p:clrMapOvr>
+</p:notes>
+</file>
+
+<file path=ppt/notesSlides/notesSlide11.xml><?xml version="1.0" encoding="utf-8"?>
+<p:notes xmlns:a="http://schemas.openxmlformats.org/drawingml/2006/main" xmlns:r="http://schemas.openxmlformats.org/officeDocument/2006/relationships" xmlns:p="http://schemas.openxmlformats.org/presentationml/2006/main">
+  <p:cSld>
+    <p:spTree>
+      <p:nvGrpSpPr>
+        <p:cNvPr id="1" name=""/>
+        <p:cNvGrpSpPr/>
+        <p:nvPr/>
+      </p:nvGrpSpPr>
+      <p:grpSpPr>
+        <a:xfrm>
+          <a:off x="0" y="0"/>
+          <a:ext cx="0" cy="0"/>
+          <a:chOff x="0" y="0"/>
+          <a:chExt cx="0" cy="0"/>
+        </a:xfrm>
+      </p:grpSpPr>
+      <p:sp>
+        <p:nvSpPr>
+          <p:cNvPr id="2" name="Slide Image Placeholder 1"/>
+          <p:cNvSpPr>
+            <a:spLocks noGrp="1" noRot="1" noChangeAspect="1"/>
+          </p:cNvSpPr>
+          <p:nvPr>
+            <p:ph type="sldImg"/>
+          </p:nvPr>
+        </p:nvSpPr>
+        <p:spPr/>
+      </p:sp>
+      <p:sp>
+        <p:nvSpPr>
+          <p:cNvPr id="3" name="Notes Placeholder 2"/>
+          <p:cNvSpPr>
+            <a:spLocks noGrp="1"/>
+          </p:cNvSpPr>
+          <p:nvPr>
+            <p:ph type="body" idx="1"/>
+          </p:nvPr>
+        </p:nvSpPr>
+        <p:spPr/>
+        <p:txBody>
+          <a:bodyPr/>
+          <a:lstStyle/>
+          <a:p>
             <a:pPr algn="l">
               <a:buFont typeface="+mj-lt"/>
               <a:buAutoNum type="arabicPeriod"/>
@@ -6836,6 +7089,428 @@
           <a:p>
             <a:fld id="{7F7719C4-5CCB-4564-8DFB-21D3D1DEC7F1}" type="slidenum">
               <a:rPr lang="en-US" smtClean="0"/>
+              <a:t>22</a:t>
+            </a:fld>
+            <a:endParaRPr lang="en-US"/>
+          </a:p>
+        </p:txBody>
+      </p:sp>
+    </p:spTree>
+    <p:extLst>
+      <p:ext uri="{BB962C8B-B14F-4D97-AF65-F5344CB8AC3E}">
+        <p14:creationId xmlns:p14="http://schemas.microsoft.com/office/powerpoint/2010/main" val="483413036"/>
+      </p:ext>
+    </p:extLst>
+  </p:cSld>
+  <p:clrMapOvr>
+    <a:masterClrMapping/>
+  </p:clrMapOvr>
+</p:notes>
+</file>
+
+<file path=ppt/notesSlides/notesSlide12.xml><?xml version="1.0" encoding="utf-8"?>
+<p:notes xmlns:a="http://schemas.openxmlformats.org/drawingml/2006/main" xmlns:r="http://schemas.openxmlformats.org/officeDocument/2006/relationships" xmlns:p="http://schemas.openxmlformats.org/presentationml/2006/main">
+  <p:cSld>
+    <p:spTree>
+      <p:nvGrpSpPr>
+        <p:cNvPr id="1" name=""/>
+        <p:cNvGrpSpPr/>
+        <p:nvPr/>
+      </p:nvGrpSpPr>
+      <p:grpSpPr>
+        <a:xfrm>
+          <a:off x="0" y="0"/>
+          <a:ext cx="0" cy="0"/>
+          <a:chOff x="0" y="0"/>
+          <a:chExt cx="0" cy="0"/>
+        </a:xfrm>
+      </p:grpSpPr>
+      <p:sp>
+        <p:nvSpPr>
+          <p:cNvPr id="2" name="Slide Image Placeholder 1"/>
+          <p:cNvSpPr>
+            <a:spLocks noGrp="1" noRot="1" noChangeAspect="1"/>
+          </p:cNvSpPr>
+          <p:nvPr>
+            <p:ph type="sldImg"/>
+          </p:nvPr>
+        </p:nvSpPr>
+        <p:spPr/>
+      </p:sp>
+      <p:sp>
+        <p:nvSpPr>
+          <p:cNvPr id="3" name="Notes Placeholder 2"/>
+          <p:cNvSpPr>
+            <a:spLocks noGrp="1"/>
+          </p:cNvSpPr>
+          <p:nvPr>
+            <p:ph type="body" idx="1"/>
+          </p:nvPr>
+        </p:nvSpPr>
+        <p:spPr/>
+        <p:txBody>
+          <a:bodyPr/>
+          <a:lstStyle/>
+          <a:p>
+            <a:pPr algn="l">
+              <a:buFont typeface="+mj-lt"/>
+              <a:buAutoNum type="arabicPeriod"/>
+            </a:pPr>
+            <a:r>
+              <a:rPr lang="en-US" b="1" i="0" dirty="0" err="1">
+                <a:solidFill>
+                  <a:srgbClr val="000000"/>
+                </a:solidFill>
+                <a:effectLst/>
+                <a:latin typeface="Calibri" panose="020F0502020204030204" pitchFamily="34" charset="0"/>
+              </a:rPr>
+              <a:t>Vergleich</a:t>
+            </a:r>
+            <a:r>
+              <a:rPr lang="en-US" b="1" i="0" dirty="0">
+                <a:solidFill>
+                  <a:srgbClr val="000000"/>
+                </a:solidFill>
+                <a:effectLst/>
+                <a:latin typeface="Calibri" panose="020F0502020204030204" pitchFamily="34" charset="0"/>
+              </a:rPr>
+              <a:t> Tabular Model und Multidimensional Modelling (</a:t>
+            </a:r>
+            <a:r>
+              <a:rPr lang="en-US" b="1" i="0" dirty="0" err="1">
+                <a:solidFill>
+                  <a:srgbClr val="000000"/>
+                </a:solidFill>
+                <a:effectLst/>
+                <a:latin typeface="Calibri" panose="020F0502020204030204" pitchFamily="34" charset="0"/>
+              </a:rPr>
+              <a:t>Vorteile</a:t>
+            </a:r>
+            <a:r>
+              <a:rPr lang="en-US" b="1" i="0" dirty="0">
+                <a:solidFill>
+                  <a:srgbClr val="000000"/>
+                </a:solidFill>
+                <a:effectLst/>
+                <a:latin typeface="Calibri" panose="020F0502020204030204" pitchFamily="34" charset="0"/>
+              </a:rPr>
+              <a:t>, </a:t>
+            </a:r>
+            <a:r>
+              <a:rPr lang="en-US" b="1" i="0" dirty="0" err="1">
+                <a:solidFill>
+                  <a:srgbClr val="000000"/>
+                </a:solidFill>
+                <a:effectLst/>
+                <a:latin typeface="Calibri" panose="020F0502020204030204" pitchFamily="34" charset="0"/>
+              </a:rPr>
+              <a:t>Nachteile</a:t>
+            </a:r>
+            <a:r>
+              <a:rPr lang="en-US" b="1" i="0" dirty="0">
+                <a:solidFill>
+                  <a:srgbClr val="000000"/>
+                </a:solidFill>
+                <a:effectLst/>
+                <a:latin typeface="Calibri" panose="020F0502020204030204" pitchFamily="34" charset="0"/>
+              </a:rPr>
+              <a:t>, </a:t>
+            </a:r>
+            <a:r>
+              <a:rPr lang="en-US" b="1" i="0" dirty="0" err="1">
+                <a:solidFill>
+                  <a:srgbClr val="000000"/>
+                </a:solidFill>
+                <a:effectLst/>
+                <a:latin typeface="Calibri" panose="020F0502020204030204" pitchFamily="34" charset="0"/>
+              </a:rPr>
+              <a:t>Limitierungen</a:t>
+            </a:r>
+            <a:r>
+              <a:rPr lang="en-US" b="1" i="0" dirty="0">
+                <a:solidFill>
+                  <a:srgbClr val="000000"/>
+                </a:solidFill>
+                <a:effectLst/>
+                <a:latin typeface="Calibri" panose="020F0502020204030204" pitchFamily="34" charset="0"/>
+              </a:rPr>
+              <a:t>)</a:t>
+            </a:r>
+            <a:endParaRPr lang="en-US" b="0" i="0" dirty="0">
+              <a:solidFill>
+                <a:srgbClr val="000000"/>
+              </a:solidFill>
+              <a:effectLst/>
+              <a:latin typeface="Calibri" panose="020F0502020204030204" pitchFamily="34" charset="0"/>
+            </a:endParaRPr>
+          </a:p>
+          <a:p>
+            <a:pPr algn="l">
+              <a:buFont typeface="+mj-lt"/>
+              <a:buAutoNum type="arabicPeriod"/>
+            </a:pPr>
+            <a:r>
+              <a:rPr lang="en-US" b="1" i="0" dirty="0">
+                <a:solidFill>
+                  <a:srgbClr val="000000"/>
+                </a:solidFill>
+                <a:effectLst/>
+                <a:latin typeface="Calibri" panose="020F0502020204030204" pitchFamily="34" charset="0"/>
+              </a:rPr>
+              <a:t>Row Level Security </a:t>
+            </a:r>
+            <a:r>
+              <a:rPr lang="en-US" b="1" i="0" dirty="0" err="1">
+                <a:solidFill>
+                  <a:srgbClr val="000000"/>
+                </a:solidFill>
+                <a:effectLst/>
+                <a:latin typeface="Calibri" panose="020F0502020204030204" pitchFamily="34" charset="0"/>
+              </a:rPr>
+              <a:t>im</a:t>
+            </a:r>
+            <a:r>
+              <a:rPr lang="en-US" b="1" i="0" dirty="0">
+                <a:solidFill>
+                  <a:srgbClr val="000000"/>
+                </a:solidFill>
+                <a:effectLst/>
+                <a:latin typeface="Calibri" panose="020F0502020204030204" pitchFamily="34" charset="0"/>
+              </a:rPr>
+              <a:t> SQL Server und </a:t>
+            </a:r>
+            <a:r>
+              <a:rPr lang="en-US" b="1" i="0" dirty="0" err="1">
+                <a:solidFill>
+                  <a:srgbClr val="000000"/>
+                </a:solidFill>
+                <a:effectLst/>
+                <a:latin typeface="Calibri" panose="020F0502020204030204" pitchFamily="34" charset="0"/>
+              </a:rPr>
+              <a:t>im</a:t>
+            </a:r>
+            <a:r>
+              <a:rPr lang="en-US" b="1" i="0" dirty="0">
+                <a:solidFill>
+                  <a:srgbClr val="000000"/>
+                </a:solidFill>
+                <a:effectLst/>
+                <a:latin typeface="Calibri" panose="020F0502020204030204" pitchFamily="34" charset="0"/>
+              </a:rPr>
+              <a:t> Tabular Model </a:t>
+            </a:r>
+            <a:endParaRPr lang="en-US" b="0" i="0" dirty="0">
+              <a:solidFill>
+                <a:srgbClr val="000000"/>
+              </a:solidFill>
+              <a:effectLst/>
+              <a:latin typeface="Calibri" panose="020F0502020204030204" pitchFamily="34" charset="0"/>
+            </a:endParaRPr>
+          </a:p>
+          <a:p>
+            <a:pPr algn="l">
+              <a:buFont typeface="+mj-lt"/>
+              <a:buAutoNum type="arabicPeriod"/>
+            </a:pPr>
+            <a:r>
+              <a:rPr lang="en-US" b="1" i="0" dirty="0">
+                <a:solidFill>
+                  <a:srgbClr val="000000"/>
+                </a:solidFill>
+                <a:effectLst/>
+                <a:latin typeface="Calibri" panose="020F0502020204030204" pitchFamily="34" charset="0"/>
+              </a:rPr>
+              <a:t>Direct Query Vs </a:t>
+            </a:r>
+            <a:r>
+              <a:rPr lang="en-US" b="1" i="0" dirty="0" err="1">
+                <a:solidFill>
+                  <a:srgbClr val="000000"/>
+                </a:solidFill>
+                <a:effectLst/>
+                <a:latin typeface="Calibri" panose="020F0502020204030204" pitchFamily="34" charset="0"/>
+              </a:rPr>
+              <a:t>InMemory</a:t>
+            </a:r>
+            <a:endParaRPr lang="en-US" b="0" i="0" dirty="0">
+              <a:solidFill>
+                <a:srgbClr val="000000"/>
+              </a:solidFill>
+              <a:effectLst/>
+              <a:latin typeface="Calibri" panose="020F0502020204030204" pitchFamily="34" charset="0"/>
+            </a:endParaRPr>
+          </a:p>
+          <a:p>
+            <a:pPr algn="l">
+              <a:buFont typeface="+mj-lt"/>
+              <a:buAutoNum type="arabicPeriod"/>
+            </a:pPr>
+            <a:r>
+              <a:rPr lang="en-US" b="1" i="0" dirty="0">
+                <a:solidFill>
+                  <a:srgbClr val="000000"/>
+                </a:solidFill>
+                <a:effectLst/>
+                <a:latin typeface="Calibri" panose="020F0502020204030204" pitchFamily="34" charset="0"/>
+              </a:rPr>
+              <a:t>Processing Options</a:t>
+            </a:r>
+            <a:endParaRPr lang="en-US" b="0" i="0" dirty="0">
+              <a:solidFill>
+                <a:srgbClr val="000000"/>
+              </a:solidFill>
+              <a:effectLst/>
+              <a:latin typeface="Calibri" panose="020F0502020204030204" pitchFamily="34" charset="0"/>
+            </a:endParaRPr>
+          </a:p>
+          <a:p>
+            <a:pPr algn="l">
+              <a:buFont typeface="+mj-lt"/>
+              <a:buAutoNum type="arabicPeriod"/>
+            </a:pPr>
+            <a:r>
+              <a:rPr lang="en-US" b="1" i="0" dirty="0">
+                <a:solidFill>
+                  <a:srgbClr val="000000"/>
+                </a:solidFill>
+                <a:effectLst/>
+                <a:latin typeface="Calibri" panose="020F0502020204030204" pitchFamily="34" charset="0"/>
+              </a:rPr>
+              <a:t>Deployment </a:t>
+            </a:r>
+            <a:r>
+              <a:rPr lang="en-US" b="1" i="0" dirty="0" err="1">
+                <a:solidFill>
+                  <a:srgbClr val="000000"/>
+                </a:solidFill>
+                <a:effectLst/>
+                <a:latin typeface="Calibri" panose="020F0502020204030204" pitchFamily="34" charset="0"/>
+              </a:rPr>
+              <a:t>Optionen</a:t>
+            </a:r>
+            <a:r>
+              <a:rPr lang="en-US" b="1" i="0" dirty="0">
+                <a:solidFill>
+                  <a:srgbClr val="000000"/>
+                </a:solidFill>
+                <a:effectLst/>
+                <a:latin typeface="Calibri" panose="020F0502020204030204" pitchFamily="34" charset="0"/>
+              </a:rPr>
+              <a:t> (OnPrem </a:t>
+            </a:r>
+            <a:r>
+              <a:rPr lang="en-US" b="1" i="0" dirty="0" err="1">
+                <a:solidFill>
+                  <a:srgbClr val="000000"/>
+                </a:solidFill>
+                <a:effectLst/>
+                <a:latin typeface="Calibri" panose="020F0502020204030204" pitchFamily="34" charset="0"/>
+              </a:rPr>
+              <a:t>Dienst</a:t>
+            </a:r>
+            <a:r>
+              <a:rPr lang="en-US" b="1" i="0" dirty="0">
+                <a:solidFill>
+                  <a:srgbClr val="000000"/>
+                </a:solidFill>
+                <a:effectLst/>
+                <a:latin typeface="Calibri" panose="020F0502020204030204" pitchFamily="34" charset="0"/>
+              </a:rPr>
+              <a:t> / Azure) </a:t>
+            </a:r>
+            <a:endParaRPr lang="en-US" b="0" i="0" dirty="0">
+              <a:solidFill>
+                <a:srgbClr val="000000"/>
+              </a:solidFill>
+              <a:effectLst/>
+              <a:latin typeface="Calibri" panose="020F0502020204030204" pitchFamily="34" charset="0"/>
+            </a:endParaRPr>
+          </a:p>
+          <a:p>
+            <a:pPr algn="l">
+              <a:buFont typeface="+mj-lt"/>
+              <a:buAutoNum type="arabicPeriod"/>
+            </a:pPr>
+            <a:r>
+              <a:rPr lang="en-US" b="1" i="0" dirty="0">
+                <a:solidFill>
+                  <a:srgbClr val="000000"/>
+                </a:solidFill>
+                <a:effectLst/>
+                <a:latin typeface="Calibri" panose="020F0502020204030204" pitchFamily="34" charset="0"/>
+              </a:rPr>
+              <a:t>Eine </a:t>
+            </a:r>
+            <a:r>
+              <a:rPr lang="en-US" b="1" i="0" dirty="0" err="1">
+                <a:solidFill>
+                  <a:srgbClr val="000000"/>
+                </a:solidFill>
+                <a:effectLst/>
+                <a:latin typeface="Calibri" panose="020F0502020204030204" pitchFamily="34" charset="0"/>
+              </a:rPr>
+              <a:t>kurze</a:t>
+            </a:r>
+            <a:r>
+              <a:rPr lang="en-US" b="1" i="0" dirty="0">
+                <a:solidFill>
+                  <a:srgbClr val="000000"/>
+                </a:solidFill>
+                <a:effectLst/>
+                <a:latin typeface="Calibri" panose="020F0502020204030204" pitchFamily="34" charset="0"/>
+              </a:rPr>
+              <a:t> </a:t>
+            </a:r>
+            <a:r>
+              <a:rPr lang="en-US" b="1" i="0" dirty="0" err="1">
+                <a:solidFill>
+                  <a:srgbClr val="000000"/>
+                </a:solidFill>
+                <a:effectLst/>
+                <a:latin typeface="Calibri" panose="020F0502020204030204" pitchFamily="34" charset="0"/>
+              </a:rPr>
+              <a:t>Einführung</a:t>
+            </a:r>
+            <a:r>
+              <a:rPr lang="en-US" b="1" i="0" dirty="0">
+                <a:solidFill>
+                  <a:srgbClr val="000000"/>
+                </a:solidFill>
+                <a:effectLst/>
+                <a:latin typeface="Calibri" panose="020F0502020204030204" pitchFamily="34" charset="0"/>
+              </a:rPr>
+              <a:t> in DAX</a:t>
+            </a:r>
+            <a:endParaRPr lang="en-US" b="0" i="0" dirty="0">
+              <a:solidFill>
+                <a:srgbClr val="000000"/>
+              </a:solidFill>
+              <a:effectLst/>
+              <a:latin typeface="Calibri" panose="020F0502020204030204" pitchFamily="34" charset="0"/>
+            </a:endParaRPr>
+          </a:p>
+          <a:p>
+            <a:endParaRPr lang="en-US" dirty="0"/>
+          </a:p>
+        </p:txBody>
+      </p:sp>
+      <p:sp>
+        <p:nvSpPr>
+          <p:cNvPr id="4" name="Slide Number Placeholder 3"/>
+          <p:cNvSpPr>
+            <a:spLocks noGrp="1"/>
+          </p:cNvSpPr>
+          <p:nvPr>
+            <p:ph type="sldNum" sz="quarter" idx="5"/>
+          </p:nvPr>
+        </p:nvSpPr>
+        <p:spPr/>
+        <p:txBody>
+          <a:bodyPr/>
+          <a:lstStyle/>
+          <a:p>
+            <a:fld id="{7F7719C4-5CCB-4564-8DFB-21D3D1DEC7F1}" type="slidenum">
+              <a:rPr lang="en-US" smtClean="0"/>
               <a:t>23</a:t>
             </a:fld>
             <a:endParaRPr lang="en-US"/>
@@ -6855,7 +7530,7 @@
 </p:notes>
 </file>
 
-<file path=ppt/notesSlides/notesSlide11.xml><?xml version="1.0" encoding="utf-8"?>
+<file path=ppt/notesSlides/notesSlide13.xml><?xml version="1.0" encoding="utf-8"?>
 <p:notes xmlns:a="http://schemas.openxmlformats.org/drawingml/2006/main" xmlns:r="http://schemas.openxmlformats.org/officeDocument/2006/relationships" xmlns:p="http://schemas.openxmlformats.org/presentationml/2006/main">
   <p:cSld>
     <p:spTree>
@@ -8034,7 +8709,7 @@
       </p:grpSpPr>
       <p:sp>
         <p:nvSpPr>
-          <p:cNvPr id="2" name="Slide Image Placeholder 1"/>
+          <p:cNvPr id="2" name="Folienbildplatzhalter 1"/>
           <p:cNvSpPr>
             <a:spLocks noGrp="1" noRot="1" noChangeAspect="1"/>
           </p:cNvSpPr>
@@ -8046,7 +8721,7 @@
       </p:sp>
       <p:sp>
         <p:nvSpPr>
-          <p:cNvPr id="3" name="Notes Placeholder 2"/>
+          <p:cNvPr id="3" name="Notizenplatzhalter 2"/>
           <p:cNvSpPr>
             <a:spLocks noGrp="1"/>
           </p:cNvSpPr>
@@ -8059,13 +8734,57 @@
           <a:bodyPr/>
           <a:lstStyle/>
           <a:p>
-            <a:endParaRPr lang="en-US" dirty="0"/>
+            <a:r>
+              <a:rPr lang="en-US" dirty="0"/>
+              <a:t>Tabular model hat </a:t>
+            </a:r>
+            <a:r>
+              <a:rPr lang="en-US" dirty="0" err="1"/>
+              <a:t>eigentlich</a:t>
+            </a:r>
+            <a:r>
+              <a:rPr lang="en-US" dirty="0"/>
+              <a:t> </a:t>
+            </a:r>
+            <a:r>
+              <a:rPr lang="en-US" dirty="0" err="1"/>
+              <a:t>nur</a:t>
+            </a:r>
+            <a:r>
+              <a:rPr lang="en-US" dirty="0"/>
+              <a:t> </a:t>
+            </a:r>
+            <a:r>
+              <a:rPr lang="en-US" dirty="0" err="1"/>
+              <a:t>Tabellen</a:t>
+            </a:r>
+            <a:r>
+              <a:rPr lang="en-US" dirty="0"/>
+              <a:t>, </a:t>
+            </a:r>
+            <a:r>
+              <a:rPr lang="en-US" dirty="0" err="1"/>
+              <a:t>Beziehungen</a:t>
+            </a:r>
+            <a:r>
+              <a:rPr lang="en-US" dirty="0"/>
+              <a:t>, Measure </a:t>
+            </a:r>
+            <a:r>
+              <a:rPr lang="en-US" dirty="0" err="1"/>
+              <a:t>Definitionen</a:t>
+            </a:r>
+            <a:r>
+              <a:rPr lang="en-US" dirty="0"/>
+              <a:t>, Calculated Columns und Calculation Groups</a:t>
+            </a:r>
+            <a:endParaRPr lang="en-AT" dirty="0"/>
           </a:p>
         </p:txBody>
       </p:sp>
       <p:sp>
         <p:nvSpPr>
-          <p:cNvPr id="4" name="Slide Number Placeholder 3"/>
+          <p:cNvPr id="4" name="Foliennummernplatzhalter 3"/>
           <p:cNvSpPr>
             <a:spLocks noGrp="1"/>
           </p:cNvSpPr>
@@ -8080,7 +8799,7 @@
           <a:p>
             <a:fld id="{7F7719C4-5CCB-4564-8DFB-21D3D1DEC7F1}" type="slidenum">
               <a:rPr lang="en-US" smtClean="0"/>
-              <a:t>6</a:t>
+              <a:t>4</a:t>
             </a:fld>
             <a:endParaRPr lang="en-US"/>
           </a:p>
@@ -8089,7 +8808,7 @@
     </p:spTree>
     <p:extLst>
       <p:ext uri="{BB962C8B-B14F-4D97-AF65-F5344CB8AC3E}">
-        <p14:creationId xmlns:p14="http://schemas.microsoft.com/office/powerpoint/2010/main" val="3692440701"/>
+        <p14:creationId xmlns:p14="http://schemas.microsoft.com/office/powerpoint/2010/main" val="2110559872"/>
       </p:ext>
     </p:extLst>
   </p:cSld>
@@ -8118,7 +8837,7 @@
       </p:grpSpPr>
       <p:sp>
         <p:nvSpPr>
-          <p:cNvPr id="2" name="Slide Image Placeholder 1"/>
+          <p:cNvPr id="2" name="Folienbildplatzhalter 1"/>
           <p:cNvSpPr>
             <a:spLocks noGrp="1" noRot="1" noChangeAspect="1"/>
           </p:cNvSpPr>
@@ -8130,7 +8849,7 @@
       </p:sp>
       <p:sp>
         <p:nvSpPr>
-          <p:cNvPr id="3" name="Notes Placeholder 2"/>
+          <p:cNvPr id="3" name="Notizenplatzhalter 2"/>
           <p:cNvSpPr>
             <a:spLocks noGrp="1"/>
           </p:cNvSpPr>
@@ -8143,13 +8862,19 @@
           <a:bodyPr/>
           <a:lstStyle/>
           <a:p>
-            <a:endParaRPr lang="en-US" dirty="0"/>
+            <a:r>
+              <a:rPr lang="en-US" dirty="0"/>
+              <a:t>Some people say DAX is easier than MDX. That’s probably true regarding simple things. More complex things are also hard to implement.</a:t>
+            </a:r>
+          </a:p>
+          <a:p>
+            <a:endParaRPr lang="en-AT" dirty="0"/>
           </a:p>
         </p:txBody>
       </p:sp>
       <p:sp>
         <p:nvSpPr>
-          <p:cNvPr id="4" name="Slide Number Placeholder 3"/>
+          <p:cNvPr id="4" name="Foliennummernplatzhalter 3"/>
           <p:cNvSpPr>
             <a:spLocks noGrp="1"/>
           </p:cNvSpPr>
@@ -8164,7 +8889,7 @@
           <a:p>
             <a:fld id="{7F7719C4-5CCB-4564-8DFB-21D3D1DEC7F1}" type="slidenum">
               <a:rPr lang="en-US" smtClean="0"/>
-              <a:t>7</a:t>
+              <a:t>5</a:t>
             </a:fld>
             <a:endParaRPr lang="en-US"/>
           </a:p>
@@ -8173,7 +8898,7 @@
     </p:spTree>
     <p:extLst>
       <p:ext uri="{BB962C8B-B14F-4D97-AF65-F5344CB8AC3E}">
-        <p14:creationId xmlns:p14="http://schemas.microsoft.com/office/powerpoint/2010/main" val="1964801917"/>
+        <p14:creationId xmlns:p14="http://schemas.microsoft.com/office/powerpoint/2010/main" val="3110849596"/>
       </p:ext>
     </p:extLst>
   </p:cSld>
@@ -8227,344 +8952,6 @@
           <a:bodyPr/>
           <a:lstStyle/>
           <a:p>
-            <a:pPr algn="l">
-              <a:buFont typeface="+mj-lt"/>
-              <a:buAutoNum type="arabicPeriod"/>
-            </a:pPr>
-            <a:r>
-              <a:rPr lang="en-US" b="1" i="0" dirty="0" err="1">
-                <a:solidFill>
-                  <a:srgbClr val="000000"/>
-                </a:solidFill>
-                <a:effectLst/>
-                <a:latin typeface="Calibri" panose="020F0502020204030204" pitchFamily="34" charset="0"/>
-              </a:rPr>
-              <a:t>Vergleich</a:t>
-            </a:r>
-            <a:r>
-              <a:rPr lang="en-US" b="1" i="0" dirty="0">
-                <a:solidFill>
-                  <a:srgbClr val="000000"/>
-                </a:solidFill>
-                <a:effectLst/>
-                <a:latin typeface="Calibri" panose="020F0502020204030204" pitchFamily="34" charset="0"/>
-              </a:rPr>
-              <a:t> Tabular Model und Multidimensional Modelling (</a:t>
-            </a:r>
-            <a:r>
-              <a:rPr lang="en-US" b="1" i="0" dirty="0" err="1">
-                <a:solidFill>
-                  <a:srgbClr val="000000"/>
-                </a:solidFill>
-                <a:effectLst/>
-                <a:latin typeface="Calibri" panose="020F0502020204030204" pitchFamily="34" charset="0"/>
-              </a:rPr>
-              <a:t>Vorteile</a:t>
-            </a:r>
-            <a:r>
-              <a:rPr lang="en-US" b="1" i="0" dirty="0">
-                <a:solidFill>
-                  <a:srgbClr val="000000"/>
-                </a:solidFill>
-                <a:effectLst/>
-                <a:latin typeface="Calibri" panose="020F0502020204030204" pitchFamily="34" charset="0"/>
-              </a:rPr>
-              <a:t>, </a:t>
-            </a:r>
-            <a:r>
-              <a:rPr lang="en-US" b="1" i="0" dirty="0" err="1">
-                <a:solidFill>
-                  <a:srgbClr val="000000"/>
-                </a:solidFill>
-                <a:effectLst/>
-                <a:latin typeface="Calibri" panose="020F0502020204030204" pitchFamily="34" charset="0"/>
-              </a:rPr>
-              <a:t>Nachteile</a:t>
-            </a:r>
-            <a:r>
-              <a:rPr lang="en-US" b="1" i="0" dirty="0">
-                <a:solidFill>
-                  <a:srgbClr val="000000"/>
-                </a:solidFill>
-                <a:effectLst/>
-                <a:latin typeface="Calibri" panose="020F0502020204030204" pitchFamily="34" charset="0"/>
-              </a:rPr>
-              <a:t>, </a:t>
-            </a:r>
-            <a:r>
-              <a:rPr lang="en-US" b="1" i="0" dirty="0" err="1">
-                <a:solidFill>
-                  <a:srgbClr val="000000"/>
-                </a:solidFill>
-                <a:effectLst/>
-                <a:latin typeface="Calibri" panose="020F0502020204030204" pitchFamily="34" charset="0"/>
-              </a:rPr>
-              <a:t>Limitierungen</a:t>
-            </a:r>
-            <a:r>
-              <a:rPr lang="en-US" b="1" i="0" dirty="0">
-                <a:solidFill>
-                  <a:srgbClr val="000000"/>
-                </a:solidFill>
-                <a:effectLst/>
-                <a:latin typeface="Calibri" panose="020F0502020204030204" pitchFamily="34" charset="0"/>
-              </a:rPr>
-              <a:t>)</a:t>
-            </a:r>
-            <a:endParaRPr lang="en-US" b="0" i="0" dirty="0">
-              <a:solidFill>
-                <a:srgbClr val="000000"/>
-              </a:solidFill>
-              <a:effectLst/>
-              <a:latin typeface="Calibri" panose="020F0502020204030204" pitchFamily="34" charset="0"/>
-            </a:endParaRPr>
-          </a:p>
-          <a:p>
-            <a:pPr algn="l">
-              <a:buFont typeface="+mj-lt"/>
-              <a:buAutoNum type="arabicPeriod"/>
-            </a:pPr>
-            <a:r>
-              <a:rPr lang="en-US" b="1" i="0" dirty="0">
-                <a:solidFill>
-                  <a:srgbClr val="000000"/>
-                </a:solidFill>
-                <a:effectLst/>
-                <a:latin typeface="Calibri" panose="020F0502020204030204" pitchFamily="34" charset="0"/>
-              </a:rPr>
-              <a:t>Row Level Security </a:t>
-            </a:r>
-            <a:r>
-              <a:rPr lang="en-US" b="1" i="0" dirty="0" err="1">
-                <a:solidFill>
-                  <a:srgbClr val="000000"/>
-                </a:solidFill>
-                <a:effectLst/>
-                <a:latin typeface="Calibri" panose="020F0502020204030204" pitchFamily="34" charset="0"/>
-              </a:rPr>
-              <a:t>im</a:t>
-            </a:r>
-            <a:r>
-              <a:rPr lang="en-US" b="1" i="0" dirty="0">
-                <a:solidFill>
-                  <a:srgbClr val="000000"/>
-                </a:solidFill>
-                <a:effectLst/>
-                <a:latin typeface="Calibri" panose="020F0502020204030204" pitchFamily="34" charset="0"/>
-              </a:rPr>
-              <a:t> SQL Server und </a:t>
-            </a:r>
-            <a:r>
-              <a:rPr lang="en-US" b="1" i="0" dirty="0" err="1">
-                <a:solidFill>
-                  <a:srgbClr val="000000"/>
-                </a:solidFill>
-                <a:effectLst/>
-                <a:latin typeface="Calibri" panose="020F0502020204030204" pitchFamily="34" charset="0"/>
-              </a:rPr>
-              <a:t>im</a:t>
-            </a:r>
-            <a:r>
-              <a:rPr lang="en-US" b="1" i="0" dirty="0">
-                <a:solidFill>
-                  <a:srgbClr val="000000"/>
-                </a:solidFill>
-                <a:effectLst/>
-                <a:latin typeface="Calibri" panose="020F0502020204030204" pitchFamily="34" charset="0"/>
-              </a:rPr>
-              <a:t> Tabular Model </a:t>
-            </a:r>
-            <a:endParaRPr lang="en-US" b="0" i="0" dirty="0">
-              <a:solidFill>
-                <a:srgbClr val="000000"/>
-              </a:solidFill>
-              <a:effectLst/>
-              <a:latin typeface="Calibri" panose="020F0502020204030204" pitchFamily="34" charset="0"/>
-            </a:endParaRPr>
-          </a:p>
-          <a:p>
-            <a:pPr algn="l">
-              <a:buFont typeface="+mj-lt"/>
-              <a:buAutoNum type="arabicPeriod"/>
-            </a:pPr>
-            <a:r>
-              <a:rPr lang="en-US" b="1" i="0" dirty="0">
-                <a:solidFill>
-                  <a:srgbClr val="000000"/>
-                </a:solidFill>
-                <a:effectLst/>
-                <a:latin typeface="Calibri" panose="020F0502020204030204" pitchFamily="34" charset="0"/>
-              </a:rPr>
-              <a:t>Direct Query Vs </a:t>
-            </a:r>
-            <a:r>
-              <a:rPr lang="en-US" b="1" i="0" dirty="0" err="1">
-                <a:solidFill>
-                  <a:srgbClr val="000000"/>
-                </a:solidFill>
-                <a:effectLst/>
-                <a:latin typeface="Calibri" panose="020F0502020204030204" pitchFamily="34" charset="0"/>
-              </a:rPr>
-              <a:t>InMemory</a:t>
-            </a:r>
-            <a:endParaRPr lang="en-US" b="0" i="0" dirty="0">
-              <a:solidFill>
-                <a:srgbClr val="000000"/>
-              </a:solidFill>
-              <a:effectLst/>
-              <a:latin typeface="Calibri" panose="020F0502020204030204" pitchFamily="34" charset="0"/>
-            </a:endParaRPr>
-          </a:p>
-          <a:p>
-            <a:pPr algn="l">
-              <a:buFont typeface="+mj-lt"/>
-              <a:buAutoNum type="arabicPeriod"/>
-            </a:pPr>
-            <a:r>
-              <a:rPr lang="en-US" b="1" i="0" dirty="0">
-                <a:solidFill>
-                  <a:srgbClr val="000000"/>
-                </a:solidFill>
-                <a:effectLst/>
-                <a:latin typeface="Calibri" panose="020F0502020204030204" pitchFamily="34" charset="0"/>
-              </a:rPr>
-              <a:t>Processing Options</a:t>
-            </a:r>
-            <a:endParaRPr lang="en-US" b="0" i="0" dirty="0">
-              <a:solidFill>
-                <a:srgbClr val="000000"/>
-              </a:solidFill>
-              <a:effectLst/>
-              <a:latin typeface="Calibri" panose="020F0502020204030204" pitchFamily="34" charset="0"/>
-            </a:endParaRPr>
-          </a:p>
-          <a:p>
-            <a:pPr algn="l">
-              <a:buFont typeface="+mj-lt"/>
-              <a:buAutoNum type="arabicPeriod"/>
-            </a:pPr>
-            <a:r>
-              <a:rPr lang="en-US" b="1" i="0" dirty="0">
-                <a:solidFill>
-                  <a:srgbClr val="000000"/>
-                </a:solidFill>
-                <a:effectLst/>
-                <a:latin typeface="Calibri" panose="020F0502020204030204" pitchFamily="34" charset="0"/>
-              </a:rPr>
-              <a:t>Deployment </a:t>
-            </a:r>
-            <a:r>
-              <a:rPr lang="en-US" b="1" i="0" dirty="0" err="1">
-                <a:solidFill>
-                  <a:srgbClr val="000000"/>
-                </a:solidFill>
-                <a:effectLst/>
-                <a:latin typeface="Calibri" panose="020F0502020204030204" pitchFamily="34" charset="0"/>
-              </a:rPr>
-              <a:t>Optionen</a:t>
-            </a:r>
-            <a:r>
-              <a:rPr lang="en-US" b="1" i="0" dirty="0">
-                <a:solidFill>
-                  <a:srgbClr val="000000"/>
-                </a:solidFill>
-                <a:effectLst/>
-                <a:latin typeface="Calibri" panose="020F0502020204030204" pitchFamily="34" charset="0"/>
-              </a:rPr>
-              <a:t> (OnPrem </a:t>
-            </a:r>
-            <a:r>
-              <a:rPr lang="en-US" b="1" i="0" dirty="0" err="1">
-                <a:solidFill>
-                  <a:srgbClr val="000000"/>
-                </a:solidFill>
-                <a:effectLst/>
-                <a:latin typeface="Calibri" panose="020F0502020204030204" pitchFamily="34" charset="0"/>
-              </a:rPr>
-              <a:t>Dienst</a:t>
-            </a:r>
-            <a:r>
-              <a:rPr lang="en-US" b="1" i="0" dirty="0">
-                <a:solidFill>
-                  <a:srgbClr val="000000"/>
-                </a:solidFill>
-                <a:effectLst/>
-                <a:latin typeface="Calibri" panose="020F0502020204030204" pitchFamily="34" charset="0"/>
-              </a:rPr>
-              <a:t> / Azure) </a:t>
-            </a:r>
-            <a:endParaRPr lang="en-US" b="0" i="0" dirty="0">
-              <a:solidFill>
-                <a:srgbClr val="000000"/>
-              </a:solidFill>
-              <a:effectLst/>
-              <a:latin typeface="Calibri" panose="020F0502020204030204" pitchFamily="34" charset="0"/>
-            </a:endParaRPr>
-          </a:p>
-          <a:p>
-            <a:pPr algn="l">
-              <a:buFont typeface="+mj-lt"/>
-              <a:buAutoNum type="arabicPeriod"/>
-            </a:pPr>
-            <a:r>
-              <a:rPr lang="en-US" b="1" i="0" dirty="0">
-                <a:solidFill>
-                  <a:srgbClr val="000000"/>
-                </a:solidFill>
-                <a:effectLst/>
-                <a:latin typeface="Calibri" panose="020F0502020204030204" pitchFamily="34" charset="0"/>
-              </a:rPr>
-              <a:t>Eine </a:t>
-            </a:r>
-            <a:r>
-              <a:rPr lang="en-US" b="1" i="0" dirty="0" err="1">
-                <a:solidFill>
-                  <a:srgbClr val="000000"/>
-                </a:solidFill>
-                <a:effectLst/>
-                <a:latin typeface="Calibri" panose="020F0502020204030204" pitchFamily="34" charset="0"/>
-              </a:rPr>
-              <a:t>kurze</a:t>
-            </a:r>
-            <a:r>
-              <a:rPr lang="en-US" b="1" i="0" dirty="0">
-                <a:solidFill>
-                  <a:srgbClr val="000000"/>
-                </a:solidFill>
-                <a:effectLst/>
-                <a:latin typeface="Calibri" panose="020F0502020204030204" pitchFamily="34" charset="0"/>
-              </a:rPr>
-              <a:t> </a:t>
-            </a:r>
-            <a:r>
-              <a:rPr lang="en-US" b="1" i="0" dirty="0" err="1">
-                <a:solidFill>
-                  <a:srgbClr val="000000"/>
-                </a:solidFill>
-                <a:effectLst/>
-                <a:latin typeface="Calibri" panose="020F0502020204030204" pitchFamily="34" charset="0"/>
-              </a:rPr>
-              <a:t>Einführung</a:t>
-            </a:r>
-            <a:r>
-              <a:rPr lang="en-US" b="1" i="0" dirty="0">
-                <a:solidFill>
-                  <a:srgbClr val="000000"/>
-                </a:solidFill>
-                <a:effectLst/>
-                <a:latin typeface="Calibri" panose="020F0502020204030204" pitchFamily="34" charset="0"/>
-              </a:rPr>
-              <a:t> in DAX</a:t>
-            </a:r>
-            <a:endParaRPr lang="en-US" b="0" i="0" dirty="0">
-              <a:solidFill>
-                <a:srgbClr val="000000"/>
-              </a:solidFill>
-              <a:effectLst/>
-              <a:latin typeface="Calibri" panose="020F0502020204030204" pitchFamily="34" charset="0"/>
-            </a:endParaRPr>
-          </a:p>
-          <a:p>
             <a:endParaRPr lang="en-US" dirty="0"/>
           </a:p>
         </p:txBody>
@@ -8586,7 +8973,7 @@
           <a:p>
             <a:fld id="{7F7719C4-5CCB-4564-8DFB-21D3D1DEC7F1}" type="slidenum">
               <a:rPr lang="en-US" smtClean="0"/>
-              <a:t>8</a:t>
+              <a:t>6</a:t>
             </a:fld>
             <a:endParaRPr lang="en-US"/>
           </a:p>
@@ -8595,7 +8982,7 @@
     </p:spTree>
     <p:extLst>
       <p:ext uri="{BB962C8B-B14F-4D97-AF65-F5344CB8AC3E}">
-        <p14:creationId xmlns:p14="http://schemas.microsoft.com/office/powerpoint/2010/main" val="2605837593"/>
+        <p14:creationId xmlns:p14="http://schemas.microsoft.com/office/powerpoint/2010/main" val="3692440701"/>
       </p:ext>
     </p:extLst>
   </p:cSld>
@@ -8649,342 +9036,41 @@
           <a:bodyPr/>
           <a:lstStyle/>
           <a:p>
-            <a:pPr algn="l">
-              <a:buFont typeface="+mj-lt"/>
-              <a:buAutoNum type="arabicPeriod"/>
-            </a:pPr>
-            <a:r>
-              <a:rPr lang="en-US" b="1" i="0" dirty="0" err="1">
-                <a:solidFill>
-                  <a:srgbClr val="000000"/>
-                </a:solidFill>
-                <a:effectLst/>
-                <a:latin typeface="Calibri" panose="020F0502020204030204" pitchFamily="34" charset="0"/>
-              </a:rPr>
-              <a:t>Vergleich</a:t>
-            </a:r>
-            <a:r>
-              <a:rPr lang="en-US" b="1" i="0" dirty="0">
-                <a:solidFill>
-                  <a:srgbClr val="000000"/>
-                </a:solidFill>
-                <a:effectLst/>
-                <a:latin typeface="Calibri" panose="020F0502020204030204" pitchFamily="34" charset="0"/>
-              </a:rPr>
-              <a:t> Tabular Model und Multidimensional Modelling (</a:t>
-            </a:r>
-            <a:r>
-              <a:rPr lang="en-US" b="1" i="0" dirty="0" err="1">
-                <a:solidFill>
-                  <a:srgbClr val="000000"/>
-                </a:solidFill>
-                <a:effectLst/>
-                <a:latin typeface="Calibri" panose="020F0502020204030204" pitchFamily="34" charset="0"/>
-              </a:rPr>
-              <a:t>Vorteile</a:t>
-            </a:r>
-            <a:r>
-              <a:rPr lang="en-US" b="1" i="0" dirty="0">
-                <a:solidFill>
-                  <a:srgbClr val="000000"/>
-                </a:solidFill>
-                <a:effectLst/>
-                <a:latin typeface="Calibri" panose="020F0502020204030204" pitchFamily="34" charset="0"/>
-              </a:rPr>
-              <a:t>, </a:t>
-            </a:r>
-            <a:r>
-              <a:rPr lang="en-US" b="1" i="0" dirty="0" err="1">
-                <a:solidFill>
-                  <a:srgbClr val="000000"/>
-                </a:solidFill>
-                <a:effectLst/>
-                <a:latin typeface="Calibri" panose="020F0502020204030204" pitchFamily="34" charset="0"/>
-              </a:rPr>
-              <a:t>Nachteile</a:t>
-            </a:r>
-            <a:r>
-              <a:rPr lang="en-US" b="1" i="0" dirty="0">
-                <a:solidFill>
-                  <a:srgbClr val="000000"/>
-                </a:solidFill>
-                <a:effectLst/>
-                <a:latin typeface="Calibri" panose="020F0502020204030204" pitchFamily="34" charset="0"/>
-              </a:rPr>
-              <a:t>, </a:t>
-            </a:r>
-            <a:r>
-              <a:rPr lang="en-US" b="1" i="0" dirty="0" err="1">
-                <a:solidFill>
-                  <a:srgbClr val="000000"/>
-                </a:solidFill>
-                <a:effectLst/>
-                <a:latin typeface="Calibri" panose="020F0502020204030204" pitchFamily="34" charset="0"/>
-              </a:rPr>
-              <a:t>Limitierungen</a:t>
-            </a:r>
-            <a:r>
-              <a:rPr lang="en-US" b="1" i="0" dirty="0">
-                <a:solidFill>
-                  <a:srgbClr val="000000"/>
-                </a:solidFill>
-                <a:effectLst/>
-                <a:latin typeface="Calibri" panose="020F0502020204030204" pitchFamily="34" charset="0"/>
-              </a:rPr>
-              <a:t>)</a:t>
-            </a:r>
-            <a:endParaRPr lang="en-US" b="0" i="0" dirty="0">
-              <a:solidFill>
-                <a:srgbClr val="000000"/>
-              </a:solidFill>
-              <a:effectLst/>
-              <a:latin typeface="Calibri" panose="020F0502020204030204" pitchFamily="34" charset="0"/>
-            </a:endParaRPr>
-          </a:p>
-          <a:p>
-            <a:pPr algn="l">
-              <a:buFont typeface="+mj-lt"/>
-              <a:buAutoNum type="arabicPeriod"/>
-            </a:pPr>
-            <a:r>
-              <a:rPr lang="en-US" b="1" i="0" dirty="0">
-                <a:solidFill>
-                  <a:srgbClr val="000000"/>
-                </a:solidFill>
-                <a:effectLst/>
-                <a:latin typeface="Calibri" panose="020F0502020204030204" pitchFamily="34" charset="0"/>
-              </a:rPr>
-              <a:t>Row Level Security </a:t>
-            </a:r>
-            <a:r>
-              <a:rPr lang="en-US" b="1" i="0" dirty="0" err="1">
-                <a:solidFill>
-                  <a:srgbClr val="000000"/>
-                </a:solidFill>
-                <a:effectLst/>
-                <a:latin typeface="Calibri" panose="020F0502020204030204" pitchFamily="34" charset="0"/>
-              </a:rPr>
-              <a:t>im</a:t>
-            </a:r>
-            <a:r>
-              <a:rPr lang="en-US" b="1" i="0" dirty="0">
-                <a:solidFill>
-                  <a:srgbClr val="000000"/>
-                </a:solidFill>
-                <a:effectLst/>
-                <a:latin typeface="Calibri" panose="020F0502020204030204" pitchFamily="34" charset="0"/>
-              </a:rPr>
-              <a:t> SQL Server und </a:t>
-            </a:r>
-            <a:r>
-              <a:rPr lang="en-US" b="1" i="0" dirty="0" err="1">
-                <a:solidFill>
-                  <a:srgbClr val="000000"/>
-                </a:solidFill>
-                <a:effectLst/>
-                <a:latin typeface="Calibri" panose="020F0502020204030204" pitchFamily="34" charset="0"/>
-              </a:rPr>
-              <a:t>im</a:t>
-            </a:r>
-            <a:r>
-              <a:rPr lang="en-US" b="1" i="0" dirty="0">
-                <a:solidFill>
-                  <a:srgbClr val="000000"/>
-                </a:solidFill>
-                <a:effectLst/>
-                <a:latin typeface="Calibri" panose="020F0502020204030204" pitchFamily="34" charset="0"/>
-              </a:rPr>
-              <a:t> Tabular Model </a:t>
-            </a:r>
-            <a:endParaRPr lang="en-US" b="0" i="0" dirty="0">
-              <a:solidFill>
-                <a:srgbClr val="000000"/>
-              </a:solidFill>
-              <a:effectLst/>
-              <a:latin typeface="Calibri" panose="020F0502020204030204" pitchFamily="34" charset="0"/>
-            </a:endParaRPr>
-          </a:p>
-          <a:p>
-            <a:pPr algn="l">
-              <a:buFont typeface="+mj-lt"/>
-              <a:buAutoNum type="arabicPeriod"/>
-            </a:pPr>
-            <a:r>
-              <a:rPr lang="en-US" b="1" i="0" dirty="0">
-                <a:solidFill>
-                  <a:srgbClr val="000000"/>
-                </a:solidFill>
-                <a:effectLst/>
-                <a:latin typeface="Calibri" panose="020F0502020204030204" pitchFamily="34" charset="0"/>
-              </a:rPr>
-              <a:t>Direct Query Vs </a:t>
-            </a:r>
-            <a:r>
-              <a:rPr lang="en-US" b="1" i="0" dirty="0" err="1">
-                <a:solidFill>
-                  <a:srgbClr val="000000"/>
-                </a:solidFill>
-                <a:effectLst/>
-                <a:latin typeface="Calibri" panose="020F0502020204030204" pitchFamily="34" charset="0"/>
-              </a:rPr>
-              <a:t>InMemory</a:t>
-            </a:r>
-            <a:endParaRPr lang="en-US" b="0" i="0" dirty="0">
-              <a:solidFill>
-                <a:srgbClr val="000000"/>
-              </a:solidFill>
-              <a:effectLst/>
-              <a:latin typeface="Calibri" panose="020F0502020204030204" pitchFamily="34" charset="0"/>
-            </a:endParaRPr>
-          </a:p>
-          <a:p>
-            <a:pPr algn="l">
-              <a:buFont typeface="+mj-lt"/>
-              <a:buAutoNum type="arabicPeriod"/>
-            </a:pPr>
-            <a:r>
-              <a:rPr lang="en-US" b="1" i="0" dirty="0">
-                <a:solidFill>
-                  <a:srgbClr val="000000"/>
-                </a:solidFill>
-                <a:effectLst/>
-                <a:latin typeface="Calibri" panose="020F0502020204030204" pitchFamily="34" charset="0"/>
-              </a:rPr>
-              <a:t>Processing Options</a:t>
-            </a:r>
-            <a:endParaRPr lang="en-US" b="0" i="0" dirty="0">
-              <a:solidFill>
-                <a:srgbClr val="000000"/>
-              </a:solidFill>
-              <a:effectLst/>
-              <a:latin typeface="Calibri" panose="020F0502020204030204" pitchFamily="34" charset="0"/>
-            </a:endParaRPr>
-          </a:p>
-          <a:p>
-            <a:pPr algn="l">
-              <a:buFont typeface="+mj-lt"/>
-              <a:buAutoNum type="arabicPeriod"/>
-            </a:pPr>
-            <a:r>
-              <a:rPr lang="en-US" b="1" i="0" dirty="0">
-                <a:solidFill>
-                  <a:srgbClr val="000000"/>
-                </a:solidFill>
-                <a:effectLst/>
-                <a:latin typeface="Calibri" panose="020F0502020204030204" pitchFamily="34" charset="0"/>
-              </a:rPr>
-              <a:t>Deployment </a:t>
-            </a:r>
-            <a:r>
-              <a:rPr lang="en-US" b="1" i="0" dirty="0" err="1">
-                <a:solidFill>
-                  <a:srgbClr val="000000"/>
-                </a:solidFill>
-                <a:effectLst/>
-                <a:latin typeface="Calibri" panose="020F0502020204030204" pitchFamily="34" charset="0"/>
-              </a:rPr>
-              <a:t>Optionen</a:t>
-            </a:r>
-            <a:r>
-              <a:rPr lang="en-US" b="1" i="0" dirty="0">
-                <a:solidFill>
-                  <a:srgbClr val="000000"/>
-                </a:solidFill>
-                <a:effectLst/>
-                <a:latin typeface="Calibri" panose="020F0502020204030204" pitchFamily="34" charset="0"/>
-              </a:rPr>
-              <a:t> (OnPrem </a:t>
-            </a:r>
-            <a:r>
-              <a:rPr lang="en-US" b="1" i="0" dirty="0" err="1">
-                <a:solidFill>
-                  <a:srgbClr val="000000"/>
-                </a:solidFill>
-                <a:effectLst/>
-                <a:latin typeface="Calibri" panose="020F0502020204030204" pitchFamily="34" charset="0"/>
-              </a:rPr>
-              <a:t>Dienst</a:t>
-            </a:r>
-            <a:r>
-              <a:rPr lang="en-US" b="1" i="0" dirty="0">
-                <a:solidFill>
-                  <a:srgbClr val="000000"/>
-                </a:solidFill>
-                <a:effectLst/>
-                <a:latin typeface="Calibri" panose="020F0502020204030204" pitchFamily="34" charset="0"/>
-              </a:rPr>
-              <a:t> / Azure) </a:t>
-            </a:r>
-            <a:endParaRPr lang="en-US" b="0" i="0" dirty="0">
-              <a:solidFill>
-                <a:srgbClr val="000000"/>
-              </a:solidFill>
-              <a:effectLst/>
-              <a:latin typeface="Calibri" panose="020F0502020204030204" pitchFamily="34" charset="0"/>
-            </a:endParaRPr>
-          </a:p>
-          <a:p>
-            <a:pPr algn="l">
-              <a:buFont typeface="+mj-lt"/>
-              <a:buAutoNum type="arabicPeriod"/>
-            </a:pPr>
-            <a:r>
-              <a:rPr lang="en-US" b="1" i="0" dirty="0">
-                <a:solidFill>
-                  <a:srgbClr val="000000"/>
-                </a:solidFill>
-                <a:effectLst/>
-                <a:latin typeface="Calibri" panose="020F0502020204030204" pitchFamily="34" charset="0"/>
-              </a:rPr>
-              <a:t>Eine </a:t>
-            </a:r>
-            <a:r>
-              <a:rPr lang="en-US" b="1" i="0" dirty="0" err="1">
-                <a:solidFill>
-                  <a:srgbClr val="000000"/>
-                </a:solidFill>
-                <a:effectLst/>
-                <a:latin typeface="Calibri" panose="020F0502020204030204" pitchFamily="34" charset="0"/>
-              </a:rPr>
-              <a:t>kurze</a:t>
-            </a:r>
-            <a:r>
-              <a:rPr lang="en-US" b="1" i="0" dirty="0">
-                <a:solidFill>
-                  <a:srgbClr val="000000"/>
-                </a:solidFill>
-                <a:effectLst/>
-                <a:latin typeface="Calibri" panose="020F0502020204030204" pitchFamily="34" charset="0"/>
-              </a:rPr>
-              <a:t> </a:t>
-            </a:r>
-            <a:r>
-              <a:rPr lang="en-US" b="1" i="0" dirty="0" err="1">
-                <a:solidFill>
-                  <a:srgbClr val="000000"/>
-                </a:solidFill>
-                <a:effectLst/>
-                <a:latin typeface="Calibri" panose="020F0502020204030204" pitchFamily="34" charset="0"/>
-              </a:rPr>
-              <a:t>Einführung</a:t>
-            </a:r>
-            <a:r>
-              <a:rPr lang="en-US" b="1" i="0" dirty="0">
-                <a:solidFill>
-                  <a:srgbClr val="000000"/>
-                </a:solidFill>
-                <a:effectLst/>
-                <a:latin typeface="Calibri" panose="020F0502020204030204" pitchFamily="34" charset="0"/>
-              </a:rPr>
-              <a:t> in DAX</a:t>
-            </a:r>
-            <a:endParaRPr lang="en-US" b="0" i="0" dirty="0">
-              <a:solidFill>
-                <a:srgbClr val="000000"/>
-              </a:solidFill>
-              <a:effectLst/>
-              <a:latin typeface="Calibri" panose="020F0502020204030204" pitchFamily="34" charset="0"/>
-            </a:endParaRPr>
+            <a:r>
+              <a:rPr lang="en-US" dirty="0"/>
+              <a:t>As the tabular model holds all data compressed in memory (in a very cache optimized format) it usually performs much faster than Multidimensional model. </a:t>
+            </a:r>
+          </a:p>
+          <a:p>
+            <a:r>
+              <a:rPr lang="en-US" dirty="0"/>
+              <a:t>Also the multidimensional Model holds Data in Memory. </a:t>
+            </a:r>
+          </a:p>
+          <a:p>
+            <a:r>
+              <a:rPr lang="en-US" dirty="0"/>
+              <a:t>Accessing leave levels of hierarchies often requires IO. Multidimensional models are based on the concept of hierarchies and </a:t>
+            </a:r>
+            <a:r>
+              <a:rPr lang="en-US" dirty="0" err="1"/>
+              <a:t>preaggregated</a:t>
+            </a:r>
+            <a:r>
+              <a:rPr lang="en-US" dirty="0"/>
+              <a:t> data along these hierarchies. </a:t>
+            </a:r>
+          </a:p>
+          <a:p>
+            <a:r>
+              <a:rPr lang="en-US" dirty="0"/>
+              <a:t>That’s not the case in Tabular model – that is just a column store engine that can do very fast scans, late materialization</a:t>
+            </a:r>
+            <a:r>
+              <a:rPr lang="en-US"/>
+              <a:t>, etc.</a:t>
+            </a:r>
+            <a:endParaRPr lang="en-US" dirty="0"/>
           </a:p>
           <a:p>
             <a:endParaRPr lang="en-US" dirty="0"/>
@@ -9008,7 +9094,7 @@
           <a:p>
             <a:fld id="{7F7719C4-5CCB-4564-8DFB-21D3D1DEC7F1}" type="slidenum">
               <a:rPr lang="en-US" smtClean="0"/>
-              <a:t>18</a:t>
+              <a:t>7</a:t>
             </a:fld>
             <a:endParaRPr lang="en-US"/>
           </a:p>
@@ -9017,7 +9103,7 @@
     </p:spTree>
     <p:extLst>
       <p:ext uri="{BB962C8B-B14F-4D97-AF65-F5344CB8AC3E}">
-        <p14:creationId xmlns:p14="http://schemas.microsoft.com/office/powerpoint/2010/main" val="3907796195"/>
+        <p14:creationId xmlns:p14="http://schemas.microsoft.com/office/powerpoint/2010/main" val="1964801917"/>
       </p:ext>
     </p:extLst>
   </p:cSld>
@@ -9071,18 +9157,356 @@
           <a:bodyPr/>
           <a:lstStyle/>
           <a:p>
-            <a:endParaRPr lang="de-DE" dirty="0"/>
+            <a:pPr algn="l">
+              <a:buFont typeface="+mj-lt"/>
+              <a:buAutoNum type="arabicPeriod"/>
+            </a:pPr>
+            <a:r>
+              <a:rPr lang="en-US" b="1" i="0" dirty="0" err="1">
+                <a:solidFill>
+                  <a:srgbClr val="000000"/>
+                </a:solidFill>
+                <a:effectLst/>
+                <a:latin typeface="Calibri" panose="020F0502020204030204" pitchFamily="34" charset="0"/>
+              </a:rPr>
+              <a:t>Vergleich</a:t>
+            </a:r>
+            <a:r>
+              <a:rPr lang="en-US" b="1" i="0" dirty="0">
+                <a:solidFill>
+                  <a:srgbClr val="000000"/>
+                </a:solidFill>
+                <a:effectLst/>
+                <a:latin typeface="Calibri" panose="020F0502020204030204" pitchFamily="34" charset="0"/>
+              </a:rPr>
+              <a:t> Tabular Model und Multidimensional Modelling (</a:t>
+            </a:r>
+            <a:r>
+              <a:rPr lang="en-US" b="1" i="0" dirty="0" err="1">
+                <a:solidFill>
+                  <a:srgbClr val="000000"/>
+                </a:solidFill>
+                <a:effectLst/>
+                <a:latin typeface="Calibri" panose="020F0502020204030204" pitchFamily="34" charset="0"/>
+              </a:rPr>
+              <a:t>Vorteile</a:t>
+            </a:r>
+            <a:r>
+              <a:rPr lang="en-US" b="1" i="0" dirty="0">
+                <a:solidFill>
+                  <a:srgbClr val="000000"/>
+                </a:solidFill>
+                <a:effectLst/>
+                <a:latin typeface="Calibri" panose="020F0502020204030204" pitchFamily="34" charset="0"/>
+              </a:rPr>
+              <a:t>, </a:t>
+            </a:r>
+            <a:r>
+              <a:rPr lang="en-US" b="1" i="0" dirty="0" err="1">
+                <a:solidFill>
+                  <a:srgbClr val="000000"/>
+                </a:solidFill>
+                <a:effectLst/>
+                <a:latin typeface="Calibri" panose="020F0502020204030204" pitchFamily="34" charset="0"/>
+              </a:rPr>
+              <a:t>Nachteile</a:t>
+            </a:r>
+            <a:r>
+              <a:rPr lang="en-US" b="1" i="0" dirty="0">
+                <a:solidFill>
+                  <a:srgbClr val="000000"/>
+                </a:solidFill>
+                <a:effectLst/>
+                <a:latin typeface="Calibri" panose="020F0502020204030204" pitchFamily="34" charset="0"/>
+              </a:rPr>
+              <a:t>, </a:t>
+            </a:r>
+            <a:r>
+              <a:rPr lang="en-US" b="1" i="0" dirty="0" err="1">
+                <a:solidFill>
+                  <a:srgbClr val="000000"/>
+                </a:solidFill>
+                <a:effectLst/>
+                <a:latin typeface="Calibri" panose="020F0502020204030204" pitchFamily="34" charset="0"/>
+              </a:rPr>
+              <a:t>Limitierungen</a:t>
+            </a:r>
+            <a:r>
+              <a:rPr lang="en-US" b="1" i="0" dirty="0">
+                <a:solidFill>
+                  <a:srgbClr val="000000"/>
+                </a:solidFill>
+                <a:effectLst/>
+                <a:latin typeface="Calibri" panose="020F0502020204030204" pitchFamily="34" charset="0"/>
+              </a:rPr>
+              <a:t>)</a:t>
+            </a:r>
+            <a:endParaRPr lang="en-US" b="0" i="0" dirty="0">
+              <a:solidFill>
+                <a:srgbClr val="000000"/>
+              </a:solidFill>
+              <a:effectLst/>
+              <a:latin typeface="Calibri" panose="020F0502020204030204" pitchFamily="34" charset="0"/>
+            </a:endParaRPr>
+          </a:p>
+          <a:p>
+            <a:pPr algn="l">
+              <a:buFont typeface="+mj-lt"/>
+              <a:buAutoNum type="arabicPeriod"/>
+            </a:pPr>
+            <a:r>
+              <a:rPr lang="en-US" b="1" i="0" dirty="0">
+                <a:solidFill>
+                  <a:srgbClr val="000000"/>
+                </a:solidFill>
+                <a:effectLst/>
+                <a:latin typeface="Calibri" panose="020F0502020204030204" pitchFamily="34" charset="0"/>
+              </a:rPr>
+              <a:t>Row Level Security </a:t>
+            </a:r>
+            <a:r>
+              <a:rPr lang="en-US" b="1" i="0" dirty="0" err="1">
+                <a:solidFill>
+                  <a:srgbClr val="000000"/>
+                </a:solidFill>
+                <a:effectLst/>
+                <a:latin typeface="Calibri" panose="020F0502020204030204" pitchFamily="34" charset="0"/>
+              </a:rPr>
+              <a:t>im</a:t>
+            </a:r>
+            <a:r>
+              <a:rPr lang="en-US" b="1" i="0" dirty="0">
+                <a:solidFill>
+                  <a:srgbClr val="000000"/>
+                </a:solidFill>
+                <a:effectLst/>
+                <a:latin typeface="Calibri" panose="020F0502020204030204" pitchFamily="34" charset="0"/>
+              </a:rPr>
+              <a:t> SQL Server und </a:t>
+            </a:r>
+            <a:r>
+              <a:rPr lang="en-US" b="1" i="0" dirty="0" err="1">
+                <a:solidFill>
+                  <a:srgbClr val="000000"/>
+                </a:solidFill>
+                <a:effectLst/>
+                <a:latin typeface="Calibri" panose="020F0502020204030204" pitchFamily="34" charset="0"/>
+              </a:rPr>
+              <a:t>im</a:t>
+            </a:r>
+            <a:r>
+              <a:rPr lang="en-US" b="1" i="0" dirty="0">
+                <a:solidFill>
+                  <a:srgbClr val="000000"/>
+                </a:solidFill>
+                <a:effectLst/>
+                <a:latin typeface="Calibri" panose="020F0502020204030204" pitchFamily="34" charset="0"/>
+              </a:rPr>
+              <a:t> Tabular Model </a:t>
+            </a:r>
+            <a:endParaRPr lang="en-US" b="0" i="0" dirty="0">
+              <a:solidFill>
+                <a:srgbClr val="000000"/>
+              </a:solidFill>
+              <a:effectLst/>
+              <a:latin typeface="Calibri" panose="020F0502020204030204" pitchFamily="34" charset="0"/>
+            </a:endParaRPr>
+          </a:p>
+          <a:p>
+            <a:pPr algn="l">
+              <a:buFont typeface="+mj-lt"/>
+              <a:buAutoNum type="arabicPeriod"/>
+            </a:pPr>
+            <a:r>
+              <a:rPr lang="en-US" b="1" i="0" dirty="0">
+                <a:solidFill>
+                  <a:srgbClr val="000000"/>
+                </a:solidFill>
+                <a:effectLst/>
+                <a:latin typeface="Calibri" panose="020F0502020204030204" pitchFamily="34" charset="0"/>
+              </a:rPr>
+              <a:t>Direct Query Vs </a:t>
+            </a:r>
+            <a:r>
+              <a:rPr lang="en-US" b="1" i="0" dirty="0" err="1">
+                <a:solidFill>
+                  <a:srgbClr val="000000"/>
+                </a:solidFill>
+                <a:effectLst/>
+                <a:latin typeface="Calibri" panose="020F0502020204030204" pitchFamily="34" charset="0"/>
+              </a:rPr>
+              <a:t>InMemory</a:t>
+            </a:r>
+            <a:endParaRPr lang="en-US" b="0" i="0" dirty="0">
+              <a:solidFill>
+                <a:srgbClr val="000000"/>
+              </a:solidFill>
+              <a:effectLst/>
+              <a:latin typeface="Calibri" panose="020F0502020204030204" pitchFamily="34" charset="0"/>
+            </a:endParaRPr>
+          </a:p>
+          <a:p>
+            <a:pPr algn="l">
+              <a:buFont typeface="+mj-lt"/>
+              <a:buAutoNum type="arabicPeriod"/>
+            </a:pPr>
+            <a:r>
+              <a:rPr lang="en-US" b="1" i="0" dirty="0">
+                <a:solidFill>
+                  <a:srgbClr val="000000"/>
+                </a:solidFill>
+                <a:effectLst/>
+                <a:latin typeface="Calibri" panose="020F0502020204030204" pitchFamily="34" charset="0"/>
+              </a:rPr>
+              <a:t>Processing Options</a:t>
+            </a:r>
+            <a:endParaRPr lang="en-US" b="0" i="0" dirty="0">
+              <a:solidFill>
+                <a:srgbClr val="000000"/>
+              </a:solidFill>
+              <a:effectLst/>
+              <a:latin typeface="Calibri" panose="020F0502020204030204" pitchFamily="34" charset="0"/>
+            </a:endParaRPr>
+          </a:p>
+          <a:p>
+            <a:pPr algn="l">
+              <a:buFont typeface="+mj-lt"/>
+              <a:buAutoNum type="arabicPeriod"/>
+            </a:pPr>
+            <a:r>
+              <a:rPr lang="en-US" b="1" i="0" dirty="0">
+                <a:solidFill>
+                  <a:srgbClr val="000000"/>
+                </a:solidFill>
+                <a:effectLst/>
+                <a:latin typeface="Calibri" panose="020F0502020204030204" pitchFamily="34" charset="0"/>
+              </a:rPr>
+              <a:t>Deployment </a:t>
+            </a:r>
+            <a:r>
+              <a:rPr lang="en-US" b="1" i="0" dirty="0" err="1">
+                <a:solidFill>
+                  <a:srgbClr val="000000"/>
+                </a:solidFill>
+                <a:effectLst/>
+                <a:latin typeface="Calibri" panose="020F0502020204030204" pitchFamily="34" charset="0"/>
+              </a:rPr>
+              <a:t>Optionen</a:t>
+            </a:r>
+            <a:r>
+              <a:rPr lang="en-US" b="1" i="0" dirty="0">
+                <a:solidFill>
+                  <a:srgbClr val="000000"/>
+                </a:solidFill>
+                <a:effectLst/>
+                <a:latin typeface="Calibri" panose="020F0502020204030204" pitchFamily="34" charset="0"/>
+              </a:rPr>
+              <a:t> (OnPrem </a:t>
+            </a:r>
+            <a:r>
+              <a:rPr lang="en-US" b="1" i="0" dirty="0" err="1">
+                <a:solidFill>
+                  <a:srgbClr val="000000"/>
+                </a:solidFill>
+                <a:effectLst/>
+                <a:latin typeface="Calibri" panose="020F0502020204030204" pitchFamily="34" charset="0"/>
+              </a:rPr>
+              <a:t>Dienst</a:t>
+            </a:r>
+            <a:r>
+              <a:rPr lang="en-US" b="1" i="0" dirty="0">
+                <a:solidFill>
+                  <a:srgbClr val="000000"/>
+                </a:solidFill>
+                <a:effectLst/>
+                <a:latin typeface="Calibri" panose="020F0502020204030204" pitchFamily="34" charset="0"/>
+              </a:rPr>
+              <a:t> / Azure) </a:t>
+            </a:r>
+            <a:endParaRPr lang="en-US" b="0" i="0" dirty="0">
+              <a:solidFill>
+                <a:srgbClr val="000000"/>
+              </a:solidFill>
+              <a:effectLst/>
+              <a:latin typeface="Calibri" panose="020F0502020204030204" pitchFamily="34" charset="0"/>
+            </a:endParaRPr>
+          </a:p>
+          <a:p>
+            <a:pPr algn="l">
+              <a:buFont typeface="+mj-lt"/>
+              <a:buAutoNum type="arabicPeriod"/>
+            </a:pPr>
+            <a:r>
+              <a:rPr lang="en-US" b="1" i="0" dirty="0">
+                <a:solidFill>
+                  <a:srgbClr val="000000"/>
+                </a:solidFill>
+                <a:effectLst/>
+                <a:latin typeface="Calibri" panose="020F0502020204030204" pitchFamily="34" charset="0"/>
+              </a:rPr>
+              <a:t>Eine </a:t>
+            </a:r>
+            <a:r>
+              <a:rPr lang="en-US" b="1" i="0" dirty="0" err="1">
+                <a:solidFill>
+                  <a:srgbClr val="000000"/>
+                </a:solidFill>
+                <a:effectLst/>
+                <a:latin typeface="Calibri" panose="020F0502020204030204" pitchFamily="34" charset="0"/>
+              </a:rPr>
+              <a:t>kurze</a:t>
+            </a:r>
+            <a:r>
+              <a:rPr lang="en-US" b="1" i="0" dirty="0">
+                <a:solidFill>
+                  <a:srgbClr val="000000"/>
+                </a:solidFill>
+                <a:effectLst/>
+                <a:latin typeface="Calibri" panose="020F0502020204030204" pitchFamily="34" charset="0"/>
+              </a:rPr>
+              <a:t> </a:t>
+            </a:r>
+            <a:r>
+              <a:rPr lang="en-US" b="1" i="0" dirty="0" err="1">
+                <a:solidFill>
+                  <a:srgbClr val="000000"/>
+                </a:solidFill>
+                <a:effectLst/>
+                <a:latin typeface="Calibri" panose="020F0502020204030204" pitchFamily="34" charset="0"/>
+              </a:rPr>
+              <a:t>Einführung</a:t>
+            </a:r>
+            <a:r>
+              <a:rPr lang="en-US" b="1" i="0" dirty="0">
+                <a:solidFill>
+                  <a:srgbClr val="000000"/>
+                </a:solidFill>
+                <a:effectLst/>
+                <a:latin typeface="Calibri" panose="020F0502020204030204" pitchFamily="34" charset="0"/>
+              </a:rPr>
+              <a:t> in DAX</a:t>
+            </a:r>
+            <a:endParaRPr lang="en-US" b="0" i="0" dirty="0">
+              <a:solidFill>
+                <a:srgbClr val="000000"/>
+              </a:solidFill>
+              <a:effectLst/>
+              <a:latin typeface="Calibri" panose="020F0502020204030204" pitchFamily="34" charset="0"/>
+            </a:endParaRPr>
+          </a:p>
+          <a:p>
+            <a:endParaRPr lang="en-US" dirty="0"/>
           </a:p>
         </p:txBody>
       </p:sp>
       <p:sp>
         <p:nvSpPr>
-          <p:cNvPr id="4" name="Footer Placeholder 3"/>
+          <p:cNvPr id="4" name="Slide Number Placeholder 3"/>
           <p:cNvSpPr>
             <a:spLocks noGrp="1"/>
           </p:cNvSpPr>
           <p:nvPr>
-            <p:ph type="ftr" sz="quarter" idx="10"/>
+            <p:ph type="sldNum" sz="quarter" idx="5"/>
           </p:nvPr>
         </p:nvSpPr>
         <p:spPr/>
@@ -9090,42 +9514,18 @@
           <a:bodyPr/>
           <a:lstStyle/>
           <a:p>
-            <a:r>
-              <a:rPr lang="en-US"/>
-              <a:t>© 2011 Microsoft Corporation    	Microsoft Confidential</a:t>
-            </a:r>
-            <a:endParaRPr lang="en-US" dirty="0"/>
-          </a:p>
-        </p:txBody>
-      </p:sp>
-      <p:sp>
-        <p:nvSpPr>
-          <p:cNvPr id="5" name="Slide Number Placeholder 4"/>
-          <p:cNvSpPr>
-            <a:spLocks noGrp="1"/>
-          </p:cNvSpPr>
-          <p:nvPr>
-            <p:ph type="sldNum" sz="quarter" idx="11"/>
-          </p:nvPr>
-        </p:nvSpPr>
-        <p:spPr/>
-        <p:txBody>
-          <a:bodyPr/>
-          <a:lstStyle/>
-          <a:p>
-            <a:fld id="{89920E16-7E2D-4061-8759-5F8497A7A433}" type="slidenum">
+            <a:fld id="{7F7719C4-5CCB-4564-8DFB-21D3D1DEC7F1}" type="slidenum">
               <a:rPr lang="en-US" smtClean="0"/>
-              <a:pPr/>
-              <a:t>20</a:t>
+              <a:t>8</a:t>
             </a:fld>
-            <a:endParaRPr lang="en-US" dirty="0"/>
+            <a:endParaRPr lang="en-US"/>
           </a:p>
         </p:txBody>
       </p:sp>
     </p:spTree>
     <p:extLst>
       <p:ext uri="{BB962C8B-B14F-4D97-AF65-F5344CB8AC3E}">
-        <p14:creationId xmlns:p14="http://schemas.microsoft.com/office/powerpoint/2010/main" val="823909644"/>
+        <p14:creationId xmlns:p14="http://schemas.microsoft.com/office/powerpoint/2010/main" val="2605837593"/>
       </p:ext>
     </p:extLst>
   </p:cSld>
@@ -9179,163 +9579,356 @@
           <a:bodyPr/>
           <a:lstStyle/>
           <a:p>
-            <a:r>
-              <a:rPr lang="en-US" dirty="0"/>
-              <a:t>One </a:t>
-            </a:r>
-            <a:r>
-              <a:rPr lang="en-US" b="1" dirty="0"/>
-              <a:t>advantage</a:t>
-            </a:r>
-            <a:r>
-              <a:rPr lang="en-US" dirty="0"/>
-              <a:t> of using a </a:t>
-            </a:r>
-            <a:r>
-              <a:rPr lang="en-US" b="1" dirty="0"/>
-              <a:t>hybrid mode </a:t>
-            </a:r>
-            <a:r>
-              <a:rPr lang="en-US" dirty="0"/>
-              <a:t>is that you can serve clients that issue MDX queries (most of them) and clients that issue DAX queries (Crescent) from the same model. In Denali, only clients that issue DAX queries can use </a:t>
-            </a:r>
-            <a:r>
-              <a:rPr lang="en-US" dirty="0" err="1"/>
-              <a:t>DirectQuery</a:t>
-            </a:r>
-            <a:r>
-              <a:rPr lang="en-US" dirty="0"/>
-              <a:t>. Clients such as Excel which issue MDX queries must fetch results from the </a:t>
-            </a:r>
-            <a:r>
-              <a:rPr lang="en-US" dirty="0" err="1"/>
-              <a:t>VertiPaq</a:t>
-            </a:r>
-            <a:r>
-              <a:rPr lang="en-US" dirty="0"/>
-              <a:t> cache.</a:t>
-            </a:r>
+            <a:pPr algn="l">
+              <a:buFont typeface="+mj-lt"/>
+              <a:buAutoNum type="arabicPeriod"/>
+            </a:pPr>
+            <a:r>
+              <a:rPr lang="en-US" b="1" i="0" dirty="0" err="1">
+                <a:solidFill>
+                  <a:srgbClr val="000000"/>
+                </a:solidFill>
+                <a:effectLst/>
+                <a:latin typeface="Calibri" panose="020F0502020204030204" pitchFamily="34" charset="0"/>
+              </a:rPr>
+              <a:t>Vergleich</a:t>
+            </a:r>
+            <a:r>
+              <a:rPr lang="en-US" b="1" i="0" dirty="0">
+                <a:solidFill>
+                  <a:srgbClr val="000000"/>
+                </a:solidFill>
+                <a:effectLst/>
+                <a:latin typeface="Calibri" panose="020F0502020204030204" pitchFamily="34" charset="0"/>
+              </a:rPr>
+              <a:t> Tabular Model und Multidimensional Modelling (</a:t>
+            </a:r>
+            <a:r>
+              <a:rPr lang="en-US" b="1" i="0" dirty="0" err="1">
+                <a:solidFill>
+                  <a:srgbClr val="000000"/>
+                </a:solidFill>
+                <a:effectLst/>
+                <a:latin typeface="Calibri" panose="020F0502020204030204" pitchFamily="34" charset="0"/>
+              </a:rPr>
+              <a:t>Vorteile</a:t>
+            </a:r>
+            <a:r>
+              <a:rPr lang="en-US" b="1" i="0" dirty="0">
+                <a:solidFill>
+                  <a:srgbClr val="000000"/>
+                </a:solidFill>
+                <a:effectLst/>
+                <a:latin typeface="Calibri" panose="020F0502020204030204" pitchFamily="34" charset="0"/>
+              </a:rPr>
+              <a:t>, </a:t>
+            </a:r>
+            <a:r>
+              <a:rPr lang="en-US" b="1" i="0" dirty="0" err="1">
+                <a:solidFill>
+                  <a:srgbClr val="000000"/>
+                </a:solidFill>
+                <a:effectLst/>
+                <a:latin typeface="Calibri" panose="020F0502020204030204" pitchFamily="34" charset="0"/>
+              </a:rPr>
+              <a:t>Nachteile</a:t>
+            </a:r>
+            <a:r>
+              <a:rPr lang="en-US" b="1" i="0" dirty="0">
+                <a:solidFill>
+                  <a:srgbClr val="000000"/>
+                </a:solidFill>
+                <a:effectLst/>
+                <a:latin typeface="Calibri" panose="020F0502020204030204" pitchFamily="34" charset="0"/>
+              </a:rPr>
+              <a:t>, </a:t>
+            </a:r>
+            <a:r>
+              <a:rPr lang="en-US" b="1" i="0" dirty="0" err="1">
+                <a:solidFill>
+                  <a:srgbClr val="000000"/>
+                </a:solidFill>
+                <a:effectLst/>
+                <a:latin typeface="Calibri" panose="020F0502020204030204" pitchFamily="34" charset="0"/>
+              </a:rPr>
+              <a:t>Limitierungen</a:t>
+            </a:r>
+            <a:r>
+              <a:rPr lang="en-US" b="1" i="0" dirty="0">
+                <a:solidFill>
+                  <a:srgbClr val="000000"/>
+                </a:solidFill>
+                <a:effectLst/>
+                <a:latin typeface="Calibri" panose="020F0502020204030204" pitchFamily="34" charset="0"/>
+              </a:rPr>
+              <a:t>)</a:t>
+            </a:r>
+            <a:endParaRPr lang="en-US" b="0" i="0" dirty="0">
+              <a:solidFill>
+                <a:srgbClr val="000000"/>
+              </a:solidFill>
+              <a:effectLst/>
+              <a:latin typeface="Calibri" panose="020F0502020204030204" pitchFamily="34" charset="0"/>
+            </a:endParaRPr>
+          </a:p>
+          <a:p>
+            <a:pPr algn="l">
+              <a:buFont typeface="+mj-lt"/>
+              <a:buAutoNum type="arabicPeriod"/>
+            </a:pPr>
+            <a:r>
+              <a:rPr lang="en-US" b="1" i="0" dirty="0">
+                <a:solidFill>
+                  <a:srgbClr val="000000"/>
+                </a:solidFill>
+                <a:effectLst/>
+                <a:latin typeface="Calibri" panose="020F0502020204030204" pitchFamily="34" charset="0"/>
+              </a:rPr>
+              <a:t>Row Level Security </a:t>
+            </a:r>
+            <a:r>
+              <a:rPr lang="en-US" b="1" i="0" dirty="0" err="1">
+                <a:solidFill>
+                  <a:srgbClr val="000000"/>
+                </a:solidFill>
+                <a:effectLst/>
+                <a:latin typeface="Calibri" panose="020F0502020204030204" pitchFamily="34" charset="0"/>
+              </a:rPr>
+              <a:t>im</a:t>
+            </a:r>
+            <a:r>
+              <a:rPr lang="en-US" b="1" i="0" dirty="0">
+                <a:solidFill>
+                  <a:srgbClr val="000000"/>
+                </a:solidFill>
+                <a:effectLst/>
+                <a:latin typeface="Calibri" panose="020F0502020204030204" pitchFamily="34" charset="0"/>
+              </a:rPr>
+              <a:t> SQL Server und </a:t>
+            </a:r>
+            <a:r>
+              <a:rPr lang="en-US" b="1" i="0" dirty="0" err="1">
+                <a:solidFill>
+                  <a:srgbClr val="000000"/>
+                </a:solidFill>
+                <a:effectLst/>
+                <a:latin typeface="Calibri" panose="020F0502020204030204" pitchFamily="34" charset="0"/>
+              </a:rPr>
+              <a:t>im</a:t>
+            </a:r>
+            <a:r>
+              <a:rPr lang="en-US" b="1" i="0" dirty="0">
+                <a:solidFill>
+                  <a:srgbClr val="000000"/>
+                </a:solidFill>
+                <a:effectLst/>
+                <a:latin typeface="Calibri" panose="020F0502020204030204" pitchFamily="34" charset="0"/>
+              </a:rPr>
+              <a:t> Tabular Model </a:t>
+            </a:r>
+            <a:endParaRPr lang="en-US" b="0" i="0" dirty="0">
+              <a:solidFill>
+                <a:srgbClr val="000000"/>
+              </a:solidFill>
+              <a:effectLst/>
+              <a:latin typeface="Calibri" panose="020F0502020204030204" pitchFamily="34" charset="0"/>
+            </a:endParaRPr>
+          </a:p>
+          <a:p>
+            <a:pPr algn="l">
+              <a:buFont typeface="+mj-lt"/>
+              <a:buAutoNum type="arabicPeriod"/>
+            </a:pPr>
+            <a:r>
+              <a:rPr lang="en-US" b="1" i="0" dirty="0">
+                <a:solidFill>
+                  <a:srgbClr val="000000"/>
+                </a:solidFill>
+                <a:effectLst/>
+                <a:latin typeface="Calibri" panose="020F0502020204030204" pitchFamily="34" charset="0"/>
+              </a:rPr>
+              <a:t>Direct Query Vs </a:t>
+            </a:r>
+            <a:r>
+              <a:rPr lang="en-US" b="1" i="0" dirty="0" err="1">
+                <a:solidFill>
+                  <a:srgbClr val="000000"/>
+                </a:solidFill>
+                <a:effectLst/>
+                <a:latin typeface="Calibri" panose="020F0502020204030204" pitchFamily="34" charset="0"/>
+              </a:rPr>
+              <a:t>InMemory</a:t>
+            </a:r>
+            <a:endParaRPr lang="en-US" b="0" i="0" dirty="0">
+              <a:solidFill>
+                <a:srgbClr val="000000"/>
+              </a:solidFill>
+              <a:effectLst/>
+              <a:latin typeface="Calibri" panose="020F0502020204030204" pitchFamily="34" charset="0"/>
+            </a:endParaRPr>
+          </a:p>
+          <a:p>
+            <a:pPr algn="l">
+              <a:buFont typeface="+mj-lt"/>
+              <a:buAutoNum type="arabicPeriod"/>
+            </a:pPr>
+            <a:r>
+              <a:rPr lang="en-US" b="1" i="0" dirty="0">
+                <a:solidFill>
+                  <a:srgbClr val="000000"/>
+                </a:solidFill>
+                <a:effectLst/>
+                <a:latin typeface="Calibri" panose="020F0502020204030204" pitchFamily="34" charset="0"/>
+              </a:rPr>
+              <a:t>Processing Options</a:t>
+            </a:r>
+            <a:endParaRPr lang="en-US" b="0" i="0" dirty="0">
+              <a:solidFill>
+                <a:srgbClr val="000000"/>
+              </a:solidFill>
+              <a:effectLst/>
+              <a:latin typeface="Calibri" panose="020F0502020204030204" pitchFamily="34" charset="0"/>
+            </a:endParaRPr>
+          </a:p>
+          <a:p>
+            <a:pPr algn="l">
+              <a:buFont typeface="+mj-lt"/>
+              <a:buAutoNum type="arabicPeriod"/>
+            </a:pPr>
+            <a:r>
+              <a:rPr lang="en-US" b="1" i="0" dirty="0">
+                <a:solidFill>
+                  <a:srgbClr val="000000"/>
+                </a:solidFill>
+                <a:effectLst/>
+                <a:latin typeface="Calibri" panose="020F0502020204030204" pitchFamily="34" charset="0"/>
+              </a:rPr>
+              <a:t>Deployment </a:t>
+            </a:r>
+            <a:r>
+              <a:rPr lang="en-US" b="1" i="0" dirty="0" err="1">
+                <a:solidFill>
+                  <a:srgbClr val="000000"/>
+                </a:solidFill>
+                <a:effectLst/>
+                <a:latin typeface="Calibri" panose="020F0502020204030204" pitchFamily="34" charset="0"/>
+              </a:rPr>
+              <a:t>Optionen</a:t>
+            </a:r>
+            <a:r>
+              <a:rPr lang="en-US" b="1" i="0" dirty="0">
+                <a:solidFill>
+                  <a:srgbClr val="000000"/>
+                </a:solidFill>
+                <a:effectLst/>
+                <a:latin typeface="Calibri" panose="020F0502020204030204" pitchFamily="34" charset="0"/>
+              </a:rPr>
+              <a:t> (OnPrem </a:t>
+            </a:r>
+            <a:r>
+              <a:rPr lang="en-US" b="1" i="0" dirty="0" err="1">
+                <a:solidFill>
+                  <a:srgbClr val="000000"/>
+                </a:solidFill>
+                <a:effectLst/>
+                <a:latin typeface="Calibri" panose="020F0502020204030204" pitchFamily="34" charset="0"/>
+              </a:rPr>
+              <a:t>Dienst</a:t>
+            </a:r>
+            <a:r>
+              <a:rPr lang="en-US" b="1" i="0" dirty="0">
+                <a:solidFill>
+                  <a:srgbClr val="000000"/>
+                </a:solidFill>
+                <a:effectLst/>
+                <a:latin typeface="Calibri" panose="020F0502020204030204" pitchFamily="34" charset="0"/>
+              </a:rPr>
+              <a:t> / Azure) </a:t>
+            </a:r>
+            <a:endParaRPr lang="en-US" b="0" i="0" dirty="0">
+              <a:solidFill>
+                <a:srgbClr val="000000"/>
+              </a:solidFill>
+              <a:effectLst/>
+              <a:latin typeface="Calibri" panose="020F0502020204030204" pitchFamily="34" charset="0"/>
+            </a:endParaRPr>
+          </a:p>
+          <a:p>
+            <a:pPr algn="l">
+              <a:buFont typeface="+mj-lt"/>
+              <a:buAutoNum type="arabicPeriod"/>
+            </a:pPr>
+            <a:r>
+              <a:rPr lang="en-US" b="1" i="0" dirty="0">
+                <a:solidFill>
+                  <a:srgbClr val="000000"/>
+                </a:solidFill>
+                <a:effectLst/>
+                <a:latin typeface="Calibri" panose="020F0502020204030204" pitchFamily="34" charset="0"/>
+              </a:rPr>
+              <a:t>Eine </a:t>
+            </a:r>
+            <a:r>
+              <a:rPr lang="en-US" b="1" i="0" dirty="0" err="1">
+                <a:solidFill>
+                  <a:srgbClr val="000000"/>
+                </a:solidFill>
+                <a:effectLst/>
+                <a:latin typeface="Calibri" panose="020F0502020204030204" pitchFamily="34" charset="0"/>
+              </a:rPr>
+              <a:t>kurze</a:t>
+            </a:r>
+            <a:r>
+              <a:rPr lang="en-US" b="1" i="0" dirty="0">
+                <a:solidFill>
+                  <a:srgbClr val="000000"/>
+                </a:solidFill>
+                <a:effectLst/>
+                <a:latin typeface="Calibri" panose="020F0502020204030204" pitchFamily="34" charset="0"/>
+              </a:rPr>
+              <a:t> </a:t>
+            </a:r>
+            <a:r>
+              <a:rPr lang="en-US" b="1" i="0" dirty="0" err="1">
+                <a:solidFill>
+                  <a:srgbClr val="000000"/>
+                </a:solidFill>
+                <a:effectLst/>
+                <a:latin typeface="Calibri" panose="020F0502020204030204" pitchFamily="34" charset="0"/>
+              </a:rPr>
+              <a:t>Einführung</a:t>
+            </a:r>
+            <a:r>
+              <a:rPr lang="en-US" b="1" i="0" dirty="0">
+                <a:solidFill>
+                  <a:srgbClr val="000000"/>
+                </a:solidFill>
+                <a:effectLst/>
+                <a:latin typeface="Calibri" panose="020F0502020204030204" pitchFamily="34" charset="0"/>
+              </a:rPr>
+              <a:t> in DAX</a:t>
+            </a:r>
+            <a:endParaRPr lang="en-US" b="0" i="0" dirty="0">
+              <a:solidFill>
+                <a:srgbClr val="000000"/>
+              </a:solidFill>
+              <a:effectLst/>
+              <a:latin typeface="Calibri" panose="020F0502020204030204" pitchFamily="34" charset="0"/>
+            </a:endParaRPr>
           </a:p>
           <a:p>
             <a:endParaRPr lang="en-US" dirty="0"/>
-          </a:p>
-          <a:p>
-            <a:r>
-              <a:rPr lang="en-US" dirty="0"/>
-              <a:t>One </a:t>
-            </a:r>
-            <a:r>
-              <a:rPr lang="en-US" b="1" dirty="0"/>
-              <a:t>disadvantage</a:t>
-            </a:r>
-            <a:r>
-              <a:rPr lang="en-US" dirty="0"/>
-              <a:t> – if you have a hybrid mode, you must process the database. If your data doesn’t fit in memory, you have a problem.</a:t>
-            </a:r>
-          </a:p>
-          <a:p>
-            <a:endParaRPr lang="de-DE" dirty="0"/>
-          </a:p>
-          <a:p>
-            <a:endParaRPr lang="de-DE" dirty="0"/>
-          </a:p>
-          <a:p>
-            <a:r>
-              <a:rPr lang="en-US" dirty="0"/>
-              <a:t>The </a:t>
-            </a:r>
-            <a:r>
-              <a:rPr lang="en-US" b="1" dirty="0"/>
-              <a:t>connection string </a:t>
-            </a:r>
-            <a:r>
-              <a:rPr lang="en-US" dirty="0"/>
-              <a:t>you would use </a:t>
-            </a:r>
-            <a:r>
-              <a:rPr lang="en-US" b="1" dirty="0"/>
-              <a:t>in Excel </a:t>
-            </a:r>
-            <a:r>
-              <a:rPr lang="en-US" dirty="0"/>
-              <a:t>is something like:</a:t>
-            </a:r>
-          </a:p>
-          <a:p>
-            <a:endParaRPr lang="en-US" dirty="0"/>
-          </a:p>
-          <a:p>
-            <a:r>
-              <a:rPr lang="en-US" dirty="0"/>
-              <a:t>Provider=MSOLAP.5;Integrated Security=</a:t>
-            </a:r>
-            <a:r>
-              <a:rPr lang="en-US" dirty="0" err="1"/>
-              <a:t>SSPI;Persist</a:t>
-            </a:r>
-            <a:r>
-              <a:rPr lang="en-US" dirty="0"/>
-              <a:t> Security Info=</a:t>
-            </a:r>
-            <a:r>
-              <a:rPr lang="en-US" dirty="0" err="1"/>
-              <a:t>True;Data</a:t>
-            </a:r>
-            <a:r>
-              <a:rPr lang="en-US" dirty="0"/>
-              <a:t> Source=.;Initial Catalog=</a:t>
-            </a:r>
-            <a:r>
-              <a:rPr lang="en-US" dirty="0" err="1"/>
-              <a:t>DirectQuery</a:t>
-            </a:r>
-            <a:r>
-              <a:rPr lang="en-US" dirty="0"/>
-              <a:t> </a:t>
-            </a:r>
-            <a:r>
-              <a:rPr lang="en-US" dirty="0" err="1"/>
-              <a:t>test;</a:t>
-            </a:r>
-            <a:r>
-              <a:rPr lang="en-US" b="1" dirty="0" err="1">
-                <a:effectLst/>
-              </a:rPr>
-              <a:t>DirectQueryMode</a:t>
-            </a:r>
-            <a:r>
-              <a:rPr lang="en-US" b="1" dirty="0">
-                <a:effectLst/>
-              </a:rPr>
-              <a:t>=</a:t>
-            </a:r>
-            <a:r>
-              <a:rPr lang="en-US" b="1" dirty="0" err="1">
-                <a:effectLst/>
-              </a:rPr>
-              <a:t>InMemory</a:t>
-            </a:r>
-            <a:r>
-              <a:rPr lang="en-US" dirty="0">
-                <a:effectLst/>
-              </a:rPr>
-              <a:t>;</a:t>
-            </a:r>
-            <a:endParaRPr lang="en-US" dirty="0"/>
-          </a:p>
-          <a:p>
-            <a:endParaRPr lang="de-DE" dirty="0"/>
           </a:p>
         </p:txBody>
       </p:sp>
       <p:sp>
         <p:nvSpPr>
-          <p:cNvPr id="4" name="Footer Placeholder 3"/>
+          <p:cNvPr id="4" name="Slide Number Placeholder 3"/>
           <p:cNvSpPr>
             <a:spLocks noGrp="1"/>
           </p:cNvSpPr>
           <p:nvPr>
-            <p:ph type="ftr" sz="quarter" idx="10"/>
+            <p:ph type="sldNum" sz="quarter" idx="5"/>
           </p:nvPr>
         </p:nvSpPr>
         <p:spPr/>
@@ -9343,42 +9936,18 @@
           <a:bodyPr/>
           <a:lstStyle/>
           <a:p>
-            <a:r>
-              <a:rPr lang="en-US"/>
-              <a:t>© 2011 Microsoft Corporation    	Microsoft Confidential</a:t>
-            </a:r>
-            <a:endParaRPr lang="en-US" dirty="0"/>
-          </a:p>
-        </p:txBody>
-      </p:sp>
-      <p:sp>
-        <p:nvSpPr>
-          <p:cNvPr id="5" name="Slide Number Placeholder 4"/>
-          <p:cNvSpPr>
-            <a:spLocks noGrp="1"/>
-          </p:cNvSpPr>
-          <p:nvPr>
-            <p:ph type="sldNum" sz="quarter" idx="11"/>
-          </p:nvPr>
-        </p:nvSpPr>
-        <p:spPr/>
-        <p:txBody>
-          <a:bodyPr/>
-          <a:lstStyle/>
-          <a:p>
-            <a:fld id="{89920E16-7E2D-4061-8759-5F8497A7A433}" type="slidenum">
+            <a:fld id="{7F7719C4-5CCB-4564-8DFB-21D3D1DEC7F1}" type="slidenum">
               <a:rPr lang="en-US" smtClean="0"/>
-              <a:pPr/>
-              <a:t>21</a:t>
+              <a:t>18</a:t>
             </a:fld>
-            <a:endParaRPr lang="en-US" dirty="0"/>
+            <a:endParaRPr lang="en-US"/>
           </a:p>
         </p:txBody>
       </p:sp>
     </p:spTree>
     <p:extLst>
       <p:ext uri="{BB962C8B-B14F-4D97-AF65-F5344CB8AC3E}">
-        <p14:creationId xmlns:p14="http://schemas.microsoft.com/office/powerpoint/2010/main" val="1131725633"/>
+        <p14:creationId xmlns:p14="http://schemas.microsoft.com/office/powerpoint/2010/main" val="3907796195"/>
       </p:ext>
     </p:extLst>
   </p:cSld>
@@ -9432,356 +10001,18 @@
           <a:bodyPr/>
           <a:lstStyle/>
           <a:p>
-            <a:pPr algn="l">
-              <a:buFont typeface="+mj-lt"/>
-              <a:buAutoNum type="arabicPeriod"/>
-            </a:pPr>
-            <a:r>
-              <a:rPr lang="en-US" b="1" i="0" dirty="0" err="1">
-                <a:solidFill>
-                  <a:srgbClr val="000000"/>
-                </a:solidFill>
-                <a:effectLst/>
-                <a:latin typeface="Calibri" panose="020F0502020204030204" pitchFamily="34" charset="0"/>
-              </a:rPr>
-              <a:t>Vergleich</a:t>
-            </a:r>
-            <a:r>
-              <a:rPr lang="en-US" b="1" i="0" dirty="0">
-                <a:solidFill>
-                  <a:srgbClr val="000000"/>
-                </a:solidFill>
-                <a:effectLst/>
-                <a:latin typeface="Calibri" panose="020F0502020204030204" pitchFamily="34" charset="0"/>
-              </a:rPr>
-              <a:t> Tabular Model und Multidimensional Modelling (</a:t>
-            </a:r>
-            <a:r>
-              <a:rPr lang="en-US" b="1" i="0" dirty="0" err="1">
-                <a:solidFill>
-                  <a:srgbClr val="000000"/>
-                </a:solidFill>
-                <a:effectLst/>
-                <a:latin typeface="Calibri" panose="020F0502020204030204" pitchFamily="34" charset="0"/>
-              </a:rPr>
-              <a:t>Vorteile</a:t>
-            </a:r>
-            <a:r>
-              <a:rPr lang="en-US" b="1" i="0" dirty="0">
-                <a:solidFill>
-                  <a:srgbClr val="000000"/>
-                </a:solidFill>
-                <a:effectLst/>
-                <a:latin typeface="Calibri" panose="020F0502020204030204" pitchFamily="34" charset="0"/>
-              </a:rPr>
-              <a:t>, </a:t>
-            </a:r>
-            <a:r>
-              <a:rPr lang="en-US" b="1" i="0" dirty="0" err="1">
-                <a:solidFill>
-                  <a:srgbClr val="000000"/>
-                </a:solidFill>
-                <a:effectLst/>
-                <a:latin typeface="Calibri" panose="020F0502020204030204" pitchFamily="34" charset="0"/>
-              </a:rPr>
-              <a:t>Nachteile</a:t>
-            </a:r>
-            <a:r>
-              <a:rPr lang="en-US" b="1" i="0" dirty="0">
-                <a:solidFill>
-                  <a:srgbClr val="000000"/>
-                </a:solidFill>
-                <a:effectLst/>
-                <a:latin typeface="Calibri" panose="020F0502020204030204" pitchFamily="34" charset="0"/>
-              </a:rPr>
-              <a:t>, </a:t>
-            </a:r>
-            <a:r>
-              <a:rPr lang="en-US" b="1" i="0" dirty="0" err="1">
-                <a:solidFill>
-                  <a:srgbClr val="000000"/>
-                </a:solidFill>
-                <a:effectLst/>
-                <a:latin typeface="Calibri" panose="020F0502020204030204" pitchFamily="34" charset="0"/>
-              </a:rPr>
-              <a:t>Limitierungen</a:t>
-            </a:r>
-            <a:r>
-              <a:rPr lang="en-US" b="1" i="0" dirty="0">
-                <a:solidFill>
-                  <a:srgbClr val="000000"/>
-                </a:solidFill>
-                <a:effectLst/>
-                <a:latin typeface="Calibri" panose="020F0502020204030204" pitchFamily="34" charset="0"/>
-              </a:rPr>
-              <a:t>)</a:t>
-            </a:r>
-            <a:endParaRPr lang="en-US" b="0" i="0" dirty="0">
-              <a:solidFill>
-                <a:srgbClr val="000000"/>
-              </a:solidFill>
-              <a:effectLst/>
-              <a:latin typeface="Calibri" panose="020F0502020204030204" pitchFamily="34" charset="0"/>
-            </a:endParaRPr>
-          </a:p>
-          <a:p>
-            <a:pPr algn="l">
-              <a:buFont typeface="+mj-lt"/>
-              <a:buAutoNum type="arabicPeriod"/>
-            </a:pPr>
-            <a:r>
-              <a:rPr lang="en-US" b="1" i="0" dirty="0">
-                <a:solidFill>
-                  <a:srgbClr val="000000"/>
-                </a:solidFill>
-                <a:effectLst/>
-                <a:latin typeface="Calibri" panose="020F0502020204030204" pitchFamily="34" charset="0"/>
-              </a:rPr>
-              <a:t>Row Level Security </a:t>
-            </a:r>
-            <a:r>
-              <a:rPr lang="en-US" b="1" i="0" dirty="0" err="1">
-                <a:solidFill>
-                  <a:srgbClr val="000000"/>
-                </a:solidFill>
-                <a:effectLst/>
-                <a:latin typeface="Calibri" panose="020F0502020204030204" pitchFamily="34" charset="0"/>
-              </a:rPr>
-              <a:t>im</a:t>
-            </a:r>
-            <a:r>
-              <a:rPr lang="en-US" b="1" i="0" dirty="0">
-                <a:solidFill>
-                  <a:srgbClr val="000000"/>
-                </a:solidFill>
-                <a:effectLst/>
-                <a:latin typeface="Calibri" panose="020F0502020204030204" pitchFamily="34" charset="0"/>
-              </a:rPr>
-              <a:t> SQL Server und </a:t>
-            </a:r>
-            <a:r>
-              <a:rPr lang="en-US" b="1" i="0" dirty="0" err="1">
-                <a:solidFill>
-                  <a:srgbClr val="000000"/>
-                </a:solidFill>
-                <a:effectLst/>
-                <a:latin typeface="Calibri" panose="020F0502020204030204" pitchFamily="34" charset="0"/>
-              </a:rPr>
-              <a:t>im</a:t>
-            </a:r>
-            <a:r>
-              <a:rPr lang="en-US" b="1" i="0" dirty="0">
-                <a:solidFill>
-                  <a:srgbClr val="000000"/>
-                </a:solidFill>
-                <a:effectLst/>
-                <a:latin typeface="Calibri" panose="020F0502020204030204" pitchFamily="34" charset="0"/>
-              </a:rPr>
-              <a:t> Tabular Model </a:t>
-            </a:r>
-            <a:endParaRPr lang="en-US" b="0" i="0" dirty="0">
-              <a:solidFill>
-                <a:srgbClr val="000000"/>
-              </a:solidFill>
-              <a:effectLst/>
-              <a:latin typeface="Calibri" panose="020F0502020204030204" pitchFamily="34" charset="0"/>
-            </a:endParaRPr>
-          </a:p>
-          <a:p>
-            <a:pPr algn="l">
-              <a:buFont typeface="+mj-lt"/>
-              <a:buAutoNum type="arabicPeriod"/>
-            </a:pPr>
-            <a:r>
-              <a:rPr lang="en-US" b="1" i="0" dirty="0">
-                <a:solidFill>
-                  <a:srgbClr val="000000"/>
-                </a:solidFill>
-                <a:effectLst/>
-                <a:latin typeface="Calibri" panose="020F0502020204030204" pitchFamily="34" charset="0"/>
-              </a:rPr>
-              <a:t>Direct Query Vs </a:t>
-            </a:r>
-            <a:r>
-              <a:rPr lang="en-US" b="1" i="0" dirty="0" err="1">
-                <a:solidFill>
-                  <a:srgbClr val="000000"/>
-                </a:solidFill>
-                <a:effectLst/>
-                <a:latin typeface="Calibri" panose="020F0502020204030204" pitchFamily="34" charset="0"/>
-              </a:rPr>
-              <a:t>InMemory</a:t>
-            </a:r>
-            <a:endParaRPr lang="en-US" b="0" i="0" dirty="0">
-              <a:solidFill>
-                <a:srgbClr val="000000"/>
-              </a:solidFill>
-              <a:effectLst/>
-              <a:latin typeface="Calibri" panose="020F0502020204030204" pitchFamily="34" charset="0"/>
-            </a:endParaRPr>
-          </a:p>
-          <a:p>
-            <a:pPr algn="l">
-              <a:buFont typeface="+mj-lt"/>
-              <a:buAutoNum type="arabicPeriod"/>
-            </a:pPr>
-            <a:r>
-              <a:rPr lang="en-US" b="1" i="0" dirty="0">
-                <a:solidFill>
-                  <a:srgbClr val="000000"/>
-                </a:solidFill>
-                <a:effectLst/>
-                <a:latin typeface="Calibri" panose="020F0502020204030204" pitchFamily="34" charset="0"/>
-              </a:rPr>
-              <a:t>Processing Options</a:t>
-            </a:r>
-            <a:endParaRPr lang="en-US" b="0" i="0" dirty="0">
-              <a:solidFill>
-                <a:srgbClr val="000000"/>
-              </a:solidFill>
-              <a:effectLst/>
-              <a:latin typeface="Calibri" panose="020F0502020204030204" pitchFamily="34" charset="0"/>
-            </a:endParaRPr>
-          </a:p>
-          <a:p>
-            <a:pPr algn="l">
-              <a:buFont typeface="+mj-lt"/>
-              <a:buAutoNum type="arabicPeriod"/>
-            </a:pPr>
-            <a:r>
-              <a:rPr lang="en-US" b="1" i="0" dirty="0">
-                <a:solidFill>
-                  <a:srgbClr val="000000"/>
-                </a:solidFill>
-                <a:effectLst/>
-                <a:latin typeface="Calibri" panose="020F0502020204030204" pitchFamily="34" charset="0"/>
-              </a:rPr>
-              <a:t>Deployment </a:t>
-            </a:r>
-            <a:r>
-              <a:rPr lang="en-US" b="1" i="0" dirty="0" err="1">
-                <a:solidFill>
-                  <a:srgbClr val="000000"/>
-                </a:solidFill>
-                <a:effectLst/>
-                <a:latin typeface="Calibri" panose="020F0502020204030204" pitchFamily="34" charset="0"/>
-              </a:rPr>
-              <a:t>Optionen</a:t>
-            </a:r>
-            <a:r>
-              <a:rPr lang="en-US" b="1" i="0" dirty="0">
-                <a:solidFill>
-                  <a:srgbClr val="000000"/>
-                </a:solidFill>
-                <a:effectLst/>
-                <a:latin typeface="Calibri" panose="020F0502020204030204" pitchFamily="34" charset="0"/>
-              </a:rPr>
-              <a:t> (OnPrem </a:t>
-            </a:r>
-            <a:r>
-              <a:rPr lang="en-US" b="1" i="0" dirty="0" err="1">
-                <a:solidFill>
-                  <a:srgbClr val="000000"/>
-                </a:solidFill>
-                <a:effectLst/>
-                <a:latin typeface="Calibri" panose="020F0502020204030204" pitchFamily="34" charset="0"/>
-              </a:rPr>
-              <a:t>Dienst</a:t>
-            </a:r>
-            <a:r>
-              <a:rPr lang="en-US" b="1" i="0" dirty="0">
-                <a:solidFill>
-                  <a:srgbClr val="000000"/>
-                </a:solidFill>
-                <a:effectLst/>
-                <a:latin typeface="Calibri" panose="020F0502020204030204" pitchFamily="34" charset="0"/>
-              </a:rPr>
-              <a:t> / Azure) </a:t>
-            </a:r>
-            <a:endParaRPr lang="en-US" b="0" i="0" dirty="0">
-              <a:solidFill>
-                <a:srgbClr val="000000"/>
-              </a:solidFill>
-              <a:effectLst/>
-              <a:latin typeface="Calibri" panose="020F0502020204030204" pitchFamily="34" charset="0"/>
-            </a:endParaRPr>
-          </a:p>
-          <a:p>
-            <a:pPr algn="l">
-              <a:buFont typeface="+mj-lt"/>
-              <a:buAutoNum type="arabicPeriod"/>
-            </a:pPr>
-            <a:r>
-              <a:rPr lang="en-US" b="1" i="0" dirty="0">
-                <a:solidFill>
-                  <a:srgbClr val="000000"/>
-                </a:solidFill>
-                <a:effectLst/>
-                <a:latin typeface="Calibri" panose="020F0502020204030204" pitchFamily="34" charset="0"/>
-              </a:rPr>
-              <a:t>Eine </a:t>
-            </a:r>
-            <a:r>
-              <a:rPr lang="en-US" b="1" i="0" dirty="0" err="1">
-                <a:solidFill>
-                  <a:srgbClr val="000000"/>
-                </a:solidFill>
-                <a:effectLst/>
-                <a:latin typeface="Calibri" panose="020F0502020204030204" pitchFamily="34" charset="0"/>
-              </a:rPr>
-              <a:t>kurze</a:t>
-            </a:r>
-            <a:r>
-              <a:rPr lang="en-US" b="1" i="0" dirty="0">
-                <a:solidFill>
-                  <a:srgbClr val="000000"/>
-                </a:solidFill>
-                <a:effectLst/>
-                <a:latin typeface="Calibri" panose="020F0502020204030204" pitchFamily="34" charset="0"/>
-              </a:rPr>
-              <a:t> </a:t>
-            </a:r>
-            <a:r>
-              <a:rPr lang="en-US" b="1" i="0" dirty="0" err="1">
-                <a:solidFill>
-                  <a:srgbClr val="000000"/>
-                </a:solidFill>
-                <a:effectLst/>
-                <a:latin typeface="Calibri" panose="020F0502020204030204" pitchFamily="34" charset="0"/>
-              </a:rPr>
-              <a:t>Einführung</a:t>
-            </a:r>
-            <a:r>
-              <a:rPr lang="en-US" b="1" i="0" dirty="0">
-                <a:solidFill>
-                  <a:srgbClr val="000000"/>
-                </a:solidFill>
-                <a:effectLst/>
-                <a:latin typeface="Calibri" panose="020F0502020204030204" pitchFamily="34" charset="0"/>
-              </a:rPr>
-              <a:t> in DAX</a:t>
-            </a:r>
-            <a:endParaRPr lang="en-US" b="0" i="0" dirty="0">
-              <a:solidFill>
-                <a:srgbClr val="000000"/>
-              </a:solidFill>
-              <a:effectLst/>
-              <a:latin typeface="Calibri" panose="020F0502020204030204" pitchFamily="34" charset="0"/>
-            </a:endParaRPr>
-          </a:p>
-          <a:p>
-            <a:endParaRPr lang="en-US" dirty="0"/>
+            <a:endParaRPr lang="de-DE" dirty="0"/>
           </a:p>
         </p:txBody>
       </p:sp>
       <p:sp>
         <p:nvSpPr>
-          <p:cNvPr id="4" name="Slide Number Placeholder 3"/>
+          <p:cNvPr id="4" name="Footer Placeholder 3"/>
           <p:cNvSpPr>
             <a:spLocks noGrp="1"/>
           </p:cNvSpPr>
           <p:nvPr>
-            <p:ph type="sldNum" sz="quarter" idx="5"/>
+            <p:ph type="ftr" sz="quarter" idx="10"/>
           </p:nvPr>
         </p:nvSpPr>
         <p:spPr/>
@@ -9789,18 +10020,42 @@
           <a:bodyPr/>
           <a:lstStyle/>
           <a:p>
-            <a:fld id="{7F7719C4-5CCB-4564-8DFB-21D3D1DEC7F1}" type="slidenum">
+            <a:r>
+              <a:rPr lang="en-US"/>
+              <a:t>© 2011 Microsoft Corporation    	Microsoft Confidential</a:t>
+            </a:r>
+            <a:endParaRPr lang="en-US" dirty="0"/>
+          </a:p>
+        </p:txBody>
+      </p:sp>
+      <p:sp>
+        <p:nvSpPr>
+          <p:cNvPr id="5" name="Slide Number Placeholder 4"/>
+          <p:cNvSpPr>
+            <a:spLocks noGrp="1"/>
+          </p:cNvSpPr>
+          <p:nvPr>
+            <p:ph type="sldNum" sz="quarter" idx="11"/>
+          </p:nvPr>
+        </p:nvSpPr>
+        <p:spPr/>
+        <p:txBody>
+          <a:bodyPr/>
+          <a:lstStyle/>
+          <a:p>
+            <a:fld id="{89920E16-7E2D-4061-8759-5F8497A7A433}" type="slidenum">
               <a:rPr lang="en-US" smtClean="0"/>
-              <a:t>22</a:t>
+              <a:pPr/>
+              <a:t>20</a:t>
             </a:fld>
-            <a:endParaRPr lang="en-US"/>
+            <a:endParaRPr lang="en-US" dirty="0"/>
           </a:p>
         </p:txBody>
       </p:sp>
     </p:spTree>
     <p:extLst>
       <p:ext uri="{BB962C8B-B14F-4D97-AF65-F5344CB8AC3E}">
-        <p14:creationId xmlns:p14="http://schemas.microsoft.com/office/powerpoint/2010/main" val="483413036"/>
+        <p14:creationId xmlns:p14="http://schemas.microsoft.com/office/powerpoint/2010/main" val="823909644"/>
       </p:ext>
     </p:extLst>
   </p:cSld>
@@ -9957,7 +10212,7 @@
           <a:p>
             <a:fld id="{36C38877-F049-4D72-8548-4E2DCAD5C327}" type="datetimeFigureOut">
               <a:rPr lang="en-US" smtClean="0"/>
-              <a:t>10/19/2020</a:t>
+              <a:t>10/20/2020</a:t>
             </a:fld>
             <a:endParaRPr lang="en-US"/>
           </a:p>
@@ -10011,7 +10266,7 @@
           <a:p>
             <a:fld id="{4173581D-C70C-4C40-9FB5-8923DA202D44}" type="slidenum">
               <a:rPr lang="en-US" smtClean="0"/>
-              <a:t>‹#›</a:t>
+              <a:t>‹Nr.›</a:t>
             </a:fld>
             <a:endParaRPr lang="en-US"/>
           </a:p>
@@ -10155,7 +10410,7 @@
           <a:p>
             <a:fld id="{36C38877-F049-4D72-8548-4E2DCAD5C327}" type="datetimeFigureOut">
               <a:rPr lang="en-US" smtClean="0"/>
-              <a:t>10/19/2020</a:t>
+              <a:t>10/20/2020</a:t>
             </a:fld>
             <a:endParaRPr lang="en-US"/>
           </a:p>
@@ -10209,7 +10464,7 @@
           <a:p>
             <a:fld id="{4173581D-C70C-4C40-9FB5-8923DA202D44}" type="slidenum">
               <a:rPr lang="en-US" smtClean="0"/>
-              <a:t>‹#›</a:t>
+              <a:t>‹Nr.›</a:t>
             </a:fld>
             <a:endParaRPr lang="en-US"/>
           </a:p>
@@ -10363,7 +10618,7 @@
           <a:p>
             <a:fld id="{36C38877-F049-4D72-8548-4E2DCAD5C327}" type="datetimeFigureOut">
               <a:rPr lang="en-US" smtClean="0"/>
-              <a:t>10/19/2020</a:t>
+              <a:t>10/20/2020</a:t>
             </a:fld>
             <a:endParaRPr lang="en-US"/>
           </a:p>
@@ -10417,7 +10672,7 @@
           <a:p>
             <a:fld id="{4173581D-C70C-4C40-9FB5-8923DA202D44}" type="slidenum">
               <a:rPr lang="en-US" smtClean="0"/>
-              <a:t>‹#›</a:t>
+              <a:t>‹Nr.›</a:t>
             </a:fld>
             <a:endParaRPr lang="en-US"/>
           </a:p>
@@ -10769,7 +11024,7 @@
                 </a:solidFill>
               </a:rPr>
               <a:pPr/>
-              <a:t>‹#›</a:t>
+              <a:t>‹Nr.›</a:t>
             </a:fld>
             <a:endParaRPr lang="en-US" dirty="0">
               <a:solidFill>
@@ -10957,7 +11212,7 @@
           <a:p>
             <a:fld id="{36C38877-F049-4D72-8548-4E2DCAD5C327}" type="datetimeFigureOut">
               <a:rPr lang="en-US" smtClean="0"/>
-              <a:t>10/19/2020</a:t>
+              <a:t>10/20/2020</a:t>
             </a:fld>
             <a:endParaRPr lang="en-US"/>
           </a:p>
@@ -11011,7 +11266,7 @@
           <a:p>
             <a:fld id="{4173581D-C70C-4C40-9FB5-8923DA202D44}" type="slidenum">
               <a:rPr lang="en-US" smtClean="0"/>
-              <a:t>‹#›</a:t>
+              <a:t>‹Nr.›</a:t>
             </a:fld>
             <a:endParaRPr lang="en-US"/>
           </a:p>
@@ -11232,7 +11487,7 @@
           <a:p>
             <a:fld id="{36C38877-F049-4D72-8548-4E2DCAD5C327}" type="datetimeFigureOut">
               <a:rPr lang="en-US" smtClean="0"/>
-              <a:t>10/19/2020</a:t>
+              <a:t>10/20/2020</a:t>
             </a:fld>
             <a:endParaRPr lang="en-US"/>
           </a:p>
@@ -11286,7 +11541,7 @@
           <a:p>
             <a:fld id="{4173581D-C70C-4C40-9FB5-8923DA202D44}" type="slidenum">
               <a:rPr lang="en-US" smtClean="0"/>
-              <a:t>‹#›</a:t>
+              <a:t>‹Nr.›</a:t>
             </a:fld>
             <a:endParaRPr lang="en-US"/>
           </a:p>
@@ -11497,7 +11752,7 @@
           <a:p>
             <a:fld id="{36C38877-F049-4D72-8548-4E2DCAD5C327}" type="datetimeFigureOut">
               <a:rPr lang="en-US" smtClean="0"/>
-              <a:t>10/19/2020</a:t>
+              <a:t>10/20/2020</a:t>
             </a:fld>
             <a:endParaRPr lang="en-US"/>
           </a:p>
@@ -11551,7 +11806,7 @@
           <a:p>
             <a:fld id="{4173581D-C70C-4C40-9FB5-8923DA202D44}" type="slidenum">
               <a:rPr lang="en-US" smtClean="0"/>
-              <a:t>‹#›</a:t>
+              <a:t>‹Nr.›</a:t>
             </a:fld>
             <a:endParaRPr lang="en-US"/>
           </a:p>
@@ -11909,7 +12164,7 @@
           <a:p>
             <a:fld id="{36C38877-F049-4D72-8548-4E2DCAD5C327}" type="datetimeFigureOut">
               <a:rPr lang="en-US" smtClean="0"/>
-              <a:t>10/19/2020</a:t>
+              <a:t>10/20/2020</a:t>
             </a:fld>
             <a:endParaRPr lang="en-US"/>
           </a:p>
@@ -11963,7 +12218,7 @@
           <a:p>
             <a:fld id="{4173581D-C70C-4C40-9FB5-8923DA202D44}" type="slidenum">
               <a:rPr lang="en-US" smtClean="0"/>
-              <a:t>‹#›</a:t>
+              <a:t>‹Nr.›</a:t>
             </a:fld>
             <a:endParaRPr lang="en-US"/>
           </a:p>
@@ -12050,7 +12305,7 @@
           <a:p>
             <a:fld id="{36C38877-F049-4D72-8548-4E2DCAD5C327}" type="datetimeFigureOut">
               <a:rPr lang="en-US" smtClean="0"/>
-              <a:t>10/19/2020</a:t>
+              <a:t>10/20/2020</a:t>
             </a:fld>
             <a:endParaRPr lang="en-US"/>
           </a:p>
@@ -12104,7 +12359,7 @@
           <a:p>
             <a:fld id="{4173581D-C70C-4C40-9FB5-8923DA202D44}" type="slidenum">
               <a:rPr lang="en-US" smtClean="0"/>
-              <a:t>‹#›</a:t>
+              <a:t>‹Nr.›</a:t>
             </a:fld>
             <a:endParaRPr lang="en-US"/>
           </a:p>
@@ -12163,7 +12418,7 @@
           <a:p>
             <a:fld id="{36C38877-F049-4D72-8548-4E2DCAD5C327}" type="datetimeFigureOut">
               <a:rPr lang="en-US" smtClean="0"/>
-              <a:t>10/19/2020</a:t>
+              <a:t>10/20/2020</a:t>
             </a:fld>
             <a:endParaRPr lang="en-US"/>
           </a:p>
@@ -12217,7 +12472,7 @@
           <a:p>
             <a:fld id="{4173581D-C70C-4C40-9FB5-8923DA202D44}" type="slidenum">
               <a:rPr lang="en-US" smtClean="0"/>
-              <a:t>‹#›</a:t>
+              <a:t>‹Nr.›</a:t>
             </a:fld>
             <a:endParaRPr lang="en-US"/>
           </a:p>
@@ -12474,7 +12729,7 @@
           <a:p>
             <a:fld id="{36C38877-F049-4D72-8548-4E2DCAD5C327}" type="datetimeFigureOut">
               <a:rPr lang="en-US" smtClean="0"/>
-              <a:t>10/19/2020</a:t>
+              <a:t>10/20/2020</a:t>
             </a:fld>
             <a:endParaRPr lang="en-US"/>
           </a:p>
@@ -12528,7 +12783,7 @@
           <a:p>
             <a:fld id="{4173581D-C70C-4C40-9FB5-8923DA202D44}" type="slidenum">
               <a:rPr lang="en-US" smtClean="0"/>
-              <a:t>‹#›</a:t>
+              <a:t>‹Nr.›</a:t>
             </a:fld>
             <a:endParaRPr lang="en-US"/>
           </a:p>
@@ -12762,7 +13017,7 @@
           <a:p>
             <a:fld id="{36C38877-F049-4D72-8548-4E2DCAD5C327}" type="datetimeFigureOut">
               <a:rPr lang="en-US" smtClean="0"/>
-              <a:t>10/19/2020</a:t>
+              <a:t>10/20/2020</a:t>
             </a:fld>
             <a:endParaRPr lang="en-US"/>
           </a:p>
@@ -12816,7 +13071,7 @@
           <a:p>
             <a:fld id="{4173581D-C70C-4C40-9FB5-8923DA202D44}" type="slidenum">
               <a:rPr lang="en-US" smtClean="0"/>
-              <a:t>‹#›</a:t>
+              <a:t>‹Nr.›</a:t>
             </a:fld>
             <a:endParaRPr lang="en-US"/>
           </a:p>
@@ -13003,7 +13258,7 @@
           <a:p>
             <a:fld id="{36C38877-F049-4D72-8548-4E2DCAD5C327}" type="datetimeFigureOut">
               <a:rPr lang="en-US" smtClean="0"/>
-              <a:t>10/19/2020</a:t>
+              <a:t>10/20/2020</a:t>
             </a:fld>
             <a:endParaRPr lang="en-US"/>
           </a:p>
@@ -13093,7 +13348,7 @@
           <a:p>
             <a:fld id="{4173581D-C70C-4C40-9FB5-8923DA202D44}" type="slidenum">
               <a:rPr lang="en-US" smtClean="0"/>
-              <a:t>‹#›</a:t>
+              <a:t>‹Nr.›</a:t>
             </a:fld>
             <a:endParaRPr lang="en-US"/>
           </a:p>
@@ -18861,15 +19116,15 @@
           <p:nvPr/>
         </p:nvPicPr>
         <p:blipFill>
-          <a:blip r:embed="rId2"/>
+          <a:blip r:embed="rId3"/>
           <a:stretch>
             <a:fillRect/>
           </a:stretch>
         </p:blipFill>
         <p:spPr>
           <a:xfrm>
-            <a:off x="1208954" y="2387759"/>
-            <a:ext cx="4191000" cy="3783667"/>
+            <a:off x="436839" y="1690689"/>
+            <a:ext cx="4963115" cy="4480738"/>
           </a:xfrm>
           <a:prstGeom prst="rect">
             <a:avLst/>
@@ -18891,15 +19146,15 @@
           <p:nvPr/>
         </p:nvPicPr>
         <p:blipFill>
-          <a:blip r:embed="rId3"/>
+          <a:blip r:embed="rId4"/>
           <a:stretch>
             <a:fillRect/>
           </a:stretch>
         </p:blipFill>
         <p:spPr>
           <a:xfrm>
-            <a:off x="6659495" y="2400515"/>
-            <a:ext cx="3810000" cy="3758157"/>
+            <a:off x="6659494" y="1528243"/>
+            <a:ext cx="4694305" cy="4630429"/>
           </a:xfrm>
           <a:prstGeom prst="rect">
             <a:avLst/>
@@ -19565,7 +19820,7 @@
           <a:p>
             <a:r>
               <a:rPr lang="en-US" dirty="0"/>
-              <a:t>Generally Speaking Tabular will Perform Faster</a:t>
+              <a:t>In general Tabular will perform Faster</a:t>
             </a:r>
           </a:p>
           <a:p>

</xml_diff>

<commit_message>
added dax intro section
</commit_message>
<xml_diff>
--- a/Slides.pptx
+++ b/Slides.pptx
@@ -5,7 +5,7 @@
     <p:sldMasterId id="2147483648" r:id="rId1"/>
   </p:sldMasterIdLst>
   <p:notesMasterIdLst>
-    <p:notesMasterId r:id="rId35"/>
+    <p:notesMasterId r:id="rId40"/>
   </p:notesMasterIdLst>
   <p:sldIdLst>
     <p:sldId id="269" r:id="rId2"/>
@@ -36,11 +36,16 @@
     <p:sldId id="275" r:id="rId27"/>
     <p:sldId id="278" r:id="rId28"/>
     <p:sldId id="267" r:id="rId29"/>
-    <p:sldId id="523" r:id="rId30"/>
-    <p:sldId id="526" r:id="rId31"/>
-    <p:sldId id="525" r:id="rId32"/>
-    <p:sldId id="524" r:id="rId33"/>
-    <p:sldId id="266" r:id="rId34"/>
+    <p:sldId id="529" r:id="rId30"/>
+    <p:sldId id="531" r:id="rId31"/>
+    <p:sldId id="530" r:id="rId32"/>
+    <p:sldId id="532" r:id="rId33"/>
+    <p:sldId id="523" r:id="rId34"/>
+    <p:sldId id="525" r:id="rId35"/>
+    <p:sldId id="526" r:id="rId36"/>
+    <p:sldId id="524" r:id="rId37"/>
+    <p:sldId id="528" r:id="rId38"/>
+    <p:sldId id="266" r:id="rId39"/>
   </p:sldIdLst>
   <p:sldSz cx="12192000" cy="6858000"/>
   <p:notesSz cx="6858000" cy="9144000"/>
@@ -3658,6 +3663,292 @@
     <p:extLst>
       <p:ext uri="{BB962C8B-B14F-4D97-AF65-F5344CB8AC3E}">
         <p14:creationId xmlns:p14="http://schemas.microsoft.com/office/powerpoint/2010/main" val="1474793780"/>
+      </p:ext>
+    </p:extLst>
+  </p:cSld>
+  <p:clrMapOvr>
+    <a:masterClrMapping/>
+  </p:clrMapOvr>
+</p:notes>
+</file>
+
+<file path=ppt/notesSlides/notesSlide20.xml><?xml version="1.0" encoding="utf-8"?>
+<p:notes xmlns:a="http://schemas.openxmlformats.org/drawingml/2006/main" xmlns:r="http://schemas.openxmlformats.org/officeDocument/2006/relationships" xmlns:p="http://schemas.openxmlformats.org/presentationml/2006/main">
+  <p:cSld>
+    <p:spTree>
+      <p:nvGrpSpPr>
+        <p:cNvPr id="1" name=""/>
+        <p:cNvGrpSpPr/>
+        <p:nvPr/>
+      </p:nvGrpSpPr>
+      <p:grpSpPr>
+        <a:xfrm>
+          <a:off x="0" y="0"/>
+          <a:ext cx="0" cy="0"/>
+          <a:chOff x="0" y="0"/>
+          <a:chExt cx="0" cy="0"/>
+        </a:xfrm>
+      </p:grpSpPr>
+      <p:sp>
+        <p:nvSpPr>
+          <p:cNvPr id="2" name="Folienbildplatzhalter 1"/>
+          <p:cNvSpPr>
+            <a:spLocks noGrp="1" noRot="1" noChangeAspect="1"/>
+          </p:cNvSpPr>
+          <p:nvPr>
+            <p:ph type="sldImg"/>
+          </p:nvPr>
+        </p:nvSpPr>
+        <p:spPr/>
+      </p:sp>
+      <p:sp>
+        <p:nvSpPr>
+          <p:cNvPr id="3" name="Notizenplatzhalter 2"/>
+          <p:cNvSpPr>
+            <a:spLocks noGrp="1"/>
+          </p:cNvSpPr>
+          <p:nvPr>
+            <p:ph type="body" idx="1"/>
+          </p:nvPr>
+        </p:nvSpPr>
+        <p:spPr/>
+        <p:txBody>
+          <a:bodyPr/>
+          <a:lstStyle/>
+          <a:p>
+            <a:r>
+              <a:rPr lang="en-US" dirty="0"/>
+              <a:t>Die </a:t>
+            </a:r>
+            <a:r>
+              <a:rPr lang="en-US" dirty="0" err="1"/>
+              <a:t>Hochkomma</a:t>
+            </a:r>
+            <a:r>
+              <a:rPr lang="en-US" dirty="0"/>
+              <a:t> </a:t>
+            </a:r>
+            <a:r>
+              <a:rPr lang="en-US" dirty="0" err="1"/>
+              <a:t>kann</a:t>
+            </a:r>
+            <a:r>
+              <a:rPr lang="en-US" dirty="0"/>
+              <a:t> man </a:t>
+            </a:r>
+            <a:r>
+              <a:rPr lang="en-US" dirty="0" err="1"/>
+              <a:t>sich</a:t>
+            </a:r>
+            <a:r>
+              <a:rPr lang="en-US" dirty="0"/>
+              <a:t> </a:t>
+            </a:r>
+            <a:r>
+              <a:rPr lang="en-US" dirty="0" err="1"/>
+              <a:t>beim</a:t>
+            </a:r>
+            <a:r>
+              <a:rPr lang="en-US" dirty="0"/>
+              <a:t> </a:t>
+            </a:r>
+            <a:r>
+              <a:rPr lang="en-US" dirty="0" err="1"/>
+              <a:t>Tabellen</a:t>
+            </a:r>
+            <a:r>
+              <a:rPr lang="en-US" dirty="0"/>
+              <a:t> </a:t>
+            </a:r>
+            <a:r>
+              <a:rPr lang="en-US" dirty="0" err="1"/>
+              <a:t>namen</a:t>
+            </a:r>
+            <a:r>
+              <a:rPr lang="en-US" dirty="0"/>
+              <a:t> </a:t>
+            </a:r>
+            <a:r>
+              <a:rPr lang="en-US" dirty="0" err="1"/>
+              <a:t>sparen</a:t>
+            </a:r>
+            <a:r>
+              <a:rPr lang="en-US" dirty="0"/>
+              <a:t> </a:t>
+            </a:r>
+            <a:r>
+              <a:rPr lang="en-US" dirty="0" err="1"/>
+              <a:t>wenn</a:t>
+            </a:r>
+            <a:r>
+              <a:rPr lang="en-US" dirty="0"/>
+              <a:t> </a:t>
+            </a:r>
+            <a:r>
+              <a:rPr lang="en-US" dirty="0" err="1"/>
+              <a:t>keine</a:t>
+            </a:r>
+            <a:r>
+              <a:rPr lang="en-US" dirty="0"/>
+              <a:t> </a:t>
+            </a:r>
+            <a:r>
+              <a:rPr lang="en-US" dirty="0" err="1"/>
+              <a:t>Leerzeichen</a:t>
+            </a:r>
+            <a:r>
+              <a:rPr lang="en-US" dirty="0"/>
+              <a:t> </a:t>
+            </a:r>
+            <a:r>
+              <a:rPr lang="en-US" dirty="0" err="1"/>
+              <a:t>drinnen</a:t>
+            </a:r>
+            <a:r>
+              <a:rPr lang="en-US" dirty="0"/>
+              <a:t> </a:t>
+            </a:r>
+            <a:r>
+              <a:rPr lang="en-US" dirty="0" err="1"/>
+              <a:t>sind</a:t>
+            </a:r>
+            <a:endParaRPr lang="en-US" dirty="0"/>
+          </a:p>
+          <a:p>
+            <a:r>
+              <a:rPr lang="en-US" dirty="0"/>
+              <a:t>Quantity </a:t>
+            </a:r>
+            <a:r>
+              <a:rPr lang="en-US" dirty="0" err="1"/>
+              <a:t>ist</a:t>
+            </a:r>
+            <a:r>
+              <a:rPr lang="en-US" dirty="0"/>
+              <a:t> der </a:t>
+            </a:r>
+            <a:r>
+              <a:rPr lang="en-US" dirty="0" err="1"/>
+              <a:t>Spaltenname</a:t>
+            </a:r>
+            <a:endParaRPr lang="en-US" dirty="0"/>
+          </a:p>
+          <a:p>
+            <a:endParaRPr lang="en-AT" dirty="0"/>
+          </a:p>
+        </p:txBody>
+      </p:sp>
+      <p:sp>
+        <p:nvSpPr>
+          <p:cNvPr id="4" name="Foliennummernplatzhalter 3"/>
+          <p:cNvSpPr>
+            <a:spLocks noGrp="1"/>
+          </p:cNvSpPr>
+          <p:nvPr>
+            <p:ph type="sldNum" sz="quarter" idx="5"/>
+          </p:nvPr>
+        </p:nvSpPr>
+        <p:spPr/>
+        <p:txBody>
+          <a:bodyPr/>
+          <a:lstStyle/>
+          <a:p>
+            <a:fld id="{7F7719C4-5CCB-4564-8DFB-21D3D1DEC7F1}" type="slidenum">
+              <a:rPr lang="en-US" smtClean="0"/>
+              <a:t>29</a:t>
+            </a:fld>
+            <a:endParaRPr lang="en-US"/>
+          </a:p>
+        </p:txBody>
+      </p:sp>
+    </p:spTree>
+    <p:extLst>
+      <p:ext uri="{BB962C8B-B14F-4D97-AF65-F5344CB8AC3E}">
+        <p14:creationId xmlns:p14="http://schemas.microsoft.com/office/powerpoint/2010/main" val="1198775403"/>
+      </p:ext>
+    </p:extLst>
+  </p:cSld>
+  <p:clrMapOvr>
+    <a:masterClrMapping/>
+  </p:clrMapOvr>
+</p:notes>
+</file>
+
+<file path=ppt/notesSlides/notesSlide21.xml><?xml version="1.0" encoding="utf-8"?>
+<p:notes xmlns:a="http://schemas.openxmlformats.org/drawingml/2006/main" xmlns:r="http://schemas.openxmlformats.org/officeDocument/2006/relationships" xmlns:p="http://schemas.openxmlformats.org/presentationml/2006/main">
+  <p:cSld>
+    <p:spTree>
+      <p:nvGrpSpPr>
+        <p:cNvPr id="1" name=""/>
+        <p:cNvGrpSpPr/>
+        <p:nvPr/>
+      </p:nvGrpSpPr>
+      <p:grpSpPr>
+        <a:xfrm>
+          <a:off x="0" y="0"/>
+          <a:ext cx="0" cy="0"/>
+          <a:chOff x="0" y="0"/>
+          <a:chExt cx="0" cy="0"/>
+        </a:xfrm>
+      </p:grpSpPr>
+      <p:sp>
+        <p:nvSpPr>
+          <p:cNvPr id="2" name="Folienbildplatzhalter 1"/>
+          <p:cNvSpPr>
+            <a:spLocks noGrp="1" noRot="1" noChangeAspect="1"/>
+          </p:cNvSpPr>
+          <p:nvPr>
+            <p:ph type="sldImg"/>
+          </p:nvPr>
+        </p:nvSpPr>
+        <p:spPr/>
+      </p:sp>
+      <p:sp>
+        <p:nvSpPr>
+          <p:cNvPr id="3" name="Notizenplatzhalter 2"/>
+          <p:cNvSpPr>
+            <a:spLocks noGrp="1"/>
+          </p:cNvSpPr>
+          <p:nvPr>
+            <p:ph type="body" idx="1"/>
+          </p:nvPr>
+        </p:nvSpPr>
+        <p:spPr/>
+        <p:txBody>
+          <a:bodyPr/>
+          <a:lstStyle/>
+          <a:p>
+            <a:endParaRPr lang="en-AT" dirty="0"/>
+          </a:p>
+        </p:txBody>
+      </p:sp>
+      <p:sp>
+        <p:nvSpPr>
+          <p:cNvPr id="4" name="Foliennummernplatzhalter 3"/>
+          <p:cNvSpPr>
+            <a:spLocks noGrp="1"/>
+          </p:cNvSpPr>
+          <p:nvPr>
+            <p:ph type="sldNum" sz="quarter" idx="5"/>
+          </p:nvPr>
+        </p:nvSpPr>
+        <p:spPr/>
+        <p:txBody>
+          <a:bodyPr/>
+          <a:lstStyle/>
+          <a:p>
+            <a:fld id="{7F7719C4-5CCB-4564-8DFB-21D3D1DEC7F1}" type="slidenum">
+              <a:rPr lang="en-US" smtClean="0"/>
+              <a:t>35</a:t>
+            </a:fld>
+            <a:endParaRPr lang="en-US"/>
+          </a:p>
+        </p:txBody>
+      </p:sp>
+    </p:spTree>
+    <p:extLst>
+      <p:ext uri="{BB962C8B-B14F-4D97-AF65-F5344CB8AC3E}">
+        <p14:creationId xmlns:p14="http://schemas.microsoft.com/office/powerpoint/2010/main" val="197713608"/>
       </p:ext>
     </p:extLst>
   </p:cSld>
@@ -13713,7 +14004,7 @@
             <a:spLocks noGrp="1"/>
           </p:cNvSpPr>
           <p:nvPr>
-            <p:ph type="title"/>
+            <p:ph type="ctrTitle"/>
           </p:nvPr>
         </p:nvSpPr>
         <p:spPr/>
@@ -13731,10 +14022,10 @@
       </p:sp>
       <p:sp>
         <p:nvSpPr>
-          <p:cNvPr id="3" name="Content Placeholder 2">
+          <p:cNvPr id="4" name="Untertitel 3">
             <a:extLst>
               <a:ext uri="{FF2B5EF4-FFF2-40B4-BE49-F238E27FC236}">
-                <a16:creationId xmlns:a16="http://schemas.microsoft.com/office/drawing/2014/main" id="{8CC21F33-58FF-40B8-A18B-1708A3E30924}"/>
+                <a16:creationId xmlns:a16="http://schemas.microsoft.com/office/drawing/2014/main" id="{097D4E5E-F3E2-43FA-A8CC-DD72559438BF}"/>
               </a:ext>
             </a:extLst>
           </p:cNvPr>
@@ -13742,7 +14033,7 @@
             <a:spLocks noGrp="1"/>
           </p:cNvSpPr>
           <p:nvPr>
-            <p:ph idx="1"/>
+            <p:ph type="subTitle" idx="1"/>
           </p:nvPr>
         </p:nvSpPr>
         <p:spPr/>
@@ -13750,7 +14041,7 @@
           <a:bodyPr/>
           <a:lstStyle/>
           <a:p>
-            <a:endParaRPr lang="en-US"/>
+            <a:endParaRPr lang="en-AT"/>
           </a:p>
         </p:txBody>
       </p:sp>
@@ -17562,6 +17853,44 @@
           </a:p>
         </p:txBody>
       </p:sp>
+      <p:sp>
+        <p:nvSpPr>
+          <p:cNvPr id="6" name="Textfeld 5">
+            <a:extLst>
+              <a:ext uri="{FF2B5EF4-FFF2-40B4-BE49-F238E27FC236}">
+                <a16:creationId xmlns:a16="http://schemas.microsoft.com/office/drawing/2014/main" id="{4D4B7AB5-F930-4D4B-BB6E-781A4CC3E3D2}"/>
+              </a:ext>
+            </a:extLst>
+          </p:cNvPr>
+          <p:cNvSpPr txBox="1"/>
+          <p:nvPr/>
+        </p:nvSpPr>
+        <p:spPr>
+          <a:xfrm>
+            <a:off x="5562600" y="5958674"/>
+            <a:ext cx="6096000" cy="369332"/>
+          </a:xfrm>
+          <a:prstGeom prst="rect">
+            <a:avLst/>
+          </a:prstGeom>
+          <a:noFill/>
+        </p:spPr>
+        <p:txBody>
+          <a:bodyPr wrap="square">
+            <a:spAutoFit/>
+          </a:bodyPr>
+          <a:lstStyle/>
+          <a:p>
+            <a:pPr marL="0" indent="0">
+              <a:buNone/>
+            </a:pPr>
+            <a:r>
+              <a:rPr lang="en-US" b="1" i="1" dirty="0"/>
+              <a:t>Source: Definite Guide to Dax – Marco Russo &amp; Alberto Ferrari</a:t>
+            </a:r>
+          </a:p>
+        </p:txBody>
+      </p:sp>
     </p:spTree>
     <p:extLst>
       <p:ext uri="{BB962C8B-B14F-4D97-AF65-F5344CB8AC3E}">
@@ -17597,7 +17926,7 @@
           <p:cNvPr id="2" name="Titel 1">
             <a:extLst>
               <a:ext uri="{FF2B5EF4-FFF2-40B4-BE49-F238E27FC236}">
-                <a16:creationId xmlns:a16="http://schemas.microsoft.com/office/drawing/2014/main" id="{5E17CAF5-1F2F-4C78-879C-A37E828E47F3}"/>
+                <a16:creationId xmlns:a16="http://schemas.microsoft.com/office/drawing/2014/main" id="{7805CE0A-346E-4DD0-8051-EEB27A7D678F}"/>
               </a:ext>
             </a:extLst>
           </p:cNvPr>
@@ -17615,7 +17944,7 @@
           <a:p>
             <a:r>
               <a:rPr lang="en-US" dirty="0"/>
-              <a:t>Evaluation Context</a:t>
+              <a:t>Syntax</a:t>
             </a:r>
             <a:endParaRPr lang="en-AT" dirty="0"/>
           </a:p>
@@ -17626,7 +17955,7 @@
           <p:cNvPr id="3" name="Inhaltsplatzhalter 2">
             <a:extLst>
               <a:ext uri="{FF2B5EF4-FFF2-40B4-BE49-F238E27FC236}">
-                <a16:creationId xmlns:a16="http://schemas.microsoft.com/office/drawing/2014/main" id="{034D2214-8954-410B-ACBC-EE3ED7DF591C}"/>
+                <a16:creationId xmlns:a16="http://schemas.microsoft.com/office/drawing/2014/main" id="{4CD375ED-F9B3-4A35-BEB6-5047173FC7D1}"/>
               </a:ext>
             </a:extLst>
           </p:cNvPr>
@@ -17637,66 +17966,139 @@
             <p:ph idx="1"/>
           </p:nvPr>
         </p:nvSpPr>
-        <p:spPr>
-          <a:xfrm>
-            <a:off x="838200" y="1825625"/>
-            <a:ext cx="11236424" cy="4351338"/>
-          </a:xfrm>
-        </p:spPr>
+        <p:spPr/>
         <p:txBody>
-          <a:bodyPr/>
+          <a:bodyPr>
+            <a:normAutofit/>
+          </a:bodyPr>
           <a:lstStyle/>
           <a:p>
             <a:r>
+              <a:rPr lang="en-US" dirty="0">
+                <a:latin typeface="Arial" panose="020B0604020202020204" pitchFamily="34" charset="0"/>
+                <a:cs typeface="Arial" panose="020B0604020202020204" pitchFamily="34" charset="0"/>
+              </a:rPr>
+              <a:t>To reference a column in a table Sales </a:t>
+            </a:r>
+          </a:p>
+          <a:p>
+            <a:pPr lvl="1"/>
+            <a:r>
+              <a:rPr lang="en-US" dirty="0">
+                <a:latin typeface="Arial" panose="020B0604020202020204" pitchFamily="34" charset="0"/>
+                <a:cs typeface="Arial" panose="020B0604020202020204" pitchFamily="34" charset="0"/>
+              </a:rPr>
+              <a:t>‘Sales’[</a:t>
+            </a:r>
+            <a:r>
+              <a:rPr lang="en-US" dirty="0" err="1"/>
+              <a:t>GrossMargin</a:t>
+            </a:r>
+            <a:r>
+              <a:rPr lang="en-US" dirty="0">
+                <a:latin typeface="Arial" panose="020B0604020202020204" pitchFamily="34" charset="0"/>
+                <a:cs typeface="Arial" panose="020B0604020202020204" pitchFamily="34" charset="0"/>
+              </a:rPr>
+              <a:t>]</a:t>
+            </a:r>
+          </a:p>
+          <a:p>
+            <a:pPr lvl="1"/>
+            <a:r>
+              <a:rPr lang="en-US" dirty="0">
+                <a:latin typeface="Arial" panose="020B0604020202020204" pitchFamily="34" charset="0"/>
+                <a:cs typeface="Arial" panose="020B0604020202020204" pitchFamily="34" charset="0"/>
+              </a:rPr>
+              <a:t>To define a calculated Column </a:t>
+            </a:r>
+            <a:r>
               <a:rPr lang="en-US" dirty="0"/>
-              <a:t>Row Context</a:t>
-            </a:r>
-          </a:p>
-          <a:p>
+              <a:t>Sales[</a:t>
+            </a:r>
+            <a:r>
+              <a:rPr lang="en-US" dirty="0" err="1"/>
+              <a:t>GrossMargin</a:t>
+            </a:r>
             <a:r>
               <a:rPr lang="en-US" dirty="0"/>
-              <a:t>Filter Context</a:t>
-            </a:r>
-          </a:p>
-          <a:p>
-            <a:endParaRPr lang="en-US" dirty="0"/>
-          </a:p>
-          <a:p>
-            <a:pPr marL="0" indent="0">
-              <a:buNone/>
-            </a:pPr>
-            <a:r>
-              <a:rPr lang="en-US" b="1" i="1" dirty="0"/>
-              <a:t>“The filter context filters the model the row context iterates one table.”</a:t>
-            </a:r>
-          </a:p>
-          <a:p>
-            <a:pPr marL="0" indent="0">
-              <a:buNone/>
-            </a:pPr>
-            <a:endParaRPr lang="en-US" b="1" i="1" dirty="0"/>
-          </a:p>
-          <a:p>
-            <a:pPr marL="0" indent="0">
-              <a:buNone/>
-            </a:pPr>
-            <a:endParaRPr lang="en-US" b="1" i="1" dirty="0"/>
-          </a:p>
-          <a:p>
-            <a:pPr marL="0" indent="0">
-              <a:buNone/>
-            </a:pPr>
-            <a:r>
-              <a:rPr lang="en-US" b="1" i="1" dirty="0"/>
-              <a:t>Source: Definite Guide to Dax – Marco Russo &amp; Alberto Ferrari</a:t>
-            </a:r>
+              <a:t>] </a:t>
+            </a:r>
+            <a:r>
+              <a:rPr lang="en-US" b="1" dirty="0"/>
+              <a:t>=</a:t>
+            </a:r>
+            <a:r>
+              <a:rPr lang="en-US" dirty="0"/>
+              <a:t> …</a:t>
+            </a:r>
+            <a:endParaRPr lang="en-US" dirty="0">
+              <a:latin typeface="Arial" panose="020B0604020202020204" pitchFamily="34" charset="0"/>
+              <a:cs typeface="Arial" panose="020B0604020202020204" pitchFamily="34" charset="0"/>
+            </a:endParaRPr>
+          </a:p>
+          <a:p>
+            <a:r>
+              <a:rPr lang="en-US" dirty="0">
+                <a:latin typeface="Arial" panose="020B0604020202020204" pitchFamily="34" charset="0"/>
+                <a:cs typeface="Arial" panose="020B0604020202020204" pitchFamily="34" charset="0"/>
+              </a:rPr>
+              <a:t>To reference a Measure</a:t>
+            </a:r>
+          </a:p>
+          <a:p>
+            <a:pPr lvl="1"/>
+            <a:r>
+              <a:rPr lang="en-US" dirty="0">
+                <a:latin typeface="Arial" panose="020B0604020202020204" pitchFamily="34" charset="0"/>
+                <a:cs typeface="Arial" panose="020B0604020202020204" pitchFamily="34" charset="0"/>
+              </a:rPr>
+              <a:t>[Sales Amount]</a:t>
+            </a:r>
+          </a:p>
+          <a:p>
+            <a:pPr lvl="1"/>
+            <a:r>
+              <a:rPr lang="en-US" dirty="0">
+                <a:latin typeface="Arial" panose="020B0604020202020204" pitchFamily="34" charset="0"/>
+                <a:cs typeface="Arial" panose="020B0604020202020204" pitchFamily="34" charset="0"/>
+              </a:rPr>
+              <a:t>To define a new Measure ‘Sales’[Quantity] </a:t>
+            </a:r>
+            <a:r>
+              <a:rPr lang="en-US" b="1" dirty="0">
+                <a:latin typeface="Arial" panose="020B0604020202020204" pitchFamily="34" charset="0"/>
+                <a:cs typeface="Arial" panose="020B0604020202020204" pitchFamily="34" charset="0"/>
+              </a:rPr>
+              <a:t>:=</a:t>
+            </a:r>
+          </a:p>
+          <a:p>
+            <a:r>
+              <a:rPr lang="en-US" dirty="0">
+                <a:latin typeface="Arial" panose="020B0604020202020204" pitchFamily="34" charset="0"/>
+                <a:cs typeface="Arial" panose="020B0604020202020204" pitchFamily="34" charset="0"/>
+              </a:rPr>
+              <a:t>Comments with // or – </a:t>
+            </a:r>
+          </a:p>
+          <a:p>
+            <a:endParaRPr lang="en-US" dirty="0">
+              <a:latin typeface="Arial" panose="020B0604020202020204" pitchFamily="34" charset="0"/>
+              <a:cs typeface="Arial" panose="020B0604020202020204" pitchFamily="34" charset="0"/>
+            </a:endParaRPr>
+          </a:p>
+          <a:p>
+            <a:endParaRPr lang="en-US" dirty="0">
+              <a:latin typeface="Arial" panose="020B0604020202020204" pitchFamily="34" charset="0"/>
+              <a:cs typeface="Arial" panose="020B0604020202020204" pitchFamily="34" charset="0"/>
+            </a:endParaRPr>
           </a:p>
         </p:txBody>
       </p:sp>
     </p:spTree>
     <p:extLst>
       <p:ext uri="{BB962C8B-B14F-4D97-AF65-F5344CB8AC3E}">
-        <p14:creationId xmlns:p14="http://schemas.microsoft.com/office/powerpoint/2010/main" val="2211469030"/>
+        <p14:creationId xmlns:p14="http://schemas.microsoft.com/office/powerpoint/2010/main" val="858982515"/>
       </p:ext>
     </p:extLst>
   </p:cSld>
@@ -17739,7 +18141,12 @@
             <p:ph type="ctrTitle"/>
           </p:nvPr>
         </p:nvSpPr>
-        <p:spPr/>
+        <p:spPr>
+          <a:xfrm>
+            <a:off x="1027990" y="1122363"/>
+            <a:ext cx="9640010" cy="2387600"/>
+          </a:xfrm>
+        </p:spPr>
         <p:txBody>
           <a:bodyPr>
             <a:normAutofit fontScale="90000"/>
@@ -17905,7 +18312,7 @@
           <p:cNvPr id="2" name="Titel 1">
             <a:extLst>
               <a:ext uri="{FF2B5EF4-FFF2-40B4-BE49-F238E27FC236}">
-                <a16:creationId xmlns:a16="http://schemas.microsoft.com/office/drawing/2014/main" id="{509C9C1C-5460-420D-8FA6-3733B2505259}"/>
+                <a16:creationId xmlns:a16="http://schemas.microsoft.com/office/drawing/2014/main" id="{A5546965-7DD3-4780-A234-934C95F7D759}"/>
               </a:ext>
             </a:extLst>
           </p:cNvPr>
@@ -17923,7 +18330,7 @@
           <a:p>
             <a:r>
               <a:rPr lang="en-US" dirty="0"/>
-              <a:t>Row Context</a:t>
+              <a:t>Dax operators</a:t>
             </a:r>
             <a:endParaRPr lang="en-AT" dirty="0"/>
           </a:p>
@@ -17934,7 +18341,7 @@
           <p:cNvPr id="3" name="Inhaltsplatzhalter 2">
             <a:extLst>
               <a:ext uri="{FF2B5EF4-FFF2-40B4-BE49-F238E27FC236}">
-                <a16:creationId xmlns:a16="http://schemas.microsoft.com/office/drawing/2014/main" id="{CCCF49F7-8DB3-4BA8-84EE-32C281D323AC}"/>
+                <a16:creationId xmlns:a16="http://schemas.microsoft.com/office/drawing/2014/main" id="{DD394C71-3981-439F-BE00-9447E4FC16DB}"/>
               </a:ext>
             </a:extLst>
           </p:cNvPr>
@@ -17952,109 +18359,42 @@
           <a:p>
             <a:r>
               <a:rPr lang="en-US" dirty="0"/>
-              <a:t>is an iterator (like a cursor)</a:t>
+              <a:t>Precedence order and grouping of arguments: () </a:t>
             </a:r>
           </a:p>
           <a:p>
             <a:r>
               <a:rPr lang="en-US" dirty="0"/>
-              <a:t>It scans a table and for each row allows an expression to access each column in that row. </a:t>
-            </a:r>
-          </a:p>
-          <a:p>
-            <a:endParaRPr lang="en-US" dirty="0"/>
+              <a:t>Arithmetic: +, -, *, / </a:t>
+            </a:r>
           </a:p>
           <a:p>
             <a:r>
               <a:rPr lang="en-US" dirty="0"/>
-              <a:t>Example:</a:t>
-            </a:r>
-          </a:p>
-          <a:p>
-            <a:pPr marL="0" indent="0">
-              <a:buNone/>
-            </a:pPr>
-            <a:r>
-              <a:rPr lang="de-AT" sz="1800" dirty="0">
-                <a:solidFill>
-                  <a:srgbClr val="484848"/>
-                </a:solidFill>
-                <a:latin typeface="Tahoma" panose="020B0604030504040204" pitchFamily="34" charset="0"/>
-              </a:rPr>
-              <a:t>= </a:t>
-            </a:r>
-            <a:r>
-              <a:rPr lang="de-AT" sz="1800" dirty="0" err="1">
-                <a:solidFill>
-                  <a:srgbClr val="0000FF"/>
-                </a:solidFill>
-                <a:latin typeface="Tahoma" panose="020B0604030504040204" pitchFamily="34" charset="0"/>
-              </a:rPr>
-              <a:t>if</a:t>
-            </a:r>
-            <a:r>
-              <a:rPr lang="de-AT" sz="1800" dirty="0">
-                <a:solidFill>
-                  <a:srgbClr val="484848"/>
-                </a:solidFill>
-                <a:latin typeface="Tahoma" panose="020B0604030504040204" pitchFamily="34" charset="0"/>
-              </a:rPr>
-              <a:t> ([Bankleitzahl] = 33078; </a:t>
-            </a:r>
-            <a:r>
-              <a:rPr lang="de-AT" sz="1800" dirty="0">
-                <a:solidFill>
-                  <a:srgbClr val="A31515"/>
-                </a:solidFill>
-                <a:latin typeface="Tahoma" panose="020B0604030504040204" pitchFamily="34" charset="0"/>
-              </a:rPr>
-              <a:t>"</a:t>
-            </a:r>
-            <a:r>
-              <a:rPr lang="de-AT" sz="1800" dirty="0" err="1">
-                <a:solidFill>
-                  <a:srgbClr val="A31515"/>
-                </a:solidFill>
-                <a:latin typeface="Tahoma" panose="020B0604030504040204" pitchFamily="34" charset="0"/>
-              </a:rPr>
-              <a:t>Purbach</a:t>
-            </a:r>
-            <a:r>
-              <a:rPr lang="de-AT" sz="1800" dirty="0">
-                <a:solidFill>
-                  <a:srgbClr val="A31515"/>
-                </a:solidFill>
-                <a:latin typeface="Tahoma" panose="020B0604030504040204" pitchFamily="34" charset="0"/>
-              </a:rPr>
-              <a:t>"</a:t>
-            </a:r>
-            <a:r>
-              <a:rPr lang="de-AT" sz="1800" dirty="0">
-                <a:solidFill>
-                  <a:srgbClr val="484848"/>
-                </a:solidFill>
-                <a:latin typeface="Tahoma" panose="020B0604030504040204" pitchFamily="34" charset="0"/>
-              </a:rPr>
-              <a:t>;</a:t>
-            </a:r>
-            <a:r>
-              <a:rPr lang="de-AT" sz="1800" dirty="0">
-                <a:solidFill>
-                  <a:srgbClr val="A31515"/>
-                </a:solidFill>
-                <a:latin typeface="Tahoma" panose="020B0604030504040204" pitchFamily="34" charset="0"/>
-              </a:rPr>
-              <a:t>"Bruck"</a:t>
-            </a:r>
-            <a:r>
-              <a:rPr lang="de-AT" sz="1800" dirty="0">
-                <a:solidFill>
-                  <a:srgbClr val="484848"/>
-                </a:solidFill>
-                <a:latin typeface="Tahoma" panose="020B0604030504040204" pitchFamily="34" charset="0"/>
-              </a:rPr>
-              <a:t>)</a:t>
-            </a:r>
+              <a:t>Comparison: =, &lt;, &gt;,  &lt;=, =&gt; </a:t>
+            </a:r>
+          </a:p>
+          <a:p>
+            <a:r>
+              <a:rPr lang="en-US" dirty="0"/>
+              <a:t>Text </a:t>
+            </a:r>
+            <a:r>
+              <a:rPr lang="en-US" dirty="0" err="1"/>
+              <a:t>Concatination</a:t>
+            </a:r>
+            <a:r>
+              <a:rPr lang="en-US" dirty="0"/>
+              <a:t>: &amp;</a:t>
+            </a:r>
+          </a:p>
+          <a:p>
+            <a:r>
+              <a:rPr lang="en-US" dirty="0"/>
+              <a:t>Logical: &amp;&amp;, ||, IN, NOT</a:t>
+            </a:r>
+          </a:p>
+          <a:p>
             <a:endParaRPr lang="en-AT" dirty="0"/>
           </a:p>
         </p:txBody>
@@ -18062,7 +18402,7 @@
     </p:spTree>
     <p:extLst>
       <p:ext uri="{BB962C8B-B14F-4D97-AF65-F5344CB8AC3E}">
-        <p14:creationId xmlns:p14="http://schemas.microsoft.com/office/powerpoint/2010/main" val="793809967"/>
+        <p14:creationId xmlns:p14="http://schemas.microsoft.com/office/powerpoint/2010/main" val="2359118657"/>
       </p:ext>
     </p:extLst>
   </p:cSld>
@@ -18073,6 +18413,594 @@
 </file>
 
 <file path=ppt/slides/slide31.xml><?xml version="1.0" encoding="utf-8"?>
+<p:sld xmlns:a="http://schemas.openxmlformats.org/drawingml/2006/main" xmlns:r="http://schemas.openxmlformats.org/officeDocument/2006/relationships" xmlns:p="http://schemas.openxmlformats.org/presentationml/2006/main">
+  <p:cSld>
+    <p:spTree>
+      <p:nvGrpSpPr>
+        <p:cNvPr id="1" name=""/>
+        <p:cNvGrpSpPr/>
+        <p:nvPr/>
+      </p:nvGrpSpPr>
+      <p:grpSpPr>
+        <a:xfrm>
+          <a:off x="0" y="0"/>
+          <a:ext cx="0" cy="0"/>
+          <a:chOff x="0" y="0"/>
+          <a:chExt cx="0" cy="0"/>
+        </a:xfrm>
+      </p:grpSpPr>
+      <p:sp>
+        <p:nvSpPr>
+          <p:cNvPr id="2" name="Titel 1">
+            <a:extLst>
+              <a:ext uri="{FF2B5EF4-FFF2-40B4-BE49-F238E27FC236}">
+                <a16:creationId xmlns:a16="http://schemas.microsoft.com/office/drawing/2014/main" id="{16C1B4D6-BFD0-4A27-8C65-7079056C24A8}"/>
+              </a:ext>
+            </a:extLst>
+          </p:cNvPr>
+          <p:cNvSpPr>
+            <a:spLocks noGrp="1"/>
+          </p:cNvSpPr>
+          <p:nvPr>
+            <p:ph type="title"/>
+          </p:nvPr>
+        </p:nvSpPr>
+        <p:spPr/>
+        <p:txBody>
+          <a:bodyPr/>
+          <a:lstStyle/>
+          <a:p>
+            <a:r>
+              <a:rPr lang="en-US" dirty="0"/>
+              <a:t>Data Types and type handling</a:t>
+            </a:r>
+            <a:endParaRPr lang="en-AT" dirty="0"/>
+          </a:p>
+        </p:txBody>
+      </p:sp>
+      <p:sp>
+        <p:nvSpPr>
+          <p:cNvPr id="3" name="Inhaltsplatzhalter 2">
+            <a:extLst>
+              <a:ext uri="{FF2B5EF4-FFF2-40B4-BE49-F238E27FC236}">
+                <a16:creationId xmlns:a16="http://schemas.microsoft.com/office/drawing/2014/main" id="{8A122932-D0EF-4BF9-B1D3-3C771040C80B}"/>
+              </a:ext>
+            </a:extLst>
+          </p:cNvPr>
+          <p:cNvSpPr>
+            <a:spLocks noGrp="1"/>
+          </p:cNvSpPr>
+          <p:nvPr>
+            <p:ph idx="1"/>
+          </p:nvPr>
+        </p:nvSpPr>
+        <p:spPr/>
+        <p:txBody>
+          <a:bodyPr/>
+          <a:lstStyle/>
+          <a:p>
+            <a:r>
+              <a:rPr lang="en-US" dirty="0"/>
+              <a:t>Integer</a:t>
+            </a:r>
+          </a:p>
+          <a:p>
+            <a:r>
+              <a:rPr lang="en-US" dirty="0"/>
+              <a:t>Decimal</a:t>
+            </a:r>
+          </a:p>
+          <a:p>
+            <a:r>
+              <a:rPr lang="en-US" dirty="0"/>
+              <a:t>Currency</a:t>
+            </a:r>
+          </a:p>
+          <a:p>
+            <a:r>
+              <a:rPr lang="en-US" dirty="0"/>
+              <a:t>Datetime</a:t>
+            </a:r>
+          </a:p>
+          <a:p>
+            <a:r>
+              <a:rPr lang="en-US" dirty="0"/>
+              <a:t>Boolean</a:t>
+            </a:r>
+          </a:p>
+          <a:p>
+            <a:r>
+              <a:rPr lang="en-US" dirty="0"/>
+              <a:t>String</a:t>
+            </a:r>
+          </a:p>
+          <a:p>
+            <a:r>
+              <a:rPr lang="en-US" dirty="0"/>
+              <a:t>Variant</a:t>
+            </a:r>
+          </a:p>
+          <a:p>
+            <a:r>
+              <a:rPr lang="en-US" dirty="0"/>
+              <a:t>Binary</a:t>
+            </a:r>
+            <a:endParaRPr lang="en-AT" dirty="0"/>
+          </a:p>
+        </p:txBody>
+      </p:sp>
+      <p:sp>
+        <p:nvSpPr>
+          <p:cNvPr id="4" name="Textfeld 3">
+            <a:extLst>
+              <a:ext uri="{FF2B5EF4-FFF2-40B4-BE49-F238E27FC236}">
+                <a16:creationId xmlns:a16="http://schemas.microsoft.com/office/drawing/2014/main" id="{0F8EB388-3E36-4843-AE49-4384D9405BA8}"/>
+              </a:ext>
+            </a:extLst>
+          </p:cNvPr>
+          <p:cNvSpPr txBox="1"/>
+          <p:nvPr/>
+        </p:nvSpPr>
+        <p:spPr>
+          <a:xfrm>
+            <a:off x="4083050" y="2339330"/>
+            <a:ext cx="4711290" cy="4154984"/>
+          </a:xfrm>
+          <a:prstGeom prst="rect">
+            <a:avLst/>
+          </a:prstGeom>
+          <a:noFill/>
+        </p:spPr>
+        <p:txBody>
+          <a:bodyPr wrap="none" rtlCol="0">
+            <a:spAutoFit/>
+          </a:bodyPr>
+          <a:lstStyle/>
+          <a:p>
+            <a:r>
+              <a:rPr lang="en-US" sz="2400" dirty="0"/>
+              <a:t>Try to guess the resulting data type:</a:t>
+            </a:r>
+          </a:p>
+          <a:p>
+            <a:endParaRPr lang="en-US" sz="2400" dirty="0"/>
+          </a:p>
+          <a:p>
+            <a:r>
+              <a:rPr lang="en-US" sz="2400" dirty="0"/>
+              <a:t>= Sales[Order Date]+7</a:t>
+            </a:r>
+          </a:p>
+          <a:p>
+            <a:endParaRPr lang="en-US" sz="2400" dirty="0"/>
+          </a:p>
+          <a:p>
+            <a:r>
+              <a:rPr lang="en-US" sz="2400" dirty="0"/>
+              <a:t>= Sales[Unit Price] &gt; Sales[Unit Cost]</a:t>
+            </a:r>
+          </a:p>
+          <a:p>
+            <a:endParaRPr lang="en-US" sz="2400" dirty="0"/>
+          </a:p>
+          <a:p>
+            <a:r>
+              <a:rPr lang="en-US" sz="2400" dirty="0"/>
+              <a:t>= IF([measure] &gt; 0, 1, “N/A”)</a:t>
+            </a:r>
+          </a:p>
+          <a:p>
+            <a:endParaRPr lang="en-US" sz="2400" dirty="0"/>
+          </a:p>
+          <a:p>
+            <a:r>
+              <a:rPr lang="en-US" sz="2400" dirty="0"/>
+              <a:t>= “10” + 32 </a:t>
+            </a:r>
+          </a:p>
+          <a:p>
+            <a:endParaRPr lang="en-US" sz="2400" dirty="0"/>
+          </a:p>
+          <a:p>
+            <a:r>
+              <a:rPr lang="en-US" sz="2400" dirty="0"/>
+              <a:t>=“10” &amp; 32</a:t>
+            </a:r>
+            <a:endParaRPr lang="en-AT" sz="2400" dirty="0"/>
+          </a:p>
+        </p:txBody>
+      </p:sp>
+    </p:spTree>
+    <p:extLst>
+      <p:ext uri="{BB962C8B-B14F-4D97-AF65-F5344CB8AC3E}">
+        <p14:creationId xmlns:p14="http://schemas.microsoft.com/office/powerpoint/2010/main" val="69412581"/>
+      </p:ext>
+    </p:extLst>
+  </p:cSld>
+  <p:clrMapOvr>
+    <a:masterClrMapping/>
+  </p:clrMapOvr>
+</p:sld>
+</file>
+
+<file path=ppt/slides/slide32.xml><?xml version="1.0" encoding="utf-8"?>
+<p:sld xmlns:a="http://schemas.openxmlformats.org/drawingml/2006/main" xmlns:r="http://schemas.openxmlformats.org/officeDocument/2006/relationships" xmlns:p="http://schemas.openxmlformats.org/presentationml/2006/main">
+  <p:cSld>
+    <p:spTree>
+      <p:nvGrpSpPr>
+        <p:cNvPr id="1" name=""/>
+        <p:cNvGrpSpPr/>
+        <p:nvPr/>
+      </p:nvGrpSpPr>
+      <p:grpSpPr>
+        <a:xfrm>
+          <a:off x="0" y="0"/>
+          <a:ext cx="0" cy="0"/>
+          <a:chOff x="0" y="0"/>
+          <a:chExt cx="0" cy="0"/>
+        </a:xfrm>
+      </p:grpSpPr>
+      <p:sp>
+        <p:nvSpPr>
+          <p:cNvPr id="2" name="Titel 1">
+            <a:extLst>
+              <a:ext uri="{FF2B5EF4-FFF2-40B4-BE49-F238E27FC236}">
+                <a16:creationId xmlns:a16="http://schemas.microsoft.com/office/drawing/2014/main" id="{81F30DD0-81E7-4565-A347-37EC2A68B513}"/>
+              </a:ext>
+            </a:extLst>
+          </p:cNvPr>
+          <p:cNvSpPr>
+            <a:spLocks noGrp="1"/>
+          </p:cNvSpPr>
+          <p:nvPr>
+            <p:ph type="title"/>
+          </p:nvPr>
+        </p:nvSpPr>
+        <p:spPr/>
+        <p:txBody>
+          <a:bodyPr/>
+          <a:lstStyle/>
+          <a:p>
+            <a:r>
+              <a:rPr lang="en-US" dirty="0"/>
+              <a:t>Calculated Columns vs Measures</a:t>
+            </a:r>
+            <a:endParaRPr lang="en-AT" dirty="0"/>
+          </a:p>
+        </p:txBody>
+      </p:sp>
+      <p:sp>
+        <p:nvSpPr>
+          <p:cNvPr id="3" name="Inhaltsplatzhalter 2">
+            <a:extLst>
+              <a:ext uri="{FF2B5EF4-FFF2-40B4-BE49-F238E27FC236}">
+                <a16:creationId xmlns:a16="http://schemas.microsoft.com/office/drawing/2014/main" id="{3CAF544D-D72E-44A7-B117-C4263EDD50F4}"/>
+              </a:ext>
+            </a:extLst>
+          </p:cNvPr>
+          <p:cNvSpPr>
+            <a:spLocks noGrp="1"/>
+          </p:cNvSpPr>
+          <p:nvPr>
+            <p:ph sz="half" idx="1"/>
+          </p:nvPr>
+        </p:nvSpPr>
+        <p:spPr/>
+        <p:txBody>
+          <a:bodyPr>
+            <a:normAutofit lnSpcReduction="10000"/>
+          </a:bodyPr>
+          <a:lstStyle/>
+          <a:p>
+            <a:r>
+              <a:rPr lang="en-US" dirty="0"/>
+              <a:t>Stored in Memory </a:t>
+            </a:r>
+          </a:p>
+          <a:p>
+            <a:r>
+              <a:rPr lang="en-US" dirty="0"/>
+              <a:t>Can be used as Fields in a pivot table</a:t>
+            </a:r>
+          </a:p>
+          <a:p>
+            <a:r>
+              <a:rPr lang="en-US" dirty="0"/>
+              <a:t>Uses the current row as context</a:t>
+            </a:r>
+          </a:p>
+          <a:p>
+            <a:pPr marL="0" indent="0">
+              <a:buNone/>
+            </a:pPr>
+            <a:endParaRPr lang="en-US" dirty="0"/>
+          </a:p>
+          <a:p>
+            <a:pPr marL="0" indent="0">
+              <a:buNone/>
+            </a:pPr>
+            <a:endParaRPr lang="en-US" dirty="0"/>
+          </a:p>
+          <a:p>
+            <a:pPr marL="0" indent="0">
+              <a:buNone/>
+            </a:pPr>
+            <a:r>
+              <a:rPr lang="en-US" dirty="0"/>
+              <a:t>Example:</a:t>
+            </a:r>
+          </a:p>
+          <a:p>
+            <a:pPr marL="0" indent="0">
+              <a:buNone/>
+            </a:pPr>
+            <a:r>
+              <a:rPr lang="en-US" dirty="0"/>
+              <a:t>Sales[</a:t>
+            </a:r>
+            <a:r>
+              <a:rPr lang="en-US" dirty="0" err="1"/>
+              <a:t>GrossMargin</a:t>
+            </a:r>
+            <a:r>
+              <a:rPr lang="en-US" dirty="0"/>
+              <a:t>] = Sales[</a:t>
+            </a:r>
+            <a:r>
+              <a:rPr lang="en-US" dirty="0" err="1"/>
+              <a:t>SalesAmount</a:t>
+            </a:r>
+            <a:r>
+              <a:rPr lang="en-US" dirty="0"/>
+              <a:t>] – Sales[</a:t>
+            </a:r>
+            <a:r>
+              <a:rPr lang="en-US" dirty="0" err="1"/>
+              <a:t>TotalProductCost</a:t>
+            </a:r>
+            <a:r>
+              <a:rPr lang="en-US" dirty="0"/>
+              <a:t>]</a:t>
+            </a:r>
+          </a:p>
+        </p:txBody>
+      </p:sp>
+      <p:sp>
+        <p:nvSpPr>
+          <p:cNvPr id="4" name="Inhaltsplatzhalter 3">
+            <a:extLst>
+              <a:ext uri="{FF2B5EF4-FFF2-40B4-BE49-F238E27FC236}">
+                <a16:creationId xmlns:a16="http://schemas.microsoft.com/office/drawing/2014/main" id="{EE673427-2209-4C2D-BC09-68D0134429F1}"/>
+              </a:ext>
+            </a:extLst>
+          </p:cNvPr>
+          <p:cNvSpPr>
+            <a:spLocks noGrp="1"/>
+          </p:cNvSpPr>
+          <p:nvPr>
+            <p:ph sz="half" idx="2"/>
+          </p:nvPr>
+        </p:nvSpPr>
+        <p:spPr>
+          <a:xfrm>
+            <a:off x="6172200" y="1825625"/>
+            <a:ext cx="5721350" cy="4351338"/>
+          </a:xfrm>
+        </p:spPr>
+        <p:txBody>
+          <a:bodyPr>
+            <a:normAutofit lnSpcReduction="10000"/>
+          </a:bodyPr>
+          <a:lstStyle/>
+          <a:p>
+            <a:r>
+              <a:rPr lang="en-US" dirty="0"/>
+              <a:t>Evaluated at runtime</a:t>
+            </a:r>
+          </a:p>
+          <a:p>
+            <a:r>
+              <a:rPr lang="en-US" dirty="0"/>
+              <a:t>Can be used as values in a pivot table</a:t>
+            </a:r>
+          </a:p>
+          <a:p>
+            <a:r>
+              <a:rPr lang="en-US" dirty="0"/>
+              <a:t>always Operates on aggregations of data under an evaluation context</a:t>
+            </a:r>
+          </a:p>
+          <a:p>
+            <a:pPr marL="0" indent="0">
+              <a:buNone/>
+            </a:pPr>
+            <a:endParaRPr lang="en-US" dirty="0"/>
+          </a:p>
+          <a:p>
+            <a:pPr marL="0" indent="0">
+              <a:buNone/>
+            </a:pPr>
+            <a:r>
+              <a:rPr lang="en-US" dirty="0"/>
+              <a:t>Example:</a:t>
+            </a:r>
+          </a:p>
+          <a:p>
+            <a:pPr marL="0" indent="0">
+              <a:buNone/>
+            </a:pPr>
+            <a:r>
+              <a:rPr lang="en-US" dirty="0" err="1"/>
+              <a:t>GrossMargin</a:t>
+            </a:r>
+            <a:r>
+              <a:rPr lang="en-US" dirty="0"/>
+              <a:t> := </a:t>
+            </a:r>
+          </a:p>
+          <a:p>
+            <a:pPr marL="0" indent="0">
+              <a:buNone/>
+            </a:pPr>
+            <a:r>
+              <a:rPr lang="en-US" dirty="0"/>
+              <a:t>SUM(Sales[</a:t>
+            </a:r>
+            <a:r>
+              <a:rPr lang="en-US" dirty="0" err="1"/>
+              <a:t>SalesAmount</a:t>
+            </a:r>
+            <a:r>
+              <a:rPr lang="en-US" dirty="0"/>
+              <a:t>]) – SUM(Sales[</a:t>
+            </a:r>
+            <a:r>
+              <a:rPr lang="en-US" dirty="0" err="1"/>
+              <a:t>TotalProductCost</a:t>
+            </a:r>
+            <a:r>
+              <a:rPr lang="en-US" dirty="0"/>
+              <a:t>])</a:t>
+            </a:r>
+          </a:p>
+        </p:txBody>
+      </p:sp>
+    </p:spTree>
+    <p:extLst>
+      <p:ext uri="{BB962C8B-B14F-4D97-AF65-F5344CB8AC3E}">
+        <p14:creationId xmlns:p14="http://schemas.microsoft.com/office/powerpoint/2010/main" val="1443625829"/>
+      </p:ext>
+    </p:extLst>
+  </p:cSld>
+  <p:clrMapOvr>
+    <a:masterClrMapping/>
+  </p:clrMapOvr>
+</p:sld>
+</file>
+
+<file path=ppt/slides/slide33.xml><?xml version="1.0" encoding="utf-8"?>
+<p:sld xmlns:a="http://schemas.openxmlformats.org/drawingml/2006/main" xmlns:r="http://schemas.openxmlformats.org/officeDocument/2006/relationships" xmlns:p="http://schemas.openxmlformats.org/presentationml/2006/main">
+  <p:cSld>
+    <p:spTree>
+      <p:nvGrpSpPr>
+        <p:cNvPr id="1" name=""/>
+        <p:cNvGrpSpPr/>
+        <p:nvPr/>
+      </p:nvGrpSpPr>
+      <p:grpSpPr>
+        <a:xfrm>
+          <a:off x="0" y="0"/>
+          <a:ext cx="0" cy="0"/>
+          <a:chOff x="0" y="0"/>
+          <a:chExt cx="0" cy="0"/>
+        </a:xfrm>
+      </p:grpSpPr>
+      <p:sp>
+        <p:nvSpPr>
+          <p:cNvPr id="2" name="Titel 1">
+            <a:extLst>
+              <a:ext uri="{FF2B5EF4-FFF2-40B4-BE49-F238E27FC236}">
+                <a16:creationId xmlns:a16="http://schemas.microsoft.com/office/drawing/2014/main" id="{5E17CAF5-1F2F-4C78-879C-A37E828E47F3}"/>
+              </a:ext>
+            </a:extLst>
+          </p:cNvPr>
+          <p:cNvSpPr>
+            <a:spLocks noGrp="1"/>
+          </p:cNvSpPr>
+          <p:nvPr>
+            <p:ph type="title"/>
+          </p:nvPr>
+        </p:nvSpPr>
+        <p:spPr/>
+        <p:txBody>
+          <a:bodyPr/>
+          <a:lstStyle/>
+          <a:p>
+            <a:r>
+              <a:rPr lang="en-US" dirty="0"/>
+              <a:t>Evaluation Context</a:t>
+            </a:r>
+            <a:endParaRPr lang="en-AT" dirty="0"/>
+          </a:p>
+        </p:txBody>
+      </p:sp>
+      <p:sp>
+        <p:nvSpPr>
+          <p:cNvPr id="3" name="Inhaltsplatzhalter 2">
+            <a:extLst>
+              <a:ext uri="{FF2B5EF4-FFF2-40B4-BE49-F238E27FC236}">
+                <a16:creationId xmlns:a16="http://schemas.microsoft.com/office/drawing/2014/main" id="{034D2214-8954-410B-ACBC-EE3ED7DF591C}"/>
+              </a:ext>
+            </a:extLst>
+          </p:cNvPr>
+          <p:cNvSpPr>
+            <a:spLocks noGrp="1"/>
+          </p:cNvSpPr>
+          <p:nvPr>
+            <p:ph idx="1"/>
+          </p:nvPr>
+        </p:nvSpPr>
+        <p:spPr>
+          <a:xfrm>
+            <a:off x="838200" y="1825625"/>
+            <a:ext cx="11236424" cy="4351338"/>
+          </a:xfrm>
+        </p:spPr>
+        <p:txBody>
+          <a:bodyPr/>
+          <a:lstStyle/>
+          <a:p>
+            <a:r>
+              <a:rPr lang="en-US" dirty="0"/>
+              <a:t>Row Context</a:t>
+            </a:r>
+          </a:p>
+          <a:p>
+            <a:r>
+              <a:rPr lang="en-US" dirty="0"/>
+              <a:t>Filter Context</a:t>
+            </a:r>
+          </a:p>
+          <a:p>
+            <a:endParaRPr lang="en-US" dirty="0"/>
+          </a:p>
+          <a:p>
+            <a:pPr marL="0" indent="0">
+              <a:buNone/>
+            </a:pPr>
+            <a:r>
+              <a:rPr lang="en-US" b="1" i="1" dirty="0"/>
+              <a:t>“The filter context filters the model the row context iterates one table.”</a:t>
+            </a:r>
+          </a:p>
+          <a:p>
+            <a:pPr marL="0" indent="0">
+              <a:buNone/>
+            </a:pPr>
+            <a:endParaRPr lang="en-US" b="1" i="1" dirty="0"/>
+          </a:p>
+          <a:p>
+            <a:pPr marL="0" indent="0">
+              <a:buNone/>
+            </a:pPr>
+            <a:endParaRPr lang="en-US" b="1" i="1" dirty="0"/>
+          </a:p>
+        </p:txBody>
+      </p:sp>
+    </p:spTree>
+    <p:extLst>
+      <p:ext uri="{BB962C8B-B14F-4D97-AF65-F5344CB8AC3E}">
+        <p14:creationId xmlns:p14="http://schemas.microsoft.com/office/powerpoint/2010/main" val="2211469030"/>
+      </p:ext>
+    </p:extLst>
+  </p:cSld>
+  <p:clrMapOvr>
+    <a:masterClrMapping/>
+  </p:clrMapOvr>
+</p:sld>
+</file>
+
+<file path=ppt/slides/slide34.xml><?xml version="1.0" encoding="utf-8"?>
 <p:sld xmlns:a="http://schemas.openxmlformats.org/drawingml/2006/main" xmlns:r="http://schemas.openxmlformats.org/officeDocument/2006/relationships" xmlns:p="http://schemas.openxmlformats.org/presentationml/2006/main">
   <p:cSld>
     <p:spTree>
@@ -18186,7 +19114,595 @@
 </p:sld>
 </file>
 
-<file path=ppt/slides/slide32.xml><?xml version="1.0" encoding="utf-8"?>
+<file path=ppt/slides/slide35.xml><?xml version="1.0" encoding="utf-8"?>
+<p:sld xmlns:a="http://schemas.openxmlformats.org/drawingml/2006/main" xmlns:r="http://schemas.openxmlformats.org/officeDocument/2006/relationships" xmlns:p="http://schemas.openxmlformats.org/presentationml/2006/main">
+  <p:cSld>
+    <p:spTree>
+      <p:nvGrpSpPr>
+        <p:cNvPr id="1" name=""/>
+        <p:cNvGrpSpPr/>
+        <p:nvPr/>
+      </p:nvGrpSpPr>
+      <p:grpSpPr>
+        <a:xfrm>
+          <a:off x="0" y="0"/>
+          <a:ext cx="0" cy="0"/>
+          <a:chOff x="0" y="0"/>
+          <a:chExt cx="0" cy="0"/>
+        </a:xfrm>
+      </p:grpSpPr>
+      <p:sp>
+        <p:nvSpPr>
+          <p:cNvPr id="2" name="Titel 1">
+            <a:extLst>
+              <a:ext uri="{FF2B5EF4-FFF2-40B4-BE49-F238E27FC236}">
+                <a16:creationId xmlns:a16="http://schemas.microsoft.com/office/drawing/2014/main" id="{509C9C1C-5460-420D-8FA6-3733B2505259}"/>
+              </a:ext>
+            </a:extLst>
+          </p:cNvPr>
+          <p:cNvSpPr>
+            <a:spLocks noGrp="1"/>
+          </p:cNvSpPr>
+          <p:nvPr>
+            <p:ph type="title"/>
+          </p:nvPr>
+        </p:nvSpPr>
+        <p:spPr/>
+        <p:txBody>
+          <a:bodyPr/>
+          <a:lstStyle/>
+          <a:p>
+            <a:r>
+              <a:rPr lang="en-US" dirty="0"/>
+              <a:t>Row Context</a:t>
+            </a:r>
+            <a:endParaRPr lang="en-AT" dirty="0"/>
+          </a:p>
+        </p:txBody>
+      </p:sp>
+      <p:sp>
+        <p:nvSpPr>
+          <p:cNvPr id="3" name="Inhaltsplatzhalter 2">
+            <a:extLst>
+              <a:ext uri="{FF2B5EF4-FFF2-40B4-BE49-F238E27FC236}">
+                <a16:creationId xmlns:a16="http://schemas.microsoft.com/office/drawing/2014/main" id="{CCCF49F7-8DB3-4BA8-84EE-32C281D323AC}"/>
+              </a:ext>
+            </a:extLst>
+          </p:cNvPr>
+          <p:cNvSpPr>
+            <a:spLocks noGrp="1"/>
+          </p:cNvSpPr>
+          <p:nvPr>
+            <p:ph idx="1"/>
+          </p:nvPr>
+        </p:nvSpPr>
+        <p:spPr/>
+        <p:txBody>
+          <a:bodyPr/>
+          <a:lstStyle/>
+          <a:p>
+            <a:r>
+              <a:rPr lang="en-US" dirty="0"/>
+              <a:t>is an iterator (like a cursor)</a:t>
+            </a:r>
+          </a:p>
+          <a:p>
+            <a:r>
+              <a:rPr lang="en-US" dirty="0"/>
+              <a:t>It scans a table and for each row allows an expression to access each column in that row. </a:t>
+            </a:r>
+          </a:p>
+          <a:p>
+            <a:endParaRPr lang="en-US" dirty="0"/>
+          </a:p>
+          <a:p>
+            <a:r>
+              <a:rPr lang="en-US" dirty="0"/>
+              <a:t>Example Expression:</a:t>
+            </a:r>
+          </a:p>
+          <a:p>
+            <a:pPr marL="0" indent="0">
+              <a:buNone/>
+            </a:pPr>
+            <a:r>
+              <a:rPr lang="de-AT" sz="1800" dirty="0">
+                <a:solidFill>
+                  <a:srgbClr val="484848"/>
+                </a:solidFill>
+                <a:latin typeface="Tahoma" panose="020B0604030504040204" pitchFamily="34" charset="0"/>
+              </a:rPr>
+              <a:t>= </a:t>
+            </a:r>
+            <a:r>
+              <a:rPr lang="de-AT" sz="1800" dirty="0" err="1">
+                <a:solidFill>
+                  <a:srgbClr val="0000FF"/>
+                </a:solidFill>
+                <a:latin typeface="Tahoma" panose="020B0604030504040204" pitchFamily="34" charset="0"/>
+              </a:rPr>
+              <a:t>if</a:t>
+            </a:r>
+            <a:r>
+              <a:rPr lang="de-AT" sz="1800" dirty="0">
+                <a:solidFill>
+                  <a:srgbClr val="484848"/>
+                </a:solidFill>
+                <a:latin typeface="Tahoma" panose="020B0604030504040204" pitchFamily="34" charset="0"/>
+              </a:rPr>
+              <a:t> ([Bankleitzahl] = 33078; </a:t>
+            </a:r>
+            <a:r>
+              <a:rPr lang="de-AT" sz="1800" dirty="0">
+                <a:solidFill>
+                  <a:srgbClr val="A31515"/>
+                </a:solidFill>
+                <a:latin typeface="Tahoma" panose="020B0604030504040204" pitchFamily="34" charset="0"/>
+              </a:rPr>
+              <a:t>"</a:t>
+            </a:r>
+            <a:r>
+              <a:rPr lang="de-AT" sz="1800" dirty="0" err="1">
+                <a:solidFill>
+                  <a:srgbClr val="A31515"/>
+                </a:solidFill>
+                <a:latin typeface="Tahoma" panose="020B0604030504040204" pitchFamily="34" charset="0"/>
+              </a:rPr>
+              <a:t>Purbach</a:t>
+            </a:r>
+            <a:r>
+              <a:rPr lang="de-AT" sz="1800" dirty="0">
+                <a:solidFill>
+                  <a:srgbClr val="A31515"/>
+                </a:solidFill>
+                <a:latin typeface="Tahoma" panose="020B0604030504040204" pitchFamily="34" charset="0"/>
+              </a:rPr>
+              <a:t>"</a:t>
+            </a:r>
+            <a:r>
+              <a:rPr lang="de-AT" sz="1800" dirty="0">
+                <a:solidFill>
+                  <a:srgbClr val="484848"/>
+                </a:solidFill>
+                <a:latin typeface="Tahoma" panose="020B0604030504040204" pitchFamily="34" charset="0"/>
+              </a:rPr>
+              <a:t>;</a:t>
+            </a:r>
+            <a:r>
+              <a:rPr lang="de-AT" sz="1800" dirty="0">
+                <a:solidFill>
+                  <a:srgbClr val="A31515"/>
+                </a:solidFill>
+                <a:latin typeface="Tahoma" panose="020B0604030504040204" pitchFamily="34" charset="0"/>
+              </a:rPr>
+              <a:t>"Bruck"</a:t>
+            </a:r>
+            <a:r>
+              <a:rPr lang="de-AT" sz="1800" dirty="0">
+                <a:solidFill>
+                  <a:srgbClr val="484848"/>
+                </a:solidFill>
+                <a:latin typeface="Tahoma" panose="020B0604030504040204" pitchFamily="34" charset="0"/>
+              </a:rPr>
+              <a:t>)</a:t>
+            </a:r>
+          </a:p>
+          <a:p>
+            <a:pPr marL="0" indent="0">
+              <a:buNone/>
+            </a:pPr>
+            <a:endParaRPr lang="de-AT" sz="1800" dirty="0">
+              <a:solidFill>
+                <a:srgbClr val="484848"/>
+              </a:solidFill>
+              <a:latin typeface="Tahoma" panose="020B0604030504040204" pitchFamily="34" charset="0"/>
+            </a:endParaRPr>
+          </a:p>
+          <a:p>
+            <a:pPr marL="0" indent="0">
+              <a:buNone/>
+            </a:pPr>
+            <a:r>
+              <a:rPr lang="de-AT" sz="1800" dirty="0" err="1">
+                <a:solidFill>
+                  <a:srgbClr val="484848"/>
+                </a:solidFill>
+                <a:latin typeface="Tahoma" panose="020B0604030504040204" pitchFamily="34" charset="0"/>
+              </a:rPr>
+              <a:t>Besides</a:t>
+            </a:r>
+            <a:r>
+              <a:rPr lang="de-AT" sz="1800" dirty="0">
+                <a:solidFill>
+                  <a:srgbClr val="484848"/>
+                </a:solidFill>
+                <a:latin typeface="Tahoma" panose="020B0604030504040204" pitchFamily="34" charset="0"/>
+              </a:rPr>
+              <a:t> </a:t>
+            </a:r>
+            <a:r>
+              <a:rPr lang="de-AT" sz="1800" dirty="0" err="1">
+                <a:solidFill>
+                  <a:srgbClr val="484848"/>
+                </a:solidFill>
+                <a:latin typeface="Tahoma" panose="020B0604030504040204" pitchFamily="34" charset="0"/>
+              </a:rPr>
+              <a:t>calculated</a:t>
+            </a:r>
+            <a:r>
+              <a:rPr lang="de-AT" sz="1800" dirty="0">
+                <a:solidFill>
+                  <a:srgbClr val="484848"/>
+                </a:solidFill>
+                <a:latin typeface="Tahoma" panose="020B0604030504040204" pitchFamily="34" charset="0"/>
+              </a:rPr>
+              <a:t> </a:t>
+            </a:r>
+            <a:r>
+              <a:rPr lang="de-AT" sz="1800" dirty="0" err="1">
+                <a:solidFill>
+                  <a:srgbClr val="484848"/>
+                </a:solidFill>
+                <a:latin typeface="Tahoma" panose="020B0604030504040204" pitchFamily="34" charset="0"/>
+              </a:rPr>
+              <a:t>columns</a:t>
+            </a:r>
+            <a:r>
+              <a:rPr lang="de-AT" sz="1800" dirty="0">
+                <a:solidFill>
+                  <a:srgbClr val="484848"/>
+                </a:solidFill>
+                <a:latin typeface="Tahoma" panose="020B0604030504040204" pitchFamily="34" charset="0"/>
+              </a:rPr>
+              <a:t> in </a:t>
+            </a:r>
+            <a:r>
+              <a:rPr lang="de-AT" sz="1800" dirty="0" err="1">
+                <a:solidFill>
+                  <a:srgbClr val="484848"/>
+                </a:solidFill>
+                <a:latin typeface="Tahoma" panose="020B0604030504040204" pitchFamily="34" charset="0"/>
+              </a:rPr>
+              <a:t>tables</a:t>
+            </a:r>
+            <a:r>
+              <a:rPr lang="de-AT" sz="1800" dirty="0">
+                <a:solidFill>
+                  <a:srgbClr val="484848"/>
+                </a:solidFill>
+                <a:latin typeface="Tahoma" panose="020B0604030504040204" pitchFamily="34" charset="0"/>
+              </a:rPr>
+              <a:t> also </a:t>
+            </a:r>
+            <a:r>
+              <a:rPr lang="de-AT" sz="1800" dirty="0" err="1">
+                <a:solidFill>
+                  <a:srgbClr val="484848"/>
+                </a:solidFill>
+                <a:latin typeface="Tahoma" panose="020B0604030504040204" pitchFamily="34" charset="0"/>
+              </a:rPr>
+              <a:t>many</a:t>
+            </a:r>
+            <a:r>
+              <a:rPr lang="de-AT" sz="1800" dirty="0">
+                <a:solidFill>
+                  <a:srgbClr val="484848"/>
+                </a:solidFill>
+                <a:latin typeface="Tahoma" panose="020B0604030504040204" pitchFamily="34" charset="0"/>
+              </a:rPr>
+              <a:t> </a:t>
+            </a:r>
+            <a:r>
+              <a:rPr lang="de-AT" sz="1800" dirty="0" err="1">
+                <a:solidFill>
+                  <a:srgbClr val="484848"/>
+                </a:solidFill>
+                <a:latin typeface="Tahoma" panose="020B0604030504040204" pitchFamily="34" charset="0"/>
+              </a:rPr>
+              <a:t>functions</a:t>
+            </a:r>
+            <a:r>
+              <a:rPr lang="de-AT" sz="1800" dirty="0">
+                <a:solidFill>
+                  <a:srgbClr val="484848"/>
+                </a:solidFill>
+                <a:latin typeface="Tahoma" panose="020B0604030504040204" pitchFamily="34" charset="0"/>
+              </a:rPr>
+              <a:t> </a:t>
+            </a:r>
+            <a:r>
+              <a:rPr lang="de-AT" sz="1800" dirty="0" err="1">
+                <a:solidFill>
+                  <a:srgbClr val="484848"/>
+                </a:solidFill>
+                <a:latin typeface="Tahoma" panose="020B0604030504040204" pitchFamily="34" charset="0"/>
+              </a:rPr>
+              <a:t>create</a:t>
+            </a:r>
+            <a:r>
+              <a:rPr lang="de-AT" sz="1800" dirty="0">
+                <a:solidFill>
+                  <a:srgbClr val="484848"/>
+                </a:solidFill>
+                <a:latin typeface="Tahoma" panose="020B0604030504040204" pitchFamily="34" charset="0"/>
+              </a:rPr>
+              <a:t> </a:t>
+            </a:r>
+            <a:r>
+              <a:rPr lang="de-AT" sz="1800" dirty="0" err="1">
+                <a:solidFill>
+                  <a:srgbClr val="484848"/>
+                </a:solidFill>
+                <a:latin typeface="Tahoma" panose="020B0604030504040204" pitchFamily="34" charset="0"/>
+              </a:rPr>
+              <a:t>iterators</a:t>
+            </a:r>
+            <a:r>
+              <a:rPr lang="de-AT" sz="1800" dirty="0">
+                <a:solidFill>
+                  <a:srgbClr val="484848"/>
+                </a:solidFill>
+                <a:latin typeface="Tahoma" panose="020B0604030504040204" pitchFamily="34" charset="0"/>
+              </a:rPr>
+              <a:t> (</a:t>
+            </a:r>
+            <a:r>
+              <a:rPr lang="de-AT" sz="1800" dirty="0" err="1">
+                <a:solidFill>
+                  <a:srgbClr val="484848"/>
+                </a:solidFill>
+                <a:latin typeface="Tahoma" panose="020B0604030504040204" pitchFamily="34" charset="0"/>
+              </a:rPr>
+              <a:t>row</a:t>
+            </a:r>
+            <a:r>
+              <a:rPr lang="de-AT" sz="1800" dirty="0">
+                <a:solidFill>
+                  <a:srgbClr val="484848"/>
+                </a:solidFill>
+                <a:latin typeface="Tahoma" panose="020B0604030504040204" pitchFamily="34" charset="0"/>
+              </a:rPr>
+              <a:t> </a:t>
+            </a:r>
+            <a:r>
+              <a:rPr lang="de-AT" sz="1800" dirty="0" err="1">
+                <a:solidFill>
+                  <a:srgbClr val="484848"/>
+                </a:solidFill>
+                <a:latin typeface="Tahoma" panose="020B0604030504040204" pitchFamily="34" charset="0"/>
+              </a:rPr>
+              <a:t>contexts</a:t>
+            </a:r>
+            <a:r>
+              <a:rPr lang="de-AT" sz="1800" dirty="0">
+                <a:solidFill>
+                  <a:srgbClr val="484848"/>
+                </a:solidFill>
+                <a:latin typeface="Tahoma" panose="020B0604030504040204" pitchFamily="34" charset="0"/>
+              </a:rPr>
+              <a:t>)! </a:t>
+            </a:r>
+          </a:p>
+          <a:p>
+            <a:pPr marL="0" indent="0">
+              <a:buNone/>
+            </a:pPr>
+            <a:r>
+              <a:rPr lang="de-AT" sz="1800" dirty="0" err="1">
+                <a:solidFill>
+                  <a:srgbClr val="484848"/>
+                </a:solidFill>
+                <a:latin typeface="Tahoma" panose="020B0604030504040204" pitchFamily="34" charset="0"/>
+              </a:rPr>
+              <a:t>For</a:t>
+            </a:r>
+            <a:r>
+              <a:rPr lang="de-AT" sz="1800" dirty="0">
+                <a:solidFill>
+                  <a:srgbClr val="484848"/>
+                </a:solidFill>
+                <a:latin typeface="Tahoma" panose="020B0604030504040204" pitchFamily="34" charset="0"/>
+              </a:rPr>
+              <a:t> </a:t>
+            </a:r>
+            <a:r>
+              <a:rPr lang="de-AT" sz="1800" dirty="0" err="1">
+                <a:solidFill>
+                  <a:srgbClr val="484848"/>
+                </a:solidFill>
+                <a:latin typeface="Tahoma" panose="020B0604030504040204" pitchFamily="34" charset="0"/>
+              </a:rPr>
+              <a:t>example</a:t>
+            </a:r>
+            <a:r>
+              <a:rPr lang="de-AT" sz="1800" dirty="0">
+                <a:solidFill>
+                  <a:srgbClr val="484848"/>
+                </a:solidFill>
+                <a:latin typeface="Tahoma" panose="020B0604030504040204" pitchFamily="34" charset="0"/>
+              </a:rPr>
+              <a:t> all </a:t>
+            </a:r>
+            <a:r>
+              <a:rPr lang="de-AT" sz="1800" dirty="0" err="1">
+                <a:solidFill>
+                  <a:srgbClr val="484848"/>
+                </a:solidFill>
+                <a:latin typeface="Tahoma" panose="020B0604030504040204" pitchFamily="34" charset="0"/>
+              </a:rPr>
+              <a:t>aggregators</a:t>
+            </a:r>
+            <a:r>
+              <a:rPr lang="de-AT" sz="1800" dirty="0">
+                <a:solidFill>
+                  <a:srgbClr val="484848"/>
+                </a:solidFill>
+                <a:latin typeface="Tahoma" panose="020B0604030504040204" pitchFamily="34" charset="0"/>
+              </a:rPr>
+              <a:t> like SUM (, MIN, MAX, AVG,…) </a:t>
+            </a:r>
+            <a:r>
+              <a:rPr lang="de-AT" sz="1800" dirty="0" err="1">
+                <a:solidFill>
+                  <a:srgbClr val="484848"/>
+                </a:solidFill>
+                <a:latin typeface="Tahoma" panose="020B0604030504040204" pitchFamily="34" charset="0"/>
+              </a:rPr>
+              <a:t>that</a:t>
+            </a:r>
+            <a:r>
+              <a:rPr lang="de-AT" sz="1800" dirty="0">
+                <a:solidFill>
+                  <a:srgbClr val="484848"/>
+                </a:solidFill>
+                <a:latin typeface="Tahoma" panose="020B0604030504040204" pitchFamily="34" charset="0"/>
+              </a:rPr>
+              <a:t> </a:t>
+            </a:r>
+            <a:r>
+              <a:rPr lang="de-AT" sz="1800" dirty="0" err="1">
+                <a:solidFill>
+                  <a:srgbClr val="484848"/>
+                </a:solidFill>
+                <a:latin typeface="Tahoma" panose="020B0604030504040204" pitchFamily="34" charset="0"/>
+              </a:rPr>
+              <a:t>is</a:t>
+            </a:r>
+            <a:r>
+              <a:rPr lang="de-AT" sz="1800" dirty="0">
+                <a:solidFill>
+                  <a:srgbClr val="484848"/>
+                </a:solidFill>
+                <a:latin typeface="Tahoma" panose="020B0604030504040204" pitchFamily="34" charset="0"/>
+              </a:rPr>
+              <a:t> </a:t>
+            </a:r>
+            <a:r>
+              <a:rPr lang="de-AT" sz="1800" dirty="0" err="1">
+                <a:solidFill>
+                  <a:srgbClr val="484848"/>
+                </a:solidFill>
+                <a:latin typeface="Tahoma" panose="020B0604030504040204" pitchFamily="34" charset="0"/>
+              </a:rPr>
+              <a:t>syntax</a:t>
+            </a:r>
+            <a:r>
+              <a:rPr lang="de-AT" sz="1800" dirty="0">
+                <a:solidFill>
+                  <a:srgbClr val="484848"/>
+                </a:solidFill>
+                <a:latin typeface="Tahoma" panose="020B0604030504040204" pitchFamily="34" charset="0"/>
+              </a:rPr>
+              <a:t> </a:t>
+            </a:r>
+            <a:r>
+              <a:rPr lang="de-AT" sz="1800" dirty="0" err="1">
+                <a:solidFill>
+                  <a:srgbClr val="484848"/>
+                </a:solidFill>
+                <a:latin typeface="Tahoma" panose="020B0604030504040204" pitchFamily="34" charset="0"/>
+              </a:rPr>
+              <a:t>sugar</a:t>
+            </a:r>
+            <a:r>
+              <a:rPr lang="de-AT" sz="1800" dirty="0">
+                <a:solidFill>
+                  <a:srgbClr val="484848"/>
+                </a:solidFill>
+                <a:latin typeface="Tahoma" panose="020B0604030504040204" pitchFamily="34" charset="0"/>
+              </a:rPr>
+              <a:t> </a:t>
+            </a:r>
+            <a:r>
+              <a:rPr lang="de-AT" sz="1800" dirty="0" err="1">
+                <a:solidFill>
+                  <a:srgbClr val="484848"/>
+                </a:solidFill>
+                <a:latin typeface="Tahoma" panose="020B0604030504040204" pitchFamily="34" charset="0"/>
+              </a:rPr>
+              <a:t>for</a:t>
+            </a:r>
+            <a:r>
+              <a:rPr lang="de-AT" sz="1800" dirty="0">
+                <a:solidFill>
+                  <a:srgbClr val="484848"/>
+                </a:solidFill>
+                <a:latin typeface="Tahoma" panose="020B0604030504040204" pitchFamily="34" charset="0"/>
+              </a:rPr>
+              <a:t> SUMX (&lt;</a:t>
+            </a:r>
+            <a:r>
+              <a:rPr lang="de-AT" sz="1800" dirty="0" err="1">
+                <a:solidFill>
+                  <a:srgbClr val="484848"/>
+                </a:solidFill>
+                <a:latin typeface="Tahoma" panose="020B0604030504040204" pitchFamily="34" charset="0"/>
+              </a:rPr>
+              <a:t>table</a:t>
+            </a:r>
+            <a:r>
+              <a:rPr lang="de-AT" sz="1800" dirty="0">
+                <a:solidFill>
+                  <a:srgbClr val="484848"/>
+                </a:solidFill>
+                <a:latin typeface="Tahoma" panose="020B0604030504040204" pitchFamily="34" charset="0"/>
+              </a:rPr>
+              <a:t>&gt;, ‘</a:t>
+            </a:r>
+            <a:r>
+              <a:rPr lang="de-AT" sz="1800" dirty="0" err="1">
+                <a:solidFill>
+                  <a:srgbClr val="484848"/>
+                </a:solidFill>
+                <a:latin typeface="Tahoma" panose="020B0604030504040204" pitchFamily="34" charset="0"/>
+              </a:rPr>
+              <a:t>table</a:t>
+            </a:r>
+            <a:r>
+              <a:rPr lang="de-AT" sz="1800" dirty="0">
+                <a:solidFill>
+                  <a:srgbClr val="484848"/>
+                </a:solidFill>
+                <a:latin typeface="Tahoma" panose="020B0604030504040204" pitchFamily="34" charset="0"/>
+              </a:rPr>
+              <a:t>‘[</a:t>
+            </a:r>
+            <a:r>
+              <a:rPr lang="de-AT" sz="1800" dirty="0" err="1">
+                <a:solidFill>
+                  <a:srgbClr val="484848"/>
+                </a:solidFill>
+                <a:latin typeface="Tahoma" panose="020B0604030504040204" pitchFamily="34" charset="0"/>
+              </a:rPr>
+              <a:t>Column</a:t>
+            </a:r>
+            <a:r>
+              <a:rPr lang="de-AT" sz="1800" dirty="0">
+                <a:solidFill>
+                  <a:srgbClr val="484848"/>
+                </a:solidFill>
+                <a:latin typeface="Tahoma" panose="020B0604030504040204" pitchFamily="34" charset="0"/>
+              </a:rPr>
+              <a:t>])</a:t>
+            </a:r>
+            <a:endParaRPr lang="en-AT" dirty="0"/>
+          </a:p>
+        </p:txBody>
+      </p:sp>
+    </p:spTree>
+    <p:extLst>
+      <p:ext uri="{BB962C8B-B14F-4D97-AF65-F5344CB8AC3E}">
+        <p14:creationId xmlns:p14="http://schemas.microsoft.com/office/powerpoint/2010/main" val="793809967"/>
+      </p:ext>
+    </p:extLst>
+  </p:cSld>
+  <p:clrMapOvr>
+    <a:masterClrMapping/>
+  </p:clrMapOvr>
+</p:sld>
+</file>
+
+<file path=ppt/slides/slide36.xml><?xml version="1.0" encoding="utf-8"?>
 <p:sld xmlns:a="http://schemas.openxmlformats.org/drawingml/2006/main" xmlns:r="http://schemas.openxmlformats.org/officeDocument/2006/relationships" xmlns:p="http://schemas.openxmlformats.org/presentationml/2006/main">
   <p:cSld>
     <p:spTree>
@@ -18612,7 +20128,112 @@
 </p:sld>
 </file>
 
-<file path=ppt/slides/slide33.xml><?xml version="1.0" encoding="utf-8"?>
+<file path=ppt/slides/slide37.xml><?xml version="1.0" encoding="utf-8"?>
+<p:sld xmlns:a="http://schemas.openxmlformats.org/drawingml/2006/main" xmlns:r="http://schemas.openxmlformats.org/officeDocument/2006/relationships" xmlns:p="http://schemas.openxmlformats.org/presentationml/2006/main">
+  <p:cSld>
+    <p:spTree>
+      <p:nvGrpSpPr>
+        <p:cNvPr id="1" name=""/>
+        <p:cNvGrpSpPr/>
+        <p:nvPr/>
+      </p:nvGrpSpPr>
+      <p:grpSpPr>
+        <a:xfrm>
+          <a:off x="0" y="0"/>
+          <a:ext cx="0" cy="0"/>
+          <a:chOff x="0" y="0"/>
+          <a:chExt cx="0" cy="0"/>
+        </a:xfrm>
+      </p:grpSpPr>
+      <p:sp>
+        <p:nvSpPr>
+          <p:cNvPr id="2" name="Titel 1">
+            <a:extLst>
+              <a:ext uri="{FF2B5EF4-FFF2-40B4-BE49-F238E27FC236}">
+                <a16:creationId xmlns:a16="http://schemas.microsoft.com/office/drawing/2014/main" id="{C342184D-7F35-4FF3-821A-5F65A3507883}"/>
+              </a:ext>
+            </a:extLst>
+          </p:cNvPr>
+          <p:cNvSpPr>
+            <a:spLocks noGrp="1"/>
+          </p:cNvSpPr>
+          <p:nvPr>
+            <p:ph type="title"/>
+          </p:nvPr>
+        </p:nvSpPr>
+        <p:spPr/>
+        <p:txBody>
+          <a:bodyPr/>
+          <a:lstStyle/>
+          <a:p>
+            <a:r>
+              <a:rPr lang="en-US" dirty="0"/>
+              <a:t>CALCULATE to overwrite the FILTER-Context</a:t>
+            </a:r>
+            <a:endParaRPr lang="en-AT" dirty="0"/>
+          </a:p>
+        </p:txBody>
+      </p:sp>
+      <p:sp>
+        <p:nvSpPr>
+          <p:cNvPr id="3" name="Inhaltsplatzhalter 2">
+            <a:extLst>
+              <a:ext uri="{FF2B5EF4-FFF2-40B4-BE49-F238E27FC236}">
+                <a16:creationId xmlns:a16="http://schemas.microsoft.com/office/drawing/2014/main" id="{8A690DB0-BE18-4353-9FB8-5A17F82F069C}"/>
+              </a:ext>
+            </a:extLst>
+          </p:cNvPr>
+          <p:cNvSpPr>
+            <a:spLocks noGrp="1"/>
+          </p:cNvSpPr>
+          <p:nvPr>
+            <p:ph idx="1"/>
+          </p:nvPr>
+        </p:nvSpPr>
+        <p:spPr/>
+        <p:txBody>
+          <a:bodyPr/>
+          <a:lstStyle/>
+          <a:p>
+            <a:endParaRPr lang="de-AT" dirty="0"/>
+          </a:p>
+          <a:p>
+            <a:endParaRPr lang="de-AT" dirty="0"/>
+          </a:p>
+          <a:p>
+            <a:endParaRPr lang="de-AT" dirty="0"/>
+          </a:p>
+          <a:p>
+            <a:r>
+              <a:rPr lang="de-AT" dirty="0"/>
+              <a:t>Eigenkapital:= CALCULATE([Gesamtbetrag];'</a:t>
+            </a:r>
+            <a:r>
+              <a:rPr lang="de-AT" dirty="0" err="1"/>
+              <a:t>DimBuchungskonten</a:t>
+            </a:r>
+            <a:r>
+              <a:rPr lang="de-AT" dirty="0"/>
+              <a:t>'[Bezeichnung] = "Eigenkapital")*-1</a:t>
+            </a:r>
+            <a:endParaRPr lang="en-AT" dirty="0"/>
+          </a:p>
+        </p:txBody>
+      </p:sp>
+    </p:spTree>
+    <p:extLst>
+      <p:ext uri="{BB962C8B-B14F-4D97-AF65-F5344CB8AC3E}">
+        <p14:creationId xmlns:p14="http://schemas.microsoft.com/office/powerpoint/2010/main" val="1272195258"/>
+      </p:ext>
+    </p:extLst>
+  </p:cSld>
+  <p:clrMapOvr>
+    <a:masterClrMapping/>
+  </p:clrMapOvr>
+</p:sld>
+</file>
+
+<file path=ppt/slides/slide38.xml><?xml version="1.0" encoding="utf-8"?>
 <p:sld xmlns:a="http://schemas.openxmlformats.org/drawingml/2006/main" xmlns:r="http://schemas.openxmlformats.org/officeDocument/2006/relationships" xmlns:p="http://schemas.openxmlformats.org/presentationml/2006/main">
   <p:cSld>
     <p:spTree>
@@ -19633,7 +21254,7 @@
                   <a:schemeClr val="tx1"/>
                 </a:solidFill>
               </a:rPr>
-              <a:t>Tabular Engine Does Not Require a Great Deal of Performance Tuning</a:t>
+              <a:t>Does not Require a Great Deal of Performance Tuning</a:t>
             </a:r>
           </a:p>
           <a:p>
@@ -19643,7 +21264,19 @@
                   <a:schemeClr val="tx1"/>
                 </a:solidFill>
               </a:rPr>
-              <a:t>Best at Returning Low Granularity Data</a:t>
+              <a:t>Great </a:t>
+            </a:r>
+            <a:r>
+              <a:rPr lang="en-US" dirty="0"/>
+              <a:t>for </a:t>
+            </a:r>
+            <a:r>
+              <a:rPr lang="en-US" sz="2800" dirty="0">
+                <a:solidFill>
+                  <a:schemeClr val="tx1"/>
+                </a:solidFill>
+              </a:rPr>
+              <a:t>Low Granularity Data analysis</a:t>
             </a:r>
           </a:p>
           <a:p>

</xml_diff>

<commit_message>
Final Version for todays workshop
</commit_message>
<xml_diff>
--- a/Slides.pptx
+++ b/Slides.pptx
@@ -5,7 +5,7 @@
     <p:sldMasterId id="2147483648" r:id="rId1"/>
   </p:sldMasterIdLst>
   <p:notesMasterIdLst>
-    <p:notesMasterId r:id="rId41"/>
+    <p:notesMasterId r:id="rId43"/>
   </p:notesMasterIdLst>
   <p:sldIdLst>
     <p:sldId id="269" r:id="rId2"/>
@@ -47,6 +47,8 @@
     <p:sldId id="524" r:id="rId38"/>
     <p:sldId id="528" r:id="rId39"/>
     <p:sldId id="266" r:id="rId40"/>
+    <p:sldId id="534" r:id="rId41"/>
+    <p:sldId id="535" r:id="rId42"/>
   </p:sldIdLst>
   <p:sldSz cx="12192000" cy="6858000"/>
   <p:notesSz cx="6858000" cy="9144000"/>
@@ -20329,7 +20331,15 @@
           <a:p>
             <a:r>
               <a:rPr lang="en-US" dirty="0"/>
-              <a:t>CALCULATE to overwrite the FILTER-Context</a:t>
+              <a:t>CALCULATE to </a:t>
+            </a:r>
+            <a:r>
+              <a:rPr lang="en-US" b="1" dirty="0"/>
+              <a:t>overwrite</a:t>
+            </a:r>
+            <a:r>
+              <a:rPr lang="en-US" dirty="0"/>
+              <a:t> the FILTER-Context</a:t>
             </a:r>
             <a:endParaRPr lang="en-AT" dirty="0"/>
           </a:p>
@@ -20356,10 +20366,29 @@
           <a:bodyPr/>
           <a:lstStyle/>
           <a:p>
-            <a:endParaRPr lang="de-AT" dirty="0"/>
-          </a:p>
-          <a:p>
-            <a:endParaRPr lang="de-AT" dirty="0"/>
+            <a:pPr marL="0" indent="0">
+              <a:buNone/>
+            </a:pPr>
+            <a:r>
+              <a:rPr lang="de-AT" dirty="0"/>
+              <a:t>CALCULATE (</a:t>
+            </a:r>
+            <a:r>
+              <a:rPr lang="de-AT" dirty="0" err="1"/>
+              <a:t>Experession</a:t>
+            </a:r>
+            <a:r>
+              <a:rPr lang="de-AT" dirty="0"/>
+              <a:t>, </a:t>
+            </a:r>
+            <a:r>
+              <a:rPr lang="de-AT" dirty="0" err="1"/>
+              <a:t>Filtercondition</a:t>
+            </a:r>
+            <a:r>
+              <a:rPr lang="de-AT" dirty="0"/>
+              <a:t>)</a:t>
+            </a:r>
           </a:p>
           <a:p>
             <a:endParaRPr lang="de-AT" dirty="0"/>
@@ -20461,7 +20490,65 @@
           <a:bodyPr/>
           <a:lstStyle/>
           <a:p>
-            <a:endParaRPr lang="en-US"/>
+            <a:r>
+              <a:rPr lang="en-US" dirty="0"/>
+              <a:t>To define generic calculation</a:t>
+            </a:r>
+          </a:p>
+          <a:p>
+            <a:r>
+              <a:rPr lang="en-US" dirty="0"/>
+              <a:t>Can be seen as a template where the measure gets replaced at </a:t>
+            </a:r>
+            <a:r>
+              <a:rPr lang="en-US" dirty="0" err="1"/>
+              <a:t>querytime</a:t>
+            </a:r>
+            <a:r>
+              <a:rPr lang="en-US" dirty="0"/>
+              <a:t>.</a:t>
+            </a:r>
+          </a:p>
+          <a:p>
+            <a:endParaRPr lang="en-US" dirty="0"/>
+          </a:p>
+          <a:p>
+            <a:r>
+              <a:rPr lang="en-US" dirty="0"/>
+              <a:t>Example:</a:t>
+            </a:r>
+          </a:p>
+          <a:p>
+            <a:pPr marL="0" indent="0">
+              <a:buNone/>
+            </a:pPr>
+            <a:r>
+              <a:rPr lang="en-US" dirty="0" err="1"/>
+              <a:t>Timeintelligence</a:t>
+            </a:r>
+            <a:endParaRPr lang="en-US" dirty="0"/>
+          </a:p>
+          <a:p>
+            <a:pPr lvl="1"/>
+            <a:r>
+              <a:rPr lang="en-US" dirty="0"/>
+              <a:t>Calculation Item: Current   - Expression: SELECTEDMEASURE()</a:t>
+            </a:r>
+          </a:p>
+          <a:p>
+            <a:pPr lvl="1"/>
+            <a:r>
+              <a:rPr lang="en-US" dirty="0"/>
+              <a:t>Calculation Item: LY – Expression: CALCULATE(SELECTEDMEASURE();PREVIOUSYEAR('</a:t>
+            </a:r>
+            <a:r>
+              <a:rPr lang="en-US" dirty="0" err="1"/>
+              <a:t>DimDates</a:t>
+            </a:r>
+            <a:r>
+              <a:rPr lang="en-US" dirty="0"/>
+              <a:t>'[Date]))</a:t>
+            </a:r>
           </a:p>
         </p:txBody>
       </p:sp>
@@ -20806,6 +20893,218 @@
       </p:par>
     </p:tnLst>
   </p:timing>
+</p:sld>
+</file>
+
+<file path=ppt/slides/slide40.xml><?xml version="1.0" encoding="utf-8"?>
+<p:sld xmlns:a="http://schemas.openxmlformats.org/drawingml/2006/main" xmlns:r="http://schemas.openxmlformats.org/officeDocument/2006/relationships" xmlns:p="http://schemas.openxmlformats.org/presentationml/2006/main">
+  <p:cSld>
+    <p:spTree>
+      <p:nvGrpSpPr>
+        <p:cNvPr id="1" name=""/>
+        <p:cNvGrpSpPr/>
+        <p:nvPr/>
+      </p:nvGrpSpPr>
+      <p:grpSpPr>
+        <a:xfrm>
+          <a:off x="0" y="0"/>
+          <a:ext cx="0" cy="0"/>
+          <a:chOff x="0" y="0"/>
+          <a:chExt cx="0" cy="0"/>
+        </a:xfrm>
+      </p:grpSpPr>
+      <p:sp>
+        <p:nvSpPr>
+          <p:cNvPr id="2" name="Titel 1">
+            <a:extLst>
+              <a:ext uri="{FF2B5EF4-FFF2-40B4-BE49-F238E27FC236}">
+                <a16:creationId xmlns:a16="http://schemas.microsoft.com/office/drawing/2014/main" id="{8ACB5335-6719-475A-9A1D-9FA259B2E8EC}"/>
+              </a:ext>
+            </a:extLst>
+          </p:cNvPr>
+          <p:cNvSpPr>
+            <a:spLocks noGrp="1"/>
+          </p:cNvSpPr>
+          <p:nvPr>
+            <p:ph type="title"/>
+          </p:nvPr>
+        </p:nvSpPr>
+        <p:spPr/>
+        <p:txBody>
+          <a:bodyPr/>
+          <a:lstStyle/>
+          <a:p>
+            <a:r>
+              <a:rPr lang="en-US" dirty="0"/>
+              <a:t>Combinations of Calculation Groups are possible</a:t>
+            </a:r>
+            <a:endParaRPr lang="en-AT" dirty="0"/>
+          </a:p>
+        </p:txBody>
+      </p:sp>
+      <p:sp>
+        <p:nvSpPr>
+          <p:cNvPr id="3" name="Inhaltsplatzhalter 2">
+            <a:extLst>
+              <a:ext uri="{FF2B5EF4-FFF2-40B4-BE49-F238E27FC236}">
+                <a16:creationId xmlns:a16="http://schemas.microsoft.com/office/drawing/2014/main" id="{B58AB8C8-70C1-4271-B8AA-BC15A82DDA79}"/>
+              </a:ext>
+            </a:extLst>
+          </p:cNvPr>
+          <p:cNvSpPr>
+            <a:spLocks noGrp="1"/>
+          </p:cNvSpPr>
+          <p:nvPr>
+            <p:ph idx="1"/>
+          </p:nvPr>
+        </p:nvSpPr>
+        <p:spPr/>
+        <p:txBody>
+          <a:bodyPr/>
+          <a:lstStyle/>
+          <a:p>
+            <a:r>
+              <a:rPr lang="en-US" dirty="0"/>
+              <a:t>Consider precedence property!</a:t>
+            </a:r>
+            <a:endParaRPr lang="en-AT" dirty="0"/>
+          </a:p>
+        </p:txBody>
+      </p:sp>
+      <p:pic>
+        <p:nvPicPr>
+          <p:cNvPr id="5" name="Grafik 4">
+            <a:extLst>
+              <a:ext uri="{FF2B5EF4-FFF2-40B4-BE49-F238E27FC236}">
+                <a16:creationId xmlns:a16="http://schemas.microsoft.com/office/drawing/2014/main" id="{1D80FC17-3BF9-445C-97C8-555F9EE782D5}"/>
+              </a:ext>
+            </a:extLst>
+          </p:cNvPr>
+          <p:cNvPicPr>
+            <a:picLocks noChangeAspect="1"/>
+          </p:cNvPicPr>
+          <p:nvPr/>
+        </p:nvPicPr>
+        <p:blipFill>
+          <a:blip r:embed="rId2"/>
+          <a:stretch>
+            <a:fillRect/>
+          </a:stretch>
+        </p:blipFill>
+        <p:spPr>
+          <a:xfrm>
+            <a:off x="6494418" y="1495608"/>
+            <a:ext cx="4363969" cy="5011371"/>
+          </a:xfrm>
+          <a:prstGeom prst="rect">
+            <a:avLst/>
+          </a:prstGeom>
+        </p:spPr>
+      </p:pic>
+    </p:spTree>
+    <p:extLst>
+      <p:ext uri="{BB962C8B-B14F-4D97-AF65-F5344CB8AC3E}">
+        <p14:creationId xmlns:p14="http://schemas.microsoft.com/office/powerpoint/2010/main" val="2806647341"/>
+      </p:ext>
+    </p:extLst>
+  </p:cSld>
+  <p:clrMapOvr>
+    <a:masterClrMapping/>
+  </p:clrMapOvr>
+</p:sld>
+</file>
+
+<file path=ppt/slides/slide41.xml><?xml version="1.0" encoding="utf-8"?>
+<p:sld xmlns:a="http://schemas.openxmlformats.org/drawingml/2006/main" xmlns:r="http://schemas.openxmlformats.org/officeDocument/2006/relationships" xmlns:p="http://schemas.openxmlformats.org/presentationml/2006/main">
+  <p:cSld>
+    <p:spTree>
+      <p:nvGrpSpPr>
+        <p:cNvPr id="1" name=""/>
+        <p:cNvGrpSpPr/>
+        <p:nvPr/>
+      </p:nvGrpSpPr>
+      <p:grpSpPr>
+        <a:xfrm>
+          <a:off x="0" y="0"/>
+          <a:ext cx="0" cy="0"/>
+          <a:chOff x="0" y="0"/>
+          <a:chExt cx="0" cy="0"/>
+        </a:xfrm>
+      </p:grpSpPr>
+      <p:sp>
+        <p:nvSpPr>
+          <p:cNvPr id="2" name="Titel 1">
+            <a:extLst>
+              <a:ext uri="{FF2B5EF4-FFF2-40B4-BE49-F238E27FC236}">
+                <a16:creationId xmlns:a16="http://schemas.microsoft.com/office/drawing/2014/main" id="{D668697B-73CD-4E1D-890A-43EB0C6A265C}"/>
+              </a:ext>
+            </a:extLst>
+          </p:cNvPr>
+          <p:cNvSpPr>
+            <a:spLocks noGrp="1"/>
+          </p:cNvSpPr>
+          <p:nvPr>
+            <p:ph type="title"/>
+          </p:nvPr>
+        </p:nvSpPr>
+        <p:spPr/>
+        <p:txBody>
+          <a:bodyPr/>
+          <a:lstStyle/>
+          <a:p>
+            <a:r>
+              <a:rPr lang="en-US" dirty="0"/>
+              <a:t>Demo – Reporting Services</a:t>
+            </a:r>
+            <a:endParaRPr lang="en-AT" dirty="0"/>
+          </a:p>
+        </p:txBody>
+      </p:sp>
+      <p:sp>
+        <p:nvSpPr>
+          <p:cNvPr id="3" name="Inhaltsplatzhalter 2">
+            <a:extLst>
+              <a:ext uri="{FF2B5EF4-FFF2-40B4-BE49-F238E27FC236}">
+                <a16:creationId xmlns:a16="http://schemas.microsoft.com/office/drawing/2014/main" id="{73E90F43-EF29-47F2-9345-F0D96A38F352}"/>
+              </a:ext>
+            </a:extLst>
+          </p:cNvPr>
+          <p:cNvSpPr>
+            <a:spLocks noGrp="1"/>
+          </p:cNvSpPr>
+          <p:nvPr>
+            <p:ph idx="1"/>
+          </p:nvPr>
+        </p:nvSpPr>
+        <p:spPr/>
+        <p:txBody>
+          <a:bodyPr/>
+          <a:lstStyle/>
+          <a:p>
+            <a:r>
+              <a:rPr lang="en-US" dirty="0"/>
+              <a:t>Calling the model with DAX </a:t>
+            </a:r>
+          </a:p>
+          <a:p>
+            <a:r>
+              <a:rPr lang="en-US"/>
+              <a:t>Calling the model with MDX</a:t>
+            </a:r>
+            <a:endParaRPr lang="en-AT"/>
+          </a:p>
+        </p:txBody>
+      </p:sp>
+    </p:spTree>
+    <p:extLst>
+      <p:ext uri="{BB962C8B-B14F-4D97-AF65-F5344CB8AC3E}">
+        <p14:creationId xmlns:p14="http://schemas.microsoft.com/office/powerpoint/2010/main" val="4135356959"/>
+      </p:ext>
+    </p:extLst>
+  </p:cSld>
+  <p:clrMapOvr>
+    <a:masterClrMapping/>
+  </p:clrMapOvr>
 </p:sld>
 </file>
 

</xml_diff>